<commit_message>
Ausblick und Fazit in Seminarvortrag angefangen
</commit_message>
<xml_diff>
--- a/docs/Seminarvortrag.pptx
+++ b/docs/Seminarvortrag.pptx
@@ -11,6 +11,8 @@
     <p:sldId id="261" r:id="rId5"/>
     <p:sldId id="260" r:id="rId6"/>
     <p:sldId id="262" r:id="rId7"/>
+    <p:sldId id="263" r:id="rId8"/>
+    <p:sldId id="264" r:id="rId9"/>
   </p:sldIdLst>
   <p:sldSz cx="12192000" cy="6858000"/>
   <p:notesSz cx="6858000" cy="9144000"/>
@@ -139,7 +141,7 @@
           <p:cNvPr id="2" name="Title 1">
             <a:extLst>
               <a:ext uri="{FF2B5EF4-FFF2-40B4-BE49-F238E27FC236}">
-                <a16:creationId xmlns:a16="http://schemas.microsoft.com/office/drawing/2014/main" id="{046DBCE4-E0EF-4FEE-80D5-A702C3556002}"/>
+                <a16:creationId xmlns:a16="http://schemas.microsoft.com/office/drawing/2014/main" xmlns="" id="{046DBCE4-E0EF-4FEE-80D5-A702C3556002}"/>
               </a:ext>
             </a:extLst>
           </p:cNvPr>
@@ -177,7 +179,7 @@
           <p:cNvPr id="3" name="Subtitle 2">
             <a:extLst>
               <a:ext uri="{FF2B5EF4-FFF2-40B4-BE49-F238E27FC236}">
-                <a16:creationId xmlns:a16="http://schemas.microsoft.com/office/drawing/2014/main" id="{7E50572C-23B8-4844-BEA8-67547B46B854}"/>
+                <a16:creationId xmlns:a16="http://schemas.microsoft.com/office/drawing/2014/main" xmlns="" id="{7E50572C-23B8-4844-BEA8-67547B46B854}"/>
               </a:ext>
             </a:extLst>
           </p:cNvPr>
@@ -248,7 +250,7 @@
           <p:cNvPr id="4" name="Date Placeholder 3">
             <a:extLst>
               <a:ext uri="{FF2B5EF4-FFF2-40B4-BE49-F238E27FC236}">
-                <a16:creationId xmlns:a16="http://schemas.microsoft.com/office/drawing/2014/main" id="{100022F9-A075-4D48-821D-C3BBF5EF6DB8}"/>
+                <a16:creationId xmlns:a16="http://schemas.microsoft.com/office/drawing/2014/main" xmlns="" id="{100022F9-A075-4D48-821D-C3BBF5EF6DB8}"/>
               </a:ext>
             </a:extLst>
           </p:cNvPr>
@@ -266,7 +268,7 @@
           <a:p>
             <a:fld id="{45D0F98D-38D5-4C1A-A003-148E75DBF760}" type="datetime1">
               <a:rPr lang="de-DE" smtClean="0"/>
-              <a:t>08.12.2019</a:t>
+              <a:t>09.12.2019</a:t>
             </a:fld>
             <a:endParaRPr lang="de-DE"/>
           </a:p>
@@ -277,7 +279,7 @@
           <p:cNvPr id="5" name="Footer Placeholder 4">
             <a:extLst>
               <a:ext uri="{FF2B5EF4-FFF2-40B4-BE49-F238E27FC236}">
-                <a16:creationId xmlns:a16="http://schemas.microsoft.com/office/drawing/2014/main" id="{EC31605A-96D3-4AE5-8AB0-795CD0B5F4FF}"/>
+                <a16:creationId xmlns:a16="http://schemas.microsoft.com/office/drawing/2014/main" xmlns="" id="{EC31605A-96D3-4AE5-8AB0-795CD0B5F4FF}"/>
               </a:ext>
             </a:extLst>
           </p:cNvPr>
@@ -305,7 +307,7 @@
           <p:cNvPr id="6" name="Slide Number Placeholder 5">
             <a:extLst>
               <a:ext uri="{FF2B5EF4-FFF2-40B4-BE49-F238E27FC236}">
-                <a16:creationId xmlns:a16="http://schemas.microsoft.com/office/drawing/2014/main" id="{57DF77BF-007F-4C70-98E2-83A1A7E91C87}"/>
+                <a16:creationId xmlns:a16="http://schemas.microsoft.com/office/drawing/2014/main" xmlns="" id="{57DF77BF-007F-4C70-98E2-83A1A7E91C87}"/>
               </a:ext>
             </a:extLst>
           </p:cNvPr>
@@ -323,7 +325,7 @@
           <a:p>
             <a:fld id="{969E759D-A893-4B96-8B48-96EE547EBC41}" type="slidenum">
               <a:rPr lang="de-DE" smtClean="0"/>
-              <a:t>‹#›</a:t>
+              <a:t>‹Nr.›</a:t>
             </a:fld>
             <a:endParaRPr lang="de-DE"/>
           </a:p>
@@ -364,7 +366,7 @@
           <p:cNvPr id="2" name="Title 1">
             <a:extLst>
               <a:ext uri="{FF2B5EF4-FFF2-40B4-BE49-F238E27FC236}">
-                <a16:creationId xmlns:a16="http://schemas.microsoft.com/office/drawing/2014/main" id="{50547723-A745-4136-9E9B-C54A2591C03E}"/>
+                <a16:creationId xmlns:a16="http://schemas.microsoft.com/office/drawing/2014/main" xmlns="" id="{50547723-A745-4136-9E9B-C54A2591C03E}"/>
               </a:ext>
             </a:extLst>
           </p:cNvPr>
@@ -393,7 +395,7 @@
           <p:cNvPr id="3" name="Vertical Text Placeholder 2">
             <a:extLst>
               <a:ext uri="{FF2B5EF4-FFF2-40B4-BE49-F238E27FC236}">
-                <a16:creationId xmlns:a16="http://schemas.microsoft.com/office/drawing/2014/main" id="{19A1C7A2-1B43-4C6D-A293-C7FFD55FA198}"/>
+                <a16:creationId xmlns:a16="http://schemas.microsoft.com/office/drawing/2014/main" xmlns="" id="{19A1C7A2-1B43-4C6D-A293-C7FFD55FA198}"/>
               </a:ext>
             </a:extLst>
           </p:cNvPr>
@@ -451,7 +453,7 @@
           <p:cNvPr id="4" name="Date Placeholder 3">
             <a:extLst>
               <a:ext uri="{FF2B5EF4-FFF2-40B4-BE49-F238E27FC236}">
-                <a16:creationId xmlns:a16="http://schemas.microsoft.com/office/drawing/2014/main" id="{E4D750D0-43FF-490C-A9D5-FAD09D16CB56}"/>
+                <a16:creationId xmlns:a16="http://schemas.microsoft.com/office/drawing/2014/main" xmlns="" id="{E4D750D0-43FF-490C-A9D5-FAD09D16CB56}"/>
               </a:ext>
             </a:extLst>
           </p:cNvPr>
@@ -469,7 +471,7 @@
           <a:p>
             <a:fld id="{35EE94FD-1B66-443A-A78C-7063FFFB3DB5}" type="datetime1">
               <a:rPr lang="de-DE" smtClean="0"/>
-              <a:t>08.12.2019</a:t>
+              <a:t>09.12.2019</a:t>
             </a:fld>
             <a:endParaRPr lang="de-DE"/>
           </a:p>
@@ -480,7 +482,7 @@
           <p:cNvPr id="5" name="Footer Placeholder 4">
             <a:extLst>
               <a:ext uri="{FF2B5EF4-FFF2-40B4-BE49-F238E27FC236}">
-                <a16:creationId xmlns:a16="http://schemas.microsoft.com/office/drawing/2014/main" id="{52720C74-982E-4771-B07D-A0BD79EC910E}"/>
+                <a16:creationId xmlns:a16="http://schemas.microsoft.com/office/drawing/2014/main" xmlns="" id="{52720C74-982E-4771-B07D-A0BD79EC910E}"/>
               </a:ext>
             </a:extLst>
           </p:cNvPr>
@@ -508,7 +510,7 @@
           <p:cNvPr id="6" name="Slide Number Placeholder 5">
             <a:extLst>
               <a:ext uri="{FF2B5EF4-FFF2-40B4-BE49-F238E27FC236}">
-                <a16:creationId xmlns:a16="http://schemas.microsoft.com/office/drawing/2014/main" id="{521B4D69-0D90-4E66-BBD6-D567927F056E}"/>
+                <a16:creationId xmlns:a16="http://schemas.microsoft.com/office/drawing/2014/main" xmlns="" id="{521B4D69-0D90-4E66-BBD6-D567927F056E}"/>
               </a:ext>
             </a:extLst>
           </p:cNvPr>
@@ -526,7 +528,7 @@
           <a:p>
             <a:fld id="{969E759D-A893-4B96-8B48-96EE547EBC41}" type="slidenum">
               <a:rPr lang="de-DE" smtClean="0"/>
-              <a:t>‹#›</a:t>
+              <a:t>‹Nr.›</a:t>
             </a:fld>
             <a:endParaRPr lang="de-DE"/>
           </a:p>
@@ -567,7 +569,7 @@
           <p:cNvPr id="2" name="Vertical Title 1">
             <a:extLst>
               <a:ext uri="{FF2B5EF4-FFF2-40B4-BE49-F238E27FC236}">
-                <a16:creationId xmlns:a16="http://schemas.microsoft.com/office/drawing/2014/main" id="{2CAD75F2-C38E-4541-87A7-F319E899E67A}"/>
+                <a16:creationId xmlns:a16="http://schemas.microsoft.com/office/drawing/2014/main" xmlns="" id="{2CAD75F2-C38E-4541-87A7-F319E899E67A}"/>
               </a:ext>
             </a:extLst>
           </p:cNvPr>
@@ -601,7 +603,7 @@
           <p:cNvPr id="3" name="Vertical Text Placeholder 2">
             <a:extLst>
               <a:ext uri="{FF2B5EF4-FFF2-40B4-BE49-F238E27FC236}">
-                <a16:creationId xmlns:a16="http://schemas.microsoft.com/office/drawing/2014/main" id="{4C062E13-06CB-485A-AA44-1327366B8430}"/>
+                <a16:creationId xmlns:a16="http://schemas.microsoft.com/office/drawing/2014/main" xmlns="" id="{4C062E13-06CB-485A-AA44-1327366B8430}"/>
               </a:ext>
             </a:extLst>
           </p:cNvPr>
@@ -664,7 +666,7 @@
           <p:cNvPr id="4" name="Date Placeholder 3">
             <a:extLst>
               <a:ext uri="{FF2B5EF4-FFF2-40B4-BE49-F238E27FC236}">
-                <a16:creationId xmlns:a16="http://schemas.microsoft.com/office/drawing/2014/main" id="{625F218E-01D2-451A-9031-AD736B1E20A6}"/>
+                <a16:creationId xmlns:a16="http://schemas.microsoft.com/office/drawing/2014/main" xmlns="" id="{625F218E-01D2-451A-9031-AD736B1E20A6}"/>
               </a:ext>
             </a:extLst>
           </p:cNvPr>
@@ -682,7 +684,7 @@
           <a:p>
             <a:fld id="{846435C6-9F94-4AA4-B35A-39DE494D17EA}" type="datetime1">
               <a:rPr lang="de-DE" smtClean="0"/>
-              <a:t>08.12.2019</a:t>
+              <a:t>09.12.2019</a:t>
             </a:fld>
             <a:endParaRPr lang="de-DE"/>
           </a:p>
@@ -693,7 +695,7 @@
           <p:cNvPr id="5" name="Footer Placeholder 4">
             <a:extLst>
               <a:ext uri="{FF2B5EF4-FFF2-40B4-BE49-F238E27FC236}">
-                <a16:creationId xmlns:a16="http://schemas.microsoft.com/office/drawing/2014/main" id="{C7083295-EF4A-46C3-90BB-B9E2D04D0576}"/>
+                <a16:creationId xmlns:a16="http://schemas.microsoft.com/office/drawing/2014/main" xmlns="" id="{C7083295-EF4A-46C3-90BB-B9E2D04D0576}"/>
               </a:ext>
             </a:extLst>
           </p:cNvPr>
@@ -721,7 +723,7 @@
           <p:cNvPr id="6" name="Slide Number Placeholder 5">
             <a:extLst>
               <a:ext uri="{FF2B5EF4-FFF2-40B4-BE49-F238E27FC236}">
-                <a16:creationId xmlns:a16="http://schemas.microsoft.com/office/drawing/2014/main" id="{0F8EDD3E-35ED-415B-86A4-3E78B8B56297}"/>
+                <a16:creationId xmlns:a16="http://schemas.microsoft.com/office/drawing/2014/main" xmlns="" id="{0F8EDD3E-35ED-415B-86A4-3E78B8B56297}"/>
               </a:ext>
             </a:extLst>
           </p:cNvPr>
@@ -739,7 +741,7 @@
           <a:p>
             <a:fld id="{969E759D-A893-4B96-8B48-96EE547EBC41}" type="slidenum">
               <a:rPr lang="de-DE" smtClean="0"/>
-              <a:t>‹#›</a:t>
+              <a:t>‹Nr.›</a:t>
             </a:fld>
             <a:endParaRPr lang="de-DE"/>
           </a:p>
@@ -780,7 +782,7 @@
           <p:cNvPr id="2" name="Title 1">
             <a:extLst>
               <a:ext uri="{FF2B5EF4-FFF2-40B4-BE49-F238E27FC236}">
-                <a16:creationId xmlns:a16="http://schemas.microsoft.com/office/drawing/2014/main" id="{3EC23AC9-B405-43A9-9B49-DD554606884B}"/>
+                <a16:creationId xmlns:a16="http://schemas.microsoft.com/office/drawing/2014/main" xmlns="" id="{3EC23AC9-B405-43A9-9B49-DD554606884B}"/>
               </a:ext>
             </a:extLst>
           </p:cNvPr>
@@ -809,7 +811,7 @@
           <p:cNvPr id="3" name="Content Placeholder 2">
             <a:extLst>
               <a:ext uri="{FF2B5EF4-FFF2-40B4-BE49-F238E27FC236}">
-                <a16:creationId xmlns:a16="http://schemas.microsoft.com/office/drawing/2014/main" id="{5A1ED858-EF3B-4519-8B6B-57FF232A60D6}"/>
+                <a16:creationId xmlns:a16="http://schemas.microsoft.com/office/drawing/2014/main" xmlns="" id="{5A1ED858-EF3B-4519-8B6B-57FF232A60D6}"/>
               </a:ext>
             </a:extLst>
           </p:cNvPr>
@@ -867,7 +869,7 @@
           <p:cNvPr id="4" name="Date Placeholder 3">
             <a:extLst>
               <a:ext uri="{FF2B5EF4-FFF2-40B4-BE49-F238E27FC236}">
-                <a16:creationId xmlns:a16="http://schemas.microsoft.com/office/drawing/2014/main" id="{C8150030-2F31-4B9A-B432-2B22C4DE6212}"/>
+                <a16:creationId xmlns:a16="http://schemas.microsoft.com/office/drawing/2014/main" xmlns="" id="{C8150030-2F31-4B9A-B432-2B22C4DE6212}"/>
               </a:ext>
             </a:extLst>
           </p:cNvPr>
@@ -885,7 +887,7 @@
           <a:p>
             <a:fld id="{7BA378BF-52EB-4C5B-B6BB-996DFE0988BD}" type="datetime1">
               <a:rPr lang="de-DE" smtClean="0"/>
-              <a:t>08.12.2019</a:t>
+              <a:t>09.12.2019</a:t>
             </a:fld>
             <a:endParaRPr lang="de-DE"/>
           </a:p>
@@ -896,7 +898,7 @@
           <p:cNvPr id="5" name="Footer Placeholder 4">
             <a:extLst>
               <a:ext uri="{FF2B5EF4-FFF2-40B4-BE49-F238E27FC236}">
-                <a16:creationId xmlns:a16="http://schemas.microsoft.com/office/drawing/2014/main" id="{9D0121CD-2AA3-4C77-A2DC-710EE8AD1DE5}"/>
+                <a16:creationId xmlns:a16="http://schemas.microsoft.com/office/drawing/2014/main" xmlns="" id="{9D0121CD-2AA3-4C77-A2DC-710EE8AD1DE5}"/>
               </a:ext>
             </a:extLst>
           </p:cNvPr>
@@ -924,7 +926,7 @@
           <p:cNvPr id="6" name="Slide Number Placeholder 5">
             <a:extLst>
               <a:ext uri="{FF2B5EF4-FFF2-40B4-BE49-F238E27FC236}">
-                <a16:creationId xmlns:a16="http://schemas.microsoft.com/office/drawing/2014/main" id="{D230A6F5-C59C-4467-990E-B7673CFF0B72}"/>
+                <a16:creationId xmlns:a16="http://schemas.microsoft.com/office/drawing/2014/main" xmlns="" id="{D230A6F5-C59C-4467-990E-B7673CFF0B72}"/>
               </a:ext>
             </a:extLst>
           </p:cNvPr>
@@ -942,7 +944,7 @@
           <a:p>
             <a:fld id="{969E759D-A893-4B96-8B48-96EE547EBC41}" type="slidenum">
               <a:rPr lang="de-DE" smtClean="0"/>
-              <a:t>‹#›</a:t>
+              <a:t>‹Nr.›</a:t>
             </a:fld>
             <a:endParaRPr lang="de-DE"/>
           </a:p>
@@ -983,7 +985,7 @@
           <p:cNvPr id="2" name="Title 1">
             <a:extLst>
               <a:ext uri="{FF2B5EF4-FFF2-40B4-BE49-F238E27FC236}">
-                <a16:creationId xmlns:a16="http://schemas.microsoft.com/office/drawing/2014/main" id="{BF936881-31C9-42FA-A745-EA48C2B1D924}"/>
+                <a16:creationId xmlns:a16="http://schemas.microsoft.com/office/drawing/2014/main" xmlns="" id="{BF936881-31C9-42FA-A745-EA48C2B1D924}"/>
               </a:ext>
             </a:extLst>
           </p:cNvPr>
@@ -1021,7 +1023,7 @@
           <p:cNvPr id="3" name="Text Placeholder 2">
             <a:extLst>
               <a:ext uri="{FF2B5EF4-FFF2-40B4-BE49-F238E27FC236}">
-                <a16:creationId xmlns:a16="http://schemas.microsoft.com/office/drawing/2014/main" id="{F4F81A45-5932-4C85-A105-4077AD8D9885}"/>
+                <a16:creationId xmlns:a16="http://schemas.microsoft.com/office/drawing/2014/main" xmlns="" id="{F4F81A45-5932-4C85-A105-4077AD8D9885}"/>
               </a:ext>
             </a:extLst>
           </p:cNvPr>
@@ -1146,7 +1148,7 @@
           <p:cNvPr id="4" name="Date Placeholder 3">
             <a:extLst>
               <a:ext uri="{FF2B5EF4-FFF2-40B4-BE49-F238E27FC236}">
-                <a16:creationId xmlns:a16="http://schemas.microsoft.com/office/drawing/2014/main" id="{FF8CFA83-5D09-45E6-BFEE-A02E8D514255}"/>
+                <a16:creationId xmlns:a16="http://schemas.microsoft.com/office/drawing/2014/main" xmlns="" id="{FF8CFA83-5D09-45E6-BFEE-A02E8D514255}"/>
               </a:ext>
             </a:extLst>
           </p:cNvPr>
@@ -1164,7 +1166,7 @@
           <a:p>
             <a:fld id="{546325AB-2200-4FF3-AF2A-B172FFDDBDF4}" type="datetime1">
               <a:rPr lang="de-DE" smtClean="0"/>
-              <a:t>08.12.2019</a:t>
+              <a:t>09.12.2019</a:t>
             </a:fld>
             <a:endParaRPr lang="de-DE"/>
           </a:p>
@@ -1175,7 +1177,7 @@
           <p:cNvPr id="5" name="Footer Placeholder 4">
             <a:extLst>
               <a:ext uri="{FF2B5EF4-FFF2-40B4-BE49-F238E27FC236}">
-                <a16:creationId xmlns:a16="http://schemas.microsoft.com/office/drawing/2014/main" id="{A79C5C45-F0F7-4E1E-A0BA-F748D717175A}"/>
+                <a16:creationId xmlns:a16="http://schemas.microsoft.com/office/drawing/2014/main" xmlns="" id="{A79C5C45-F0F7-4E1E-A0BA-F748D717175A}"/>
               </a:ext>
             </a:extLst>
           </p:cNvPr>
@@ -1203,7 +1205,7 @@
           <p:cNvPr id="6" name="Slide Number Placeholder 5">
             <a:extLst>
               <a:ext uri="{FF2B5EF4-FFF2-40B4-BE49-F238E27FC236}">
-                <a16:creationId xmlns:a16="http://schemas.microsoft.com/office/drawing/2014/main" id="{0B6BC97A-AFA3-4F0C-AF54-B5654540B753}"/>
+                <a16:creationId xmlns:a16="http://schemas.microsoft.com/office/drawing/2014/main" xmlns="" id="{0B6BC97A-AFA3-4F0C-AF54-B5654540B753}"/>
               </a:ext>
             </a:extLst>
           </p:cNvPr>
@@ -1221,7 +1223,7 @@
           <a:p>
             <a:fld id="{969E759D-A893-4B96-8B48-96EE547EBC41}" type="slidenum">
               <a:rPr lang="de-DE" smtClean="0"/>
-              <a:t>‹#›</a:t>
+              <a:t>‹Nr.›</a:t>
             </a:fld>
             <a:endParaRPr lang="de-DE"/>
           </a:p>
@@ -1262,7 +1264,7 @@
           <p:cNvPr id="2" name="Title 1">
             <a:extLst>
               <a:ext uri="{FF2B5EF4-FFF2-40B4-BE49-F238E27FC236}">
-                <a16:creationId xmlns:a16="http://schemas.microsoft.com/office/drawing/2014/main" id="{767E744E-0BBE-4077-8230-C905D1B7B2F6}"/>
+                <a16:creationId xmlns:a16="http://schemas.microsoft.com/office/drawing/2014/main" xmlns="" id="{767E744E-0BBE-4077-8230-C905D1B7B2F6}"/>
               </a:ext>
             </a:extLst>
           </p:cNvPr>
@@ -1291,7 +1293,7 @@
           <p:cNvPr id="3" name="Content Placeholder 2">
             <a:extLst>
               <a:ext uri="{FF2B5EF4-FFF2-40B4-BE49-F238E27FC236}">
-                <a16:creationId xmlns:a16="http://schemas.microsoft.com/office/drawing/2014/main" id="{0C95CA8F-8400-44E9-982B-20F711B51A51}"/>
+                <a16:creationId xmlns:a16="http://schemas.microsoft.com/office/drawing/2014/main" xmlns="" id="{0C95CA8F-8400-44E9-982B-20F711B51A51}"/>
               </a:ext>
             </a:extLst>
           </p:cNvPr>
@@ -1354,7 +1356,7 @@
           <p:cNvPr id="4" name="Content Placeholder 3">
             <a:extLst>
               <a:ext uri="{FF2B5EF4-FFF2-40B4-BE49-F238E27FC236}">
-                <a16:creationId xmlns:a16="http://schemas.microsoft.com/office/drawing/2014/main" id="{8FFC5013-EAEC-446A-836B-EE12B52AF1EE}"/>
+                <a16:creationId xmlns:a16="http://schemas.microsoft.com/office/drawing/2014/main" xmlns="" id="{8FFC5013-EAEC-446A-836B-EE12B52AF1EE}"/>
               </a:ext>
             </a:extLst>
           </p:cNvPr>
@@ -1417,7 +1419,7 @@
           <p:cNvPr id="5" name="Date Placeholder 4">
             <a:extLst>
               <a:ext uri="{FF2B5EF4-FFF2-40B4-BE49-F238E27FC236}">
-                <a16:creationId xmlns:a16="http://schemas.microsoft.com/office/drawing/2014/main" id="{E310F9EB-66BC-4C02-949E-4481CE3C774C}"/>
+                <a16:creationId xmlns:a16="http://schemas.microsoft.com/office/drawing/2014/main" xmlns="" id="{E310F9EB-66BC-4C02-949E-4481CE3C774C}"/>
               </a:ext>
             </a:extLst>
           </p:cNvPr>
@@ -1435,7 +1437,7 @@
           <a:p>
             <a:fld id="{4BD4E413-4B36-416A-99F8-917101FD3552}" type="datetime1">
               <a:rPr lang="de-DE" smtClean="0"/>
-              <a:t>08.12.2019</a:t>
+              <a:t>09.12.2019</a:t>
             </a:fld>
             <a:endParaRPr lang="de-DE"/>
           </a:p>
@@ -1446,7 +1448,7 @@
           <p:cNvPr id="6" name="Footer Placeholder 5">
             <a:extLst>
               <a:ext uri="{FF2B5EF4-FFF2-40B4-BE49-F238E27FC236}">
-                <a16:creationId xmlns:a16="http://schemas.microsoft.com/office/drawing/2014/main" id="{74C21129-AF84-4DC7-B6AB-10366106430C}"/>
+                <a16:creationId xmlns:a16="http://schemas.microsoft.com/office/drawing/2014/main" xmlns="" id="{74C21129-AF84-4DC7-B6AB-10366106430C}"/>
               </a:ext>
             </a:extLst>
           </p:cNvPr>
@@ -1474,7 +1476,7 @@
           <p:cNvPr id="7" name="Slide Number Placeholder 6">
             <a:extLst>
               <a:ext uri="{FF2B5EF4-FFF2-40B4-BE49-F238E27FC236}">
-                <a16:creationId xmlns:a16="http://schemas.microsoft.com/office/drawing/2014/main" id="{6C1A3CA7-9108-4644-9A69-9E5AEB0B2AD0}"/>
+                <a16:creationId xmlns:a16="http://schemas.microsoft.com/office/drawing/2014/main" xmlns="" id="{6C1A3CA7-9108-4644-9A69-9E5AEB0B2AD0}"/>
               </a:ext>
             </a:extLst>
           </p:cNvPr>
@@ -1492,7 +1494,7 @@
           <a:p>
             <a:fld id="{969E759D-A893-4B96-8B48-96EE547EBC41}" type="slidenum">
               <a:rPr lang="de-DE" smtClean="0"/>
-              <a:t>‹#›</a:t>
+              <a:t>‹Nr.›</a:t>
             </a:fld>
             <a:endParaRPr lang="de-DE"/>
           </a:p>
@@ -1533,7 +1535,7 @@
           <p:cNvPr id="2" name="Title 1">
             <a:extLst>
               <a:ext uri="{FF2B5EF4-FFF2-40B4-BE49-F238E27FC236}">
-                <a16:creationId xmlns:a16="http://schemas.microsoft.com/office/drawing/2014/main" id="{33AA1592-15D3-4F0B-B2E7-C95CBA7D7F4C}"/>
+                <a16:creationId xmlns:a16="http://schemas.microsoft.com/office/drawing/2014/main" xmlns="" id="{33AA1592-15D3-4F0B-B2E7-C95CBA7D7F4C}"/>
               </a:ext>
             </a:extLst>
           </p:cNvPr>
@@ -1567,7 +1569,7 @@
           <p:cNvPr id="3" name="Text Placeholder 2">
             <a:extLst>
               <a:ext uri="{FF2B5EF4-FFF2-40B4-BE49-F238E27FC236}">
-                <a16:creationId xmlns:a16="http://schemas.microsoft.com/office/drawing/2014/main" id="{3BC98F03-C09F-41CB-A02C-235FEF123879}"/>
+                <a16:creationId xmlns:a16="http://schemas.microsoft.com/office/drawing/2014/main" xmlns="" id="{3BC98F03-C09F-41CB-A02C-235FEF123879}"/>
               </a:ext>
             </a:extLst>
           </p:cNvPr>
@@ -1638,7 +1640,7 @@
           <p:cNvPr id="4" name="Content Placeholder 3">
             <a:extLst>
               <a:ext uri="{FF2B5EF4-FFF2-40B4-BE49-F238E27FC236}">
-                <a16:creationId xmlns:a16="http://schemas.microsoft.com/office/drawing/2014/main" id="{2B41E649-41F5-4E43-B982-FA612CCD2DF0}"/>
+                <a16:creationId xmlns:a16="http://schemas.microsoft.com/office/drawing/2014/main" xmlns="" id="{2B41E649-41F5-4E43-B982-FA612CCD2DF0}"/>
               </a:ext>
             </a:extLst>
           </p:cNvPr>
@@ -1701,7 +1703,7 @@
           <p:cNvPr id="5" name="Text Placeholder 4">
             <a:extLst>
               <a:ext uri="{FF2B5EF4-FFF2-40B4-BE49-F238E27FC236}">
-                <a16:creationId xmlns:a16="http://schemas.microsoft.com/office/drawing/2014/main" id="{37D7ABD1-D2B0-4CF0-8B82-C5D1C4FD84AF}"/>
+                <a16:creationId xmlns:a16="http://schemas.microsoft.com/office/drawing/2014/main" xmlns="" id="{37D7ABD1-D2B0-4CF0-8B82-C5D1C4FD84AF}"/>
               </a:ext>
             </a:extLst>
           </p:cNvPr>
@@ -1772,7 +1774,7 @@
           <p:cNvPr id="6" name="Content Placeholder 5">
             <a:extLst>
               <a:ext uri="{FF2B5EF4-FFF2-40B4-BE49-F238E27FC236}">
-                <a16:creationId xmlns:a16="http://schemas.microsoft.com/office/drawing/2014/main" id="{9E3897D1-02F3-412B-83EF-28A5CF402015}"/>
+                <a16:creationId xmlns:a16="http://schemas.microsoft.com/office/drawing/2014/main" xmlns="" id="{9E3897D1-02F3-412B-83EF-28A5CF402015}"/>
               </a:ext>
             </a:extLst>
           </p:cNvPr>
@@ -1835,7 +1837,7 @@
           <p:cNvPr id="7" name="Date Placeholder 6">
             <a:extLst>
               <a:ext uri="{FF2B5EF4-FFF2-40B4-BE49-F238E27FC236}">
-                <a16:creationId xmlns:a16="http://schemas.microsoft.com/office/drawing/2014/main" id="{9EA6E2B4-4A3E-4E96-98E5-D833ADA54890}"/>
+                <a16:creationId xmlns:a16="http://schemas.microsoft.com/office/drawing/2014/main" xmlns="" id="{9EA6E2B4-4A3E-4E96-98E5-D833ADA54890}"/>
               </a:ext>
             </a:extLst>
           </p:cNvPr>
@@ -1853,7 +1855,7 @@
           <a:p>
             <a:fld id="{350CD5BB-2135-4C1C-9EB9-6B104A7F1852}" type="datetime1">
               <a:rPr lang="de-DE" smtClean="0"/>
-              <a:t>08.12.2019</a:t>
+              <a:t>09.12.2019</a:t>
             </a:fld>
             <a:endParaRPr lang="de-DE"/>
           </a:p>
@@ -1864,7 +1866,7 @@
           <p:cNvPr id="8" name="Footer Placeholder 7">
             <a:extLst>
               <a:ext uri="{FF2B5EF4-FFF2-40B4-BE49-F238E27FC236}">
-                <a16:creationId xmlns:a16="http://schemas.microsoft.com/office/drawing/2014/main" id="{5AC79E77-5927-4B6F-9B63-ADABE239B453}"/>
+                <a16:creationId xmlns:a16="http://schemas.microsoft.com/office/drawing/2014/main" xmlns="" id="{5AC79E77-5927-4B6F-9B63-ADABE239B453}"/>
               </a:ext>
             </a:extLst>
           </p:cNvPr>
@@ -1892,7 +1894,7 @@
           <p:cNvPr id="9" name="Slide Number Placeholder 8">
             <a:extLst>
               <a:ext uri="{FF2B5EF4-FFF2-40B4-BE49-F238E27FC236}">
-                <a16:creationId xmlns:a16="http://schemas.microsoft.com/office/drawing/2014/main" id="{37B9B9C8-ED50-4852-B9F1-48A216BB03D1}"/>
+                <a16:creationId xmlns:a16="http://schemas.microsoft.com/office/drawing/2014/main" xmlns="" id="{37B9B9C8-ED50-4852-B9F1-48A216BB03D1}"/>
               </a:ext>
             </a:extLst>
           </p:cNvPr>
@@ -1910,7 +1912,7 @@
           <a:p>
             <a:fld id="{969E759D-A893-4B96-8B48-96EE547EBC41}" type="slidenum">
               <a:rPr lang="de-DE" smtClean="0"/>
-              <a:t>‹#›</a:t>
+              <a:t>‹Nr.›</a:t>
             </a:fld>
             <a:endParaRPr lang="de-DE"/>
           </a:p>
@@ -1951,7 +1953,7 @@
           <p:cNvPr id="2" name="Title 1">
             <a:extLst>
               <a:ext uri="{FF2B5EF4-FFF2-40B4-BE49-F238E27FC236}">
-                <a16:creationId xmlns:a16="http://schemas.microsoft.com/office/drawing/2014/main" id="{AFFF9CCC-3D72-4E6D-9B55-5BDB2AB422C8}"/>
+                <a16:creationId xmlns:a16="http://schemas.microsoft.com/office/drawing/2014/main" xmlns="" id="{AFFF9CCC-3D72-4E6D-9B55-5BDB2AB422C8}"/>
               </a:ext>
             </a:extLst>
           </p:cNvPr>
@@ -1980,7 +1982,7 @@
           <p:cNvPr id="3" name="Date Placeholder 2">
             <a:extLst>
               <a:ext uri="{FF2B5EF4-FFF2-40B4-BE49-F238E27FC236}">
-                <a16:creationId xmlns:a16="http://schemas.microsoft.com/office/drawing/2014/main" id="{0B6C3247-58E3-4CD5-BAA0-DA75A819FDB7}"/>
+                <a16:creationId xmlns:a16="http://schemas.microsoft.com/office/drawing/2014/main" xmlns="" id="{0B6C3247-58E3-4CD5-BAA0-DA75A819FDB7}"/>
               </a:ext>
             </a:extLst>
           </p:cNvPr>
@@ -1998,7 +2000,7 @@
           <a:p>
             <a:fld id="{5F8EFD36-9E63-4951-BEF9-F6B8ACF9848D}" type="datetime1">
               <a:rPr lang="de-DE" smtClean="0"/>
-              <a:t>08.12.2019</a:t>
+              <a:t>09.12.2019</a:t>
             </a:fld>
             <a:endParaRPr lang="de-DE"/>
           </a:p>
@@ -2009,7 +2011,7 @@
           <p:cNvPr id="4" name="Footer Placeholder 3">
             <a:extLst>
               <a:ext uri="{FF2B5EF4-FFF2-40B4-BE49-F238E27FC236}">
-                <a16:creationId xmlns:a16="http://schemas.microsoft.com/office/drawing/2014/main" id="{F337865A-A6D7-4B6F-AACB-CF758CA5DFEF}"/>
+                <a16:creationId xmlns:a16="http://schemas.microsoft.com/office/drawing/2014/main" xmlns="" id="{F337865A-A6D7-4B6F-AACB-CF758CA5DFEF}"/>
               </a:ext>
             </a:extLst>
           </p:cNvPr>
@@ -2037,7 +2039,7 @@
           <p:cNvPr id="5" name="Slide Number Placeholder 4">
             <a:extLst>
               <a:ext uri="{FF2B5EF4-FFF2-40B4-BE49-F238E27FC236}">
-                <a16:creationId xmlns:a16="http://schemas.microsoft.com/office/drawing/2014/main" id="{3686C1C5-74DF-47F5-99D6-4A48265FCC9A}"/>
+                <a16:creationId xmlns:a16="http://schemas.microsoft.com/office/drawing/2014/main" xmlns="" id="{3686C1C5-74DF-47F5-99D6-4A48265FCC9A}"/>
               </a:ext>
             </a:extLst>
           </p:cNvPr>
@@ -2055,7 +2057,7 @@
           <a:p>
             <a:fld id="{969E759D-A893-4B96-8B48-96EE547EBC41}" type="slidenum">
               <a:rPr lang="de-DE" smtClean="0"/>
-              <a:t>‹#›</a:t>
+              <a:t>‹Nr.›</a:t>
             </a:fld>
             <a:endParaRPr lang="de-DE"/>
           </a:p>
@@ -2096,7 +2098,7 @@
           <p:cNvPr id="2" name="Date Placeholder 1">
             <a:extLst>
               <a:ext uri="{FF2B5EF4-FFF2-40B4-BE49-F238E27FC236}">
-                <a16:creationId xmlns:a16="http://schemas.microsoft.com/office/drawing/2014/main" id="{DD7FD90C-4FC4-4111-9356-41D9564DB7DC}"/>
+                <a16:creationId xmlns:a16="http://schemas.microsoft.com/office/drawing/2014/main" xmlns="" id="{DD7FD90C-4FC4-4111-9356-41D9564DB7DC}"/>
               </a:ext>
             </a:extLst>
           </p:cNvPr>
@@ -2114,7 +2116,7 @@
           <a:p>
             <a:fld id="{5809FACB-23B1-4A10-9D0A-328C6885745A}" type="datetime1">
               <a:rPr lang="de-DE" smtClean="0"/>
-              <a:t>08.12.2019</a:t>
+              <a:t>09.12.2019</a:t>
             </a:fld>
             <a:endParaRPr lang="de-DE"/>
           </a:p>
@@ -2125,7 +2127,7 @@
           <p:cNvPr id="3" name="Footer Placeholder 2">
             <a:extLst>
               <a:ext uri="{FF2B5EF4-FFF2-40B4-BE49-F238E27FC236}">
-                <a16:creationId xmlns:a16="http://schemas.microsoft.com/office/drawing/2014/main" id="{3C9FF4C4-44A5-48A4-BDD8-FEA03E205412}"/>
+                <a16:creationId xmlns:a16="http://schemas.microsoft.com/office/drawing/2014/main" xmlns="" id="{3C9FF4C4-44A5-48A4-BDD8-FEA03E205412}"/>
               </a:ext>
             </a:extLst>
           </p:cNvPr>
@@ -2153,7 +2155,7 @@
           <p:cNvPr id="4" name="Slide Number Placeholder 3">
             <a:extLst>
               <a:ext uri="{FF2B5EF4-FFF2-40B4-BE49-F238E27FC236}">
-                <a16:creationId xmlns:a16="http://schemas.microsoft.com/office/drawing/2014/main" id="{5BD1C1F2-608B-4F06-B3CF-EA402ECA138C}"/>
+                <a16:creationId xmlns:a16="http://schemas.microsoft.com/office/drawing/2014/main" xmlns="" id="{5BD1C1F2-608B-4F06-B3CF-EA402ECA138C}"/>
               </a:ext>
             </a:extLst>
           </p:cNvPr>
@@ -2171,7 +2173,7 @@
           <a:p>
             <a:fld id="{969E759D-A893-4B96-8B48-96EE547EBC41}" type="slidenum">
               <a:rPr lang="de-DE" smtClean="0"/>
-              <a:t>‹#›</a:t>
+              <a:t>‹Nr.›</a:t>
             </a:fld>
             <a:endParaRPr lang="de-DE"/>
           </a:p>
@@ -2212,7 +2214,7 @@
           <p:cNvPr id="2" name="Title 1">
             <a:extLst>
               <a:ext uri="{FF2B5EF4-FFF2-40B4-BE49-F238E27FC236}">
-                <a16:creationId xmlns:a16="http://schemas.microsoft.com/office/drawing/2014/main" id="{C30E51A0-29CA-4ADD-9397-21C60FE7224C}"/>
+                <a16:creationId xmlns:a16="http://schemas.microsoft.com/office/drawing/2014/main" xmlns="" id="{C30E51A0-29CA-4ADD-9397-21C60FE7224C}"/>
               </a:ext>
             </a:extLst>
           </p:cNvPr>
@@ -2250,7 +2252,7 @@
           <p:cNvPr id="3" name="Content Placeholder 2">
             <a:extLst>
               <a:ext uri="{FF2B5EF4-FFF2-40B4-BE49-F238E27FC236}">
-                <a16:creationId xmlns:a16="http://schemas.microsoft.com/office/drawing/2014/main" id="{AE4C1E59-EC49-477D-A7FA-8D17A544FD35}"/>
+                <a16:creationId xmlns:a16="http://schemas.microsoft.com/office/drawing/2014/main" xmlns="" id="{AE4C1E59-EC49-477D-A7FA-8D17A544FD35}"/>
               </a:ext>
             </a:extLst>
           </p:cNvPr>
@@ -2341,7 +2343,7 @@
           <p:cNvPr id="4" name="Text Placeholder 3">
             <a:extLst>
               <a:ext uri="{FF2B5EF4-FFF2-40B4-BE49-F238E27FC236}">
-                <a16:creationId xmlns:a16="http://schemas.microsoft.com/office/drawing/2014/main" id="{FB140F56-8F9C-46CC-A2A8-FC43BF1B9B5A}"/>
+                <a16:creationId xmlns:a16="http://schemas.microsoft.com/office/drawing/2014/main" xmlns="" id="{FB140F56-8F9C-46CC-A2A8-FC43BF1B9B5A}"/>
               </a:ext>
             </a:extLst>
           </p:cNvPr>
@@ -2412,7 +2414,7 @@
           <p:cNvPr id="5" name="Date Placeholder 4">
             <a:extLst>
               <a:ext uri="{FF2B5EF4-FFF2-40B4-BE49-F238E27FC236}">
-                <a16:creationId xmlns:a16="http://schemas.microsoft.com/office/drawing/2014/main" id="{31CABD1E-515F-40BE-8198-380231147539}"/>
+                <a16:creationId xmlns:a16="http://schemas.microsoft.com/office/drawing/2014/main" xmlns="" id="{31CABD1E-515F-40BE-8198-380231147539}"/>
               </a:ext>
             </a:extLst>
           </p:cNvPr>
@@ -2430,7 +2432,7 @@
           <a:p>
             <a:fld id="{D34E0433-A910-4A2C-B27B-93E80F26180A}" type="datetime1">
               <a:rPr lang="de-DE" smtClean="0"/>
-              <a:t>08.12.2019</a:t>
+              <a:t>09.12.2019</a:t>
             </a:fld>
             <a:endParaRPr lang="de-DE"/>
           </a:p>
@@ -2441,7 +2443,7 @@
           <p:cNvPr id="6" name="Footer Placeholder 5">
             <a:extLst>
               <a:ext uri="{FF2B5EF4-FFF2-40B4-BE49-F238E27FC236}">
-                <a16:creationId xmlns:a16="http://schemas.microsoft.com/office/drawing/2014/main" id="{2F6019DF-BD0B-472E-A976-8D5DB86E4E34}"/>
+                <a16:creationId xmlns:a16="http://schemas.microsoft.com/office/drawing/2014/main" xmlns="" id="{2F6019DF-BD0B-472E-A976-8D5DB86E4E34}"/>
               </a:ext>
             </a:extLst>
           </p:cNvPr>
@@ -2469,7 +2471,7 @@
           <p:cNvPr id="7" name="Slide Number Placeholder 6">
             <a:extLst>
               <a:ext uri="{FF2B5EF4-FFF2-40B4-BE49-F238E27FC236}">
-                <a16:creationId xmlns:a16="http://schemas.microsoft.com/office/drawing/2014/main" id="{E9F698EC-CC4D-4D69-967F-312E2662B149}"/>
+                <a16:creationId xmlns:a16="http://schemas.microsoft.com/office/drawing/2014/main" xmlns="" id="{E9F698EC-CC4D-4D69-967F-312E2662B149}"/>
               </a:ext>
             </a:extLst>
           </p:cNvPr>
@@ -2487,7 +2489,7 @@
           <a:p>
             <a:fld id="{969E759D-A893-4B96-8B48-96EE547EBC41}" type="slidenum">
               <a:rPr lang="de-DE" smtClean="0"/>
-              <a:t>‹#›</a:t>
+              <a:t>‹Nr.›</a:t>
             </a:fld>
             <a:endParaRPr lang="de-DE"/>
           </a:p>
@@ -2528,7 +2530,7 @@
           <p:cNvPr id="2" name="Title 1">
             <a:extLst>
               <a:ext uri="{FF2B5EF4-FFF2-40B4-BE49-F238E27FC236}">
-                <a16:creationId xmlns:a16="http://schemas.microsoft.com/office/drawing/2014/main" id="{3B4FFAA6-7E4F-476A-9070-0F7F2F3CF654}"/>
+                <a16:creationId xmlns:a16="http://schemas.microsoft.com/office/drawing/2014/main" xmlns="" id="{3B4FFAA6-7E4F-476A-9070-0F7F2F3CF654}"/>
               </a:ext>
             </a:extLst>
           </p:cNvPr>
@@ -2566,7 +2568,7 @@
           <p:cNvPr id="3" name="Picture Placeholder 2">
             <a:extLst>
               <a:ext uri="{FF2B5EF4-FFF2-40B4-BE49-F238E27FC236}">
-                <a16:creationId xmlns:a16="http://schemas.microsoft.com/office/drawing/2014/main" id="{818F1107-C63D-4182-B212-341F4BBF5995}"/>
+                <a16:creationId xmlns:a16="http://schemas.microsoft.com/office/drawing/2014/main" xmlns="" id="{818F1107-C63D-4182-B212-341F4BBF5995}"/>
               </a:ext>
             </a:extLst>
           </p:cNvPr>
@@ -2633,7 +2635,7 @@
           <p:cNvPr id="4" name="Text Placeholder 3">
             <a:extLst>
               <a:ext uri="{FF2B5EF4-FFF2-40B4-BE49-F238E27FC236}">
-                <a16:creationId xmlns:a16="http://schemas.microsoft.com/office/drawing/2014/main" id="{0726478D-FAFE-42F8-9655-7B1CEA64186D}"/>
+                <a16:creationId xmlns:a16="http://schemas.microsoft.com/office/drawing/2014/main" xmlns="" id="{0726478D-FAFE-42F8-9655-7B1CEA64186D}"/>
               </a:ext>
             </a:extLst>
           </p:cNvPr>
@@ -2704,7 +2706,7 @@
           <p:cNvPr id="5" name="Date Placeholder 4">
             <a:extLst>
               <a:ext uri="{FF2B5EF4-FFF2-40B4-BE49-F238E27FC236}">
-                <a16:creationId xmlns:a16="http://schemas.microsoft.com/office/drawing/2014/main" id="{4ED6872F-0A70-4D1D-A649-079E23BFC17B}"/>
+                <a16:creationId xmlns:a16="http://schemas.microsoft.com/office/drawing/2014/main" xmlns="" id="{4ED6872F-0A70-4D1D-A649-079E23BFC17B}"/>
               </a:ext>
             </a:extLst>
           </p:cNvPr>
@@ -2722,7 +2724,7 @@
           <a:p>
             <a:fld id="{27D0816D-89A7-4D5C-8256-1B20355E25D9}" type="datetime1">
               <a:rPr lang="de-DE" smtClean="0"/>
-              <a:t>08.12.2019</a:t>
+              <a:t>09.12.2019</a:t>
             </a:fld>
             <a:endParaRPr lang="de-DE"/>
           </a:p>
@@ -2733,7 +2735,7 @@
           <p:cNvPr id="6" name="Footer Placeholder 5">
             <a:extLst>
               <a:ext uri="{FF2B5EF4-FFF2-40B4-BE49-F238E27FC236}">
-                <a16:creationId xmlns:a16="http://schemas.microsoft.com/office/drawing/2014/main" id="{5312BCC0-13EB-4DA8-B39F-A5298CA93138}"/>
+                <a16:creationId xmlns:a16="http://schemas.microsoft.com/office/drawing/2014/main" xmlns="" id="{5312BCC0-13EB-4DA8-B39F-A5298CA93138}"/>
               </a:ext>
             </a:extLst>
           </p:cNvPr>
@@ -2761,7 +2763,7 @@
           <p:cNvPr id="7" name="Slide Number Placeholder 6">
             <a:extLst>
               <a:ext uri="{FF2B5EF4-FFF2-40B4-BE49-F238E27FC236}">
-                <a16:creationId xmlns:a16="http://schemas.microsoft.com/office/drawing/2014/main" id="{1F62339D-75FC-459B-A2F1-6975527E5692}"/>
+                <a16:creationId xmlns:a16="http://schemas.microsoft.com/office/drawing/2014/main" xmlns="" id="{1F62339D-75FC-459B-A2F1-6975527E5692}"/>
               </a:ext>
             </a:extLst>
           </p:cNvPr>
@@ -2779,7 +2781,7 @@
           <a:p>
             <a:fld id="{969E759D-A893-4B96-8B48-96EE547EBC41}" type="slidenum">
               <a:rPr lang="de-DE" smtClean="0"/>
-              <a:t>‹#›</a:t>
+              <a:t>‹Nr.›</a:t>
             </a:fld>
             <a:endParaRPr lang="de-DE"/>
           </a:p>
@@ -2825,7 +2827,7 @@
           <p:cNvPr id="2" name="Title Placeholder 1">
             <a:extLst>
               <a:ext uri="{FF2B5EF4-FFF2-40B4-BE49-F238E27FC236}">
-                <a16:creationId xmlns:a16="http://schemas.microsoft.com/office/drawing/2014/main" id="{EECCEAF9-517F-4246-89B4-773BBE3B5283}"/>
+                <a16:creationId xmlns:a16="http://schemas.microsoft.com/office/drawing/2014/main" xmlns="" id="{EECCEAF9-517F-4246-89B4-773BBE3B5283}"/>
               </a:ext>
             </a:extLst>
           </p:cNvPr>
@@ -2864,7 +2866,7 @@
           <p:cNvPr id="3" name="Text Placeholder 2">
             <a:extLst>
               <a:ext uri="{FF2B5EF4-FFF2-40B4-BE49-F238E27FC236}">
-                <a16:creationId xmlns:a16="http://schemas.microsoft.com/office/drawing/2014/main" id="{9A2C07FB-A743-4CFF-8DBA-B22A10466F8D}"/>
+                <a16:creationId xmlns:a16="http://schemas.microsoft.com/office/drawing/2014/main" xmlns="" id="{9A2C07FB-A743-4CFF-8DBA-B22A10466F8D}"/>
               </a:ext>
             </a:extLst>
           </p:cNvPr>
@@ -2932,7 +2934,7 @@
           <p:cNvPr id="4" name="Date Placeholder 3">
             <a:extLst>
               <a:ext uri="{FF2B5EF4-FFF2-40B4-BE49-F238E27FC236}">
-                <a16:creationId xmlns:a16="http://schemas.microsoft.com/office/drawing/2014/main" id="{3DE3EFD5-A9F8-4124-B4DE-1AEE565BA376}"/>
+                <a16:creationId xmlns:a16="http://schemas.microsoft.com/office/drawing/2014/main" xmlns="" id="{3DE3EFD5-A9F8-4124-B4DE-1AEE565BA376}"/>
               </a:ext>
             </a:extLst>
           </p:cNvPr>
@@ -2968,7 +2970,7 @@
           <a:p>
             <a:fld id="{96A0F86B-E49E-4FBD-A866-1ABC19B2F8A7}" type="datetime1">
               <a:rPr lang="de-DE" smtClean="0"/>
-              <a:t>08.12.2019</a:t>
+              <a:t>09.12.2019</a:t>
             </a:fld>
             <a:endParaRPr lang="de-DE"/>
           </a:p>
@@ -2979,7 +2981,7 @@
           <p:cNvPr id="5" name="Footer Placeholder 4">
             <a:extLst>
               <a:ext uri="{FF2B5EF4-FFF2-40B4-BE49-F238E27FC236}">
-                <a16:creationId xmlns:a16="http://schemas.microsoft.com/office/drawing/2014/main" id="{CB368404-65B1-4F0D-A1D3-FE6F60E99818}"/>
+                <a16:creationId xmlns:a16="http://schemas.microsoft.com/office/drawing/2014/main" xmlns="" id="{CB368404-65B1-4F0D-A1D3-FE6F60E99818}"/>
               </a:ext>
             </a:extLst>
           </p:cNvPr>
@@ -3025,7 +3027,7 @@
           <p:cNvPr id="6" name="Slide Number Placeholder 5">
             <a:extLst>
               <a:ext uri="{FF2B5EF4-FFF2-40B4-BE49-F238E27FC236}">
-                <a16:creationId xmlns:a16="http://schemas.microsoft.com/office/drawing/2014/main" id="{50F0220F-6B11-49AF-AB94-16FA52911A89}"/>
+                <a16:creationId xmlns:a16="http://schemas.microsoft.com/office/drawing/2014/main" xmlns="" id="{50F0220F-6B11-49AF-AB94-16FA52911A89}"/>
               </a:ext>
             </a:extLst>
           </p:cNvPr>
@@ -3061,7 +3063,7 @@
           <a:p>
             <a:fld id="{969E759D-A893-4B96-8B48-96EE547EBC41}" type="slidenum">
               <a:rPr lang="de-DE" smtClean="0"/>
-              <a:t>‹#›</a:t>
+              <a:t>‹Nr.›</a:t>
             </a:fld>
             <a:endParaRPr lang="de-DE"/>
           </a:p>
@@ -3402,7 +3404,7 @@
           <p:cNvPr id="1026" name="Picture 2" descr="Die Campusgebäude wurden mit einer Drohne von oben fotografiert.">
             <a:extLst>
               <a:ext uri="{FF2B5EF4-FFF2-40B4-BE49-F238E27FC236}">
-                <a16:creationId xmlns:a16="http://schemas.microsoft.com/office/drawing/2014/main" id="{BB1D137F-7550-416E-9165-30BB2E2EE823}"/>
+                <a16:creationId xmlns:a16="http://schemas.microsoft.com/office/drawing/2014/main" xmlns="" id="{BB1D137F-7550-416E-9165-30BB2E2EE823}"/>
               </a:ext>
             </a:extLst>
           </p:cNvPr>
@@ -3447,10 +3449,10 @@
           <p:cNvPr id="71" name="Freeform 5">
             <a:extLst>
               <a:ext uri="{FF2B5EF4-FFF2-40B4-BE49-F238E27FC236}">
-                <a16:creationId xmlns:a16="http://schemas.microsoft.com/office/drawing/2014/main" id="{87CC2527-562A-4F69-B487-4371E5B243E7}"/>
+                <a16:creationId xmlns:a16="http://schemas.microsoft.com/office/drawing/2014/main" xmlns="" id="{87CC2527-562A-4F69-B487-4371E5B243E7}"/>
               </a:ext>
               <a:ext uri="{C183D7F6-B498-43B3-948B-1728B52AA6E4}">
-                <adec:decorative xmlns:adec="http://schemas.microsoft.com/office/drawing/2017/decorative" val="1"/>
+                <adec:decorative xmlns:adec="http://schemas.microsoft.com/office/drawing/2017/decorative" xmlns="" val="1"/>
               </a:ext>
             </a:extLst>
           </p:cNvPr>
@@ -3460,7 +3462,7 @@
           <p:nvPr>
             <p:extLst>
               <p:ext uri="{386F3935-93C4-4BCD-93E2-E3B085C9AB24}">
-                <p16:designElem xmlns:p16="http://schemas.microsoft.com/office/powerpoint/2015/main" val="1"/>
+                <p16:designElem xmlns:p16="http://schemas.microsoft.com/office/powerpoint/2015/main" xmlns="" val="1"/>
               </p:ext>
             </p:extLst>
           </p:nvPr>
@@ -3610,7 +3612,7 @@
           <p:cNvPr id="2" name="Title 1">
             <a:extLst>
               <a:ext uri="{FF2B5EF4-FFF2-40B4-BE49-F238E27FC236}">
-                <a16:creationId xmlns:a16="http://schemas.microsoft.com/office/drawing/2014/main" id="{66A5DC1B-C9D0-4F34-9333-047D860C11A0}"/>
+                <a16:creationId xmlns:a16="http://schemas.microsoft.com/office/drawing/2014/main" xmlns="" id="{66A5DC1B-C9D0-4F34-9333-047D860C11A0}"/>
               </a:ext>
             </a:extLst>
           </p:cNvPr>
@@ -3650,7 +3652,7 @@
           <p:cNvPr id="3" name="Subtitle 2">
             <a:extLst>
               <a:ext uri="{FF2B5EF4-FFF2-40B4-BE49-F238E27FC236}">
-                <a16:creationId xmlns:a16="http://schemas.microsoft.com/office/drawing/2014/main" id="{42EC82C3-D779-4672-B134-327C720F0D8A}"/>
+                <a16:creationId xmlns:a16="http://schemas.microsoft.com/office/drawing/2014/main" xmlns="" id="{42EC82C3-D779-4672-B134-327C720F0D8A}"/>
               </a:ext>
             </a:extLst>
           </p:cNvPr>
@@ -3669,7 +3671,7 @@
         </p:spPr>
         <p:txBody>
           <a:bodyPr>
-            <a:normAutofit fontScale="92500" lnSpcReduction="20000"/>
+            <a:normAutofit fontScale="92500" lnSpcReduction="10000"/>
           </a:bodyPr>
           <a:lstStyle/>
           <a:p>
@@ -3700,10 +3702,10 @@
           <p:cNvPr id="73" name="Straight Connector 72">
             <a:extLst>
               <a:ext uri="{FF2B5EF4-FFF2-40B4-BE49-F238E27FC236}">
-                <a16:creationId xmlns:a16="http://schemas.microsoft.com/office/drawing/2014/main" id="{BCDAEC91-5BCE-4B55-9CC0-43EF94CB734B}"/>
+                <a16:creationId xmlns:a16="http://schemas.microsoft.com/office/drawing/2014/main" xmlns="" id="{BCDAEC91-5BCE-4B55-9CC0-43EF94CB734B}"/>
               </a:ext>
               <a:ext uri="{C183D7F6-B498-43B3-948B-1728B52AA6E4}">
-                <adec:decorative xmlns:adec="http://schemas.microsoft.com/office/drawing/2017/decorative" val="1"/>
+                <adec:decorative xmlns:adec="http://schemas.microsoft.com/office/drawing/2017/decorative" xmlns="" val="1"/>
               </a:ext>
             </a:extLst>
           </p:cNvPr>
@@ -3713,7 +3715,7 @@
           <p:nvPr>
             <p:extLst>
               <p:ext uri="{386F3935-93C4-4BCD-93E2-E3B085C9AB24}">
-                <p16:designElem xmlns:p16="http://schemas.microsoft.com/office/powerpoint/2015/main" val="1"/>
+                <p16:designElem xmlns:p16="http://schemas.microsoft.com/office/powerpoint/2015/main" xmlns="" val="1"/>
               </p:ext>
             </p:extLst>
           </p:nvPr>
@@ -3794,10 +3796,10 @@
           <p:cNvPr id="10" name="Rectangle 9">
             <a:extLst>
               <a:ext uri="{FF2B5EF4-FFF2-40B4-BE49-F238E27FC236}">
-                <a16:creationId xmlns:a16="http://schemas.microsoft.com/office/drawing/2014/main" id="{8D70B121-56F4-4848-B38B-182089D909FA}"/>
+                <a16:creationId xmlns:a16="http://schemas.microsoft.com/office/drawing/2014/main" xmlns="" id="{8D70B121-56F4-4848-B38B-182089D909FA}"/>
               </a:ext>
               <a:ext uri="{C183D7F6-B498-43B3-948B-1728B52AA6E4}">
-                <adec:decorative xmlns:adec="http://schemas.microsoft.com/office/drawing/2017/decorative" val="1"/>
+                <adec:decorative xmlns:adec="http://schemas.microsoft.com/office/drawing/2017/decorative" xmlns="" val="1"/>
               </a:ext>
             </a:extLst>
           </p:cNvPr>
@@ -3807,7 +3809,7 @@
           <p:nvPr>
             <p:extLst>
               <p:ext uri="{386F3935-93C4-4BCD-93E2-E3B085C9AB24}">
-                <p16:designElem xmlns:p16="http://schemas.microsoft.com/office/powerpoint/2015/main" val="1"/>
+                <p16:designElem xmlns:p16="http://schemas.microsoft.com/office/powerpoint/2015/main" xmlns="" val="1"/>
               </p:ext>
             </p:extLst>
           </p:nvPr>
@@ -3888,7 +3890,7 @@
           <p:cNvPr id="2" name="Title 1">
             <a:extLst>
               <a:ext uri="{FF2B5EF4-FFF2-40B4-BE49-F238E27FC236}">
-                <a16:creationId xmlns:a16="http://schemas.microsoft.com/office/drawing/2014/main" id="{ACE6EB8D-0A4F-46AA-AF64-E268DD01B696}"/>
+                <a16:creationId xmlns:a16="http://schemas.microsoft.com/office/drawing/2014/main" xmlns="" id="{ACE6EB8D-0A4F-46AA-AF64-E268DD01B696}"/>
               </a:ext>
             </a:extLst>
           </p:cNvPr>
@@ -3933,10 +3935,10 @@
           <p:cNvPr id="20" name="Straight Connector 11">
             <a:extLst>
               <a:ext uri="{FF2B5EF4-FFF2-40B4-BE49-F238E27FC236}">
-                <a16:creationId xmlns:a16="http://schemas.microsoft.com/office/drawing/2014/main" id="{2D72A2C9-F3CA-4216-8BAD-FA4C970C3C4E}"/>
+                <a16:creationId xmlns:a16="http://schemas.microsoft.com/office/drawing/2014/main" xmlns="" id="{2D72A2C9-F3CA-4216-8BAD-FA4C970C3C4E}"/>
               </a:ext>
               <a:ext uri="{C183D7F6-B498-43B3-948B-1728B52AA6E4}">
-                <adec:decorative xmlns:adec="http://schemas.microsoft.com/office/drawing/2017/decorative" val="1"/>
+                <adec:decorative xmlns:adec="http://schemas.microsoft.com/office/drawing/2017/decorative" xmlns="" val="1"/>
               </a:ext>
             </a:extLst>
           </p:cNvPr>
@@ -3946,7 +3948,7 @@
           <p:nvPr>
             <p:extLst>
               <p:ext uri="{386F3935-93C4-4BCD-93E2-E3B085C9AB24}">
-                <p16:designElem xmlns:p16="http://schemas.microsoft.com/office/powerpoint/2015/main" val="1"/>
+                <p16:designElem xmlns:p16="http://schemas.microsoft.com/office/powerpoint/2015/main" xmlns="" val="1"/>
               </p:ext>
             </p:extLst>
           </p:nvPr>
@@ -3988,7 +3990,7 @@
           <p:cNvPr id="21" name="Content Placeholder 2">
             <a:extLst>
               <a:ext uri="{FF2B5EF4-FFF2-40B4-BE49-F238E27FC236}">
-                <a16:creationId xmlns:a16="http://schemas.microsoft.com/office/drawing/2014/main" id="{58AE7285-2250-4AE8-93ED-187E4BCFFE55}"/>
+                <a16:creationId xmlns:a16="http://schemas.microsoft.com/office/drawing/2014/main" xmlns="" id="{58AE7285-2250-4AE8-93ED-187E4BCFFE55}"/>
               </a:ext>
             </a:extLst>
           </p:cNvPr>
@@ -4186,7 +4188,7 @@
           <p:cNvPr id="4" name="Footer Placeholder 3">
             <a:extLst>
               <a:ext uri="{FF2B5EF4-FFF2-40B4-BE49-F238E27FC236}">
-                <a16:creationId xmlns:a16="http://schemas.microsoft.com/office/drawing/2014/main" id="{49971016-FBB9-4FE9-A94D-721F4E0A6EF7}"/>
+                <a16:creationId xmlns:a16="http://schemas.microsoft.com/office/drawing/2014/main" xmlns="" id="{49971016-FBB9-4FE9-A94D-721F4E0A6EF7}"/>
               </a:ext>
             </a:extLst>
           </p:cNvPr>
@@ -4253,7 +4255,7 @@
           <p:cNvPr id="5" name="Slide Number Placeholder 4">
             <a:extLst>
               <a:ext uri="{FF2B5EF4-FFF2-40B4-BE49-F238E27FC236}">
-                <a16:creationId xmlns:a16="http://schemas.microsoft.com/office/drawing/2014/main" id="{D5EC5FDC-86E9-486E-98A5-8B49B12E54F7}"/>
+                <a16:creationId xmlns:a16="http://schemas.microsoft.com/office/drawing/2014/main" xmlns="" id="{D5EC5FDC-86E9-486E-98A5-8B49B12E54F7}"/>
               </a:ext>
             </a:extLst>
           </p:cNvPr>
@@ -4383,7 +4385,7 @@
           <p:cNvPr id="2" name="Title 1">
             <a:extLst>
               <a:ext uri="{FF2B5EF4-FFF2-40B4-BE49-F238E27FC236}">
-                <a16:creationId xmlns:a16="http://schemas.microsoft.com/office/drawing/2014/main" id="{15066376-BDA9-42B0-B399-BBF455FEAB84}"/>
+                <a16:creationId xmlns:a16="http://schemas.microsoft.com/office/drawing/2014/main" xmlns="" id="{15066376-BDA9-42B0-B399-BBF455FEAB84}"/>
               </a:ext>
             </a:extLst>
           </p:cNvPr>
@@ -4417,7 +4419,7 @@
           <p:cNvPr id="3" name="Content Placeholder 2">
             <a:extLst>
               <a:ext uri="{FF2B5EF4-FFF2-40B4-BE49-F238E27FC236}">
-                <a16:creationId xmlns:a16="http://schemas.microsoft.com/office/drawing/2014/main" id="{0FBAFCDA-66B7-4892-8C91-69D5101FD3EE}"/>
+                <a16:creationId xmlns:a16="http://schemas.microsoft.com/office/drawing/2014/main" xmlns="" id="{0FBAFCDA-66B7-4892-8C91-69D5101FD3EE}"/>
               </a:ext>
             </a:extLst>
           </p:cNvPr>
@@ -4571,7 +4573,7 @@
           <p:cNvPr id="4" name="Footer Placeholder 3">
             <a:extLst>
               <a:ext uri="{FF2B5EF4-FFF2-40B4-BE49-F238E27FC236}">
-                <a16:creationId xmlns:a16="http://schemas.microsoft.com/office/drawing/2014/main" id="{5F1B4AEF-1956-4FA4-AF17-52F5FA22EA93}"/>
+                <a16:creationId xmlns:a16="http://schemas.microsoft.com/office/drawing/2014/main" xmlns="" id="{5F1B4AEF-1956-4FA4-AF17-52F5FA22EA93}"/>
               </a:ext>
             </a:extLst>
           </p:cNvPr>
@@ -4605,7 +4607,7 @@
           <p:cNvPr id="5" name="Slide Number Placeholder 4">
             <a:extLst>
               <a:ext uri="{FF2B5EF4-FFF2-40B4-BE49-F238E27FC236}">
-                <a16:creationId xmlns:a16="http://schemas.microsoft.com/office/drawing/2014/main" id="{D87CE355-2B04-4F17-8E3C-AE813E70FDE4}"/>
+                <a16:creationId xmlns:a16="http://schemas.microsoft.com/office/drawing/2014/main" xmlns="" id="{D87CE355-2B04-4F17-8E3C-AE813E70FDE4}"/>
               </a:ext>
             </a:extLst>
           </p:cNvPr>
@@ -4677,7 +4679,7 @@
           <p:cNvPr id="2" name="Title 1">
             <a:extLst>
               <a:ext uri="{FF2B5EF4-FFF2-40B4-BE49-F238E27FC236}">
-                <a16:creationId xmlns:a16="http://schemas.microsoft.com/office/drawing/2014/main" id="{0754DA76-FBA9-4255-9F8F-DBD2A5E204F0}"/>
+                <a16:creationId xmlns:a16="http://schemas.microsoft.com/office/drawing/2014/main" xmlns="" id="{0754DA76-FBA9-4255-9F8F-DBD2A5E204F0}"/>
               </a:ext>
             </a:extLst>
           </p:cNvPr>
@@ -4713,7 +4715,7 @@
           <p:cNvPr id="7" name="Picture 6" descr="A screenshot of a cell phone&#10;&#10;Description automatically generated">
             <a:extLst>
               <a:ext uri="{FF2B5EF4-FFF2-40B4-BE49-F238E27FC236}">
-                <a16:creationId xmlns:a16="http://schemas.microsoft.com/office/drawing/2014/main" id="{ABEF1177-6BDC-4C82-AAB5-58804151FB71}"/>
+                <a16:creationId xmlns:a16="http://schemas.microsoft.com/office/drawing/2014/main" xmlns="" id="{ABEF1177-6BDC-4C82-AAB5-58804151FB71}"/>
               </a:ext>
             </a:extLst>
           </p:cNvPr>
@@ -4749,10 +4751,10 @@
           <p:cNvPr id="12" name="Freeform: Shape 11">
             <a:extLst>
               <a:ext uri="{FF2B5EF4-FFF2-40B4-BE49-F238E27FC236}">
-                <a16:creationId xmlns:a16="http://schemas.microsoft.com/office/drawing/2014/main" id="{C607803A-4E99-444E-94F7-8785CDDF5849}"/>
+                <a16:creationId xmlns:a16="http://schemas.microsoft.com/office/drawing/2014/main" xmlns="" id="{C607803A-4E99-444E-94F7-8785CDDF5849}"/>
               </a:ext>
               <a:ext uri="{C183D7F6-B498-43B3-948B-1728B52AA6E4}">
-                <adec:decorative xmlns:adec="http://schemas.microsoft.com/office/drawing/2017/decorative" val="1"/>
+                <adec:decorative xmlns:adec="http://schemas.microsoft.com/office/drawing/2017/decorative" xmlns="" val="1"/>
               </a:ext>
             </a:extLst>
           </p:cNvPr>
@@ -4762,7 +4764,7 @@
           <p:nvPr>
             <p:extLst>
               <p:ext uri="{386F3935-93C4-4BCD-93E2-E3B085C9AB24}">
-                <p16:designElem xmlns:p16="http://schemas.microsoft.com/office/powerpoint/2015/main" val="1"/>
+                <p16:designElem xmlns:p16="http://schemas.microsoft.com/office/powerpoint/2015/main" xmlns="" val="1"/>
               </p:ext>
             </p:extLst>
           </p:nvPr>
@@ -4853,10 +4855,10 @@
           <p:cNvPr id="14" name="Freeform: Shape 13">
             <a:extLst>
               <a:ext uri="{FF2B5EF4-FFF2-40B4-BE49-F238E27FC236}">
-                <a16:creationId xmlns:a16="http://schemas.microsoft.com/office/drawing/2014/main" id="{2989BE6A-C309-418E-8ADD-1616A980570D}"/>
+                <a16:creationId xmlns:a16="http://schemas.microsoft.com/office/drawing/2014/main" xmlns="" id="{2989BE6A-C309-418E-8ADD-1616A980570D}"/>
               </a:ext>
               <a:ext uri="{C183D7F6-B498-43B3-948B-1728B52AA6E4}">
-                <adec:decorative xmlns:adec="http://schemas.microsoft.com/office/drawing/2017/decorative" val="1"/>
+                <adec:decorative xmlns:adec="http://schemas.microsoft.com/office/drawing/2017/decorative" xmlns="" val="1"/>
               </a:ext>
             </a:extLst>
           </p:cNvPr>
@@ -4866,7 +4868,7 @@
           <p:nvPr>
             <p:extLst>
               <p:ext uri="{386F3935-93C4-4BCD-93E2-E3B085C9AB24}">
-                <p16:designElem xmlns:p16="http://schemas.microsoft.com/office/powerpoint/2015/main" val="1"/>
+                <p16:designElem xmlns:p16="http://schemas.microsoft.com/office/powerpoint/2015/main" xmlns="" val="1"/>
               </p:ext>
             </p:extLst>
           </p:nvPr>
@@ -4994,7 +4996,7 @@
           <p:cNvPr id="3" name="Content Placeholder 2">
             <a:extLst>
               <a:ext uri="{FF2B5EF4-FFF2-40B4-BE49-F238E27FC236}">
-                <a16:creationId xmlns:a16="http://schemas.microsoft.com/office/drawing/2014/main" id="{A42C7976-7264-4148-AD03-59E4B4F7C697}"/>
+                <a16:creationId xmlns:a16="http://schemas.microsoft.com/office/drawing/2014/main" xmlns="" id="{A42C7976-7264-4148-AD03-59E4B4F7C697}"/>
               </a:ext>
             </a:extLst>
           </p:cNvPr>
@@ -5089,7 +5091,7 @@
           <p:cNvPr id="4" name="Footer Placeholder 3">
             <a:extLst>
               <a:ext uri="{FF2B5EF4-FFF2-40B4-BE49-F238E27FC236}">
-                <a16:creationId xmlns:a16="http://schemas.microsoft.com/office/drawing/2014/main" id="{E4E0C278-526A-4003-B85A-72429B341BB6}"/>
+                <a16:creationId xmlns:a16="http://schemas.microsoft.com/office/drawing/2014/main" xmlns="" id="{E4E0C278-526A-4003-B85A-72429B341BB6}"/>
               </a:ext>
             </a:extLst>
           </p:cNvPr>
@@ -5135,7 +5137,7 @@
           <p:cNvPr id="5" name="Slide Number Placeholder 4">
             <a:extLst>
               <a:ext uri="{FF2B5EF4-FFF2-40B4-BE49-F238E27FC236}">
-                <a16:creationId xmlns:a16="http://schemas.microsoft.com/office/drawing/2014/main" id="{A92E81ED-7F21-418B-B91B-7B27BAA6E5C0}"/>
+                <a16:creationId xmlns:a16="http://schemas.microsoft.com/office/drawing/2014/main" xmlns="" id="{A92E81ED-7F21-418B-B91B-7B27BAA6E5C0}"/>
               </a:ext>
             </a:extLst>
           </p:cNvPr>
@@ -5231,7 +5233,7 @@
           <p:cNvPr id="2" name="Title 1">
             <a:extLst>
               <a:ext uri="{FF2B5EF4-FFF2-40B4-BE49-F238E27FC236}">
-                <a16:creationId xmlns:a16="http://schemas.microsoft.com/office/drawing/2014/main" id="{D0F7DBBA-40E4-45A3-ACD0-6F25C32BF6C6}"/>
+                <a16:creationId xmlns:a16="http://schemas.microsoft.com/office/drawing/2014/main" xmlns="" id="{D0F7DBBA-40E4-45A3-ACD0-6F25C32BF6C6}"/>
               </a:ext>
             </a:extLst>
           </p:cNvPr>
@@ -5267,7 +5269,7 @@
           <p:cNvPr id="11" name="Picture 10" descr="A screenshot of a cell phone&#10;&#10;Description automatically generated">
             <a:extLst>
               <a:ext uri="{FF2B5EF4-FFF2-40B4-BE49-F238E27FC236}">
-                <a16:creationId xmlns:a16="http://schemas.microsoft.com/office/drawing/2014/main" id="{EC8D9439-AB1B-4EEA-8BA5-227492613A4C}"/>
+                <a16:creationId xmlns:a16="http://schemas.microsoft.com/office/drawing/2014/main" xmlns="" id="{EC8D9439-AB1B-4EEA-8BA5-227492613A4C}"/>
               </a:ext>
             </a:extLst>
           </p:cNvPr>
@@ -5303,10 +5305,10 @@
           <p:cNvPr id="19" name="Freeform: Shape 15">
             <a:extLst>
               <a:ext uri="{FF2B5EF4-FFF2-40B4-BE49-F238E27FC236}">
-                <a16:creationId xmlns:a16="http://schemas.microsoft.com/office/drawing/2014/main" id="{C607803A-4E99-444E-94F7-8785CDDF5849}"/>
+                <a16:creationId xmlns:a16="http://schemas.microsoft.com/office/drawing/2014/main" xmlns="" id="{C607803A-4E99-444E-94F7-8785CDDF5849}"/>
               </a:ext>
               <a:ext uri="{C183D7F6-B498-43B3-948B-1728B52AA6E4}">
-                <adec:decorative xmlns:adec="http://schemas.microsoft.com/office/drawing/2017/decorative" val="1"/>
+                <adec:decorative xmlns:adec="http://schemas.microsoft.com/office/drawing/2017/decorative" xmlns="" val="1"/>
               </a:ext>
             </a:extLst>
           </p:cNvPr>
@@ -5316,7 +5318,7 @@
           <p:nvPr>
             <p:extLst>
               <p:ext uri="{386F3935-93C4-4BCD-93E2-E3B085C9AB24}">
-                <p16:designElem xmlns:p16="http://schemas.microsoft.com/office/powerpoint/2015/main" val="1"/>
+                <p16:designElem xmlns:p16="http://schemas.microsoft.com/office/powerpoint/2015/main" xmlns="" val="1"/>
               </p:ext>
             </p:extLst>
           </p:nvPr>
@@ -5407,10 +5409,10 @@
           <p:cNvPr id="18" name="Freeform: Shape 17">
             <a:extLst>
               <a:ext uri="{FF2B5EF4-FFF2-40B4-BE49-F238E27FC236}">
-                <a16:creationId xmlns:a16="http://schemas.microsoft.com/office/drawing/2014/main" id="{2989BE6A-C309-418E-8ADD-1616A980570D}"/>
+                <a16:creationId xmlns:a16="http://schemas.microsoft.com/office/drawing/2014/main" xmlns="" id="{2989BE6A-C309-418E-8ADD-1616A980570D}"/>
               </a:ext>
               <a:ext uri="{C183D7F6-B498-43B3-948B-1728B52AA6E4}">
-                <adec:decorative xmlns:adec="http://schemas.microsoft.com/office/drawing/2017/decorative" val="1"/>
+                <adec:decorative xmlns:adec="http://schemas.microsoft.com/office/drawing/2017/decorative" xmlns="" val="1"/>
               </a:ext>
             </a:extLst>
           </p:cNvPr>
@@ -5420,7 +5422,7 @@
           <p:nvPr>
             <p:extLst>
               <p:ext uri="{386F3935-93C4-4BCD-93E2-E3B085C9AB24}">
-                <p16:designElem xmlns:p16="http://schemas.microsoft.com/office/powerpoint/2015/main" val="1"/>
+                <p16:designElem xmlns:p16="http://schemas.microsoft.com/office/powerpoint/2015/main" xmlns="" val="1"/>
               </p:ext>
             </p:extLst>
           </p:nvPr>
@@ -5548,7 +5550,7 @@
           <p:cNvPr id="9" name="Content Placeholder 8">
             <a:extLst>
               <a:ext uri="{FF2B5EF4-FFF2-40B4-BE49-F238E27FC236}">
-                <a16:creationId xmlns:a16="http://schemas.microsoft.com/office/drawing/2014/main" id="{020673C7-CB6D-4F67-ABF0-DE2C50E51566}"/>
+                <a16:creationId xmlns:a16="http://schemas.microsoft.com/office/drawing/2014/main" xmlns="" id="{020673C7-CB6D-4F67-ABF0-DE2C50E51566}"/>
               </a:ext>
             </a:extLst>
           </p:cNvPr>
@@ -5589,7 +5591,7 @@
           <p:cNvPr id="4" name="Footer Placeholder 3">
             <a:extLst>
               <a:ext uri="{FF2B5EF4-FFF2-40B4-BE49-F238E27FC236}">
-                <a16:creationId xmlns:a16="http://schemas.microsoft.com/office/drawing/2014/main" id="{5E901347-E5AB-4A86-8D5E-33FABF95AA3A}"/>
+                <a16:creationId xmlns:a16="http://schemas.microsoft.com/office/drawing/2014/main" xmlns="" id="{5E901347-E5AB-4A86-8D5E-33FABF95AA3A}"/>
               </a:ext>
             </a:extLst>
           </p:cNvPr>
@@ -5635,7 +5637,7 @@
           <p:cNvPr id="5" name="Slide Number Placeholder 4">
             <a:extLst>
               <a:ext uri="{FF2B5EF4-FFF2-40B4-BE49-F238E27FC236}">
-                <a16:creationId xmlns:a16="http://schemas.microsoft.com/office/drawing/2014/main" id="{409F682C-D2C9-4003-BF7F-EDBFC5A4DF22}"/>
+                <a16:creationId xmlns:a16="http://schemas.microsoft.com/office/drawing/2014/main" xmlns="" id="{409F682C-D2C9-4003-BF7F-EDBFC5A4DF22}"/>
               </a:ext>
             </a:extLst>
           </p:cNvPr>
@@ -5731,7 +5733,7 @@
           <p:cNvPr id="2" name="Title 1">
             <a:extLst>
               <a:ext uri="{FF2B5EF4-FFF2-40B4-BE49-F238E27FC236}">
-                <a16:creationId xmlns:a16="http://schemas.microsoft.com/office/drawing/2014/main" id="{7FB8FAAD-55D4-4F7B-A3E3-56C2607E59AC}"/>
+                <a16:creationId xmlns:a16="http://schemas.microsoft.com/office/drawing/2014/main" xmlns="" id="{7FB8FAAD-55D4-4F7B-A3E3-56C2607E59AC}"/>
               </a:ext>
             </a:extLst>
           </p:cNvPr>
@@ -5767,7 +5769,7 @@
           <p:cNvPr id="7" name="Content Placeholder 6" descr="A screenshot of a cell phone&#10;&#10;Description automatically generated">
             <a:extLst>
               <a:ext uri="{FF2B5EF4-FFF2-40B4-BE49-F238E27FC236}">
-                <a16:creationId xmlns:a16="http://schemas.microsoft.com/office/drawing/2014/main" id="{D42E2C0D-B957-49ED-A36D-F2E34026D6B7}"/>
+                <a16:creationId xmlns:a16="http://schemas.microsoft.com/office/drawing/2014/main" xmlns="" id="{D42E2C0D-B957-49ED-A36D-F2E34026D6B7}"/>
               </a:ext>
             </a:extLst>
           </p:cNvPr>
@@ -5803,10 +5805,10 @@
           <p:cNvPr id="14" name="Freeform: Shape 13">
             <a:extLst>
               <a:ext uri="{FF2B5EF4-FFF2-40B4-BE49-F238E27FC236}">
-                <a16:creationId xmlns:a16="http://schemas.microsoft.com/office/drawing/2014/main" id="{C607803A-4E99-444E-94F7-8785CDDF5849}"/>
+                <a16:creationId xmlns:a16="http://schemas.microsoft.com/office/drawing/2014/main" xmlns="" id="{C607803A-4E99-444E-94F7-8785CDDF5849}"/>
               </a:ext>
               <a:ext uri="{C183D7F6-B498-43B3-948B-1728B52AA6E4}">
-                <adec:decorative xmlns:adec="http://schemas.microsoft.com/office/drawing/2017/decorative" val="1"/>
+                <adec:decorative xmlns:adec="http://schemas.microsoft.com/office/drawing/2017/decorative" xmlns="" val="1"/>
               </a:ext>
             </a:extLst>
           </p:cNvPr>
@@ -5816,7 +5818,7 @@
           <p:nvPr>
             <p:extLst>
               <p:ext uri="{386F3935-93C4-4BCD-93E2-E3B085C9AB24}">
-                <p16:designElem xmlns:p16="http://schemas.microsoft.com/office/powerpoint/2015/main" val="1"/>
+                <p16:designElem xmlns:p16="http://schemas.microsoft.com/office/powerpoint/2015/main" xmlns="" val="1"/>
               </p:ext>
             </p:extLst>
           </p:nvPr>
@@ -5907,10 +5909,10 @@
           <p:cNvPr id="16" name="Freeform: Shape 15">
             <a:extLst>
               <a:ext uri="{FF2B5EF4-FFF2-40B4-BE49-F238E27FC236}">
-                <a16:creationId xmlns:a16="http://schemas.microsoft.com/office/drawing/2014/main" id="{2989BE6A-C309-418E-8ADD-1616A980570D}"/>
+                <a16:creationId xmlns:a16="http://schemas.microsoft.com/office/drawing/2014/main" xmlns="" id="{2989BE6A-C309-418E-8ADD-1616A980570D}"/>
               </a:ext>
               <a:ext uri="{C183D7F6-B498-43B3-948B-1728B52AA6E4}">
-                <adec:decorative xmlns:adec="http://schemas.microsoft.com/office/drawing/2017/decorative" val="1"/>
+                <adec:decorative xmlns:adec="http://schemas.microsoft.com/office/drawing/2017/decorative" xmlns="" val="1"/>
               </a:ext>
             </a:extLst>
           </p:cNvPr>
@@ -5920,7 +5922,7 @@
           <p:nvPr>
             <p:extLst>
               <p:ext uri="{386F3935-93C4-4BCD-93E2-E3B085C9AB24}">
-                <p16:designElem xmlns:p16="http://schemas.microsoft.com/office/powerpoint/2015/main" val="1"/>
+                <p16:designElem xmlns:p16="http://schemas.microsoft.com/office/powerpoint/2015/main" xmlns="" val="1"/>
               </p:ext>
             </p:extLst>
           </p:nvPr>
@@ -6048,7 +6050,7 @@
           <p:cNvPr id="11" name="Content Placeholder 10">
             <a:extLst>
               <a:ext uri="{FF2B5EF4-FFF2-40B4-BE49-F238E27FC236}">
-                <a16:creationId xmlns:a16="http://schemas.microsoft.com/office/drawing/2014/main" id="{8DC07883-6FEB-4246-BFE9-889DDCF1DD98}"/>
+                <a16:creationId xmlns:a16="http://schemas.microsoft.com/office/drawing/2014/main" xmlns="" id="{8DC07883-6FEB-4246-BFE9-889DDCF1DD98}"/>
               </a:ext>
             </a:extLst>
           </p:cNvPr>
@@ -6119,7 +6121,7 @@
           <p:cNvPr id="4" name="Footer Placeholder 3">
             <a:extLst>
               <a:ext uri="{FF2B5EF4-FFF2-40B4-BE49-F238E27FC236}">
-                <a16:creationId xmlns:a16="http://schemas.microsoft.com/office/drawing/2014/main" id="{4F1639C5-FA60-4BF7-98BA-05F3753189A9}"/>
+                <a16:creationId xmlns:a16="http://schemas.microsoft.com/office/drawing/2014/main" xmlns="" id="{4F1639C5-FA60-4BF7-98BA-05F3753189A9}"/>
               </a:ext>
             </a:extLst>
           </p:cNvPr>
@@ -6165,7 +6167,7 @@
           <p:cNvPr id="5" name="Slide Number Placeholder 4">
             <a:extLst>
               <a:ext uri="{FF2B5EF4-FFF2-40B4-BE49-F238E27FC236}">
-                <a16:creationId xmlns:a16="http://schemas.microsoft.com/office/drawing/2014/main" id="{A6093915-6888-4B2E-A7DB-162E0D0C61DB}"/>
+                <a16:creationId xmlns:a16="http://schemas.microsoft.com/office/drawing/2014/main" xmlns="" id="{A6093915-6888-4B2E-A7DB-162E0D0C61DB}"/>
               </a:ext>
             </a:extLst>
           </p:cNvPr>
@@ -6222,6 +6224,288 @@
     <p:extLst>
       <p:ext uri="{BB962C8B-B14F-4D97-AF65-F5344CB8AC3E}">
         <p14:creationId xmlns:p14="http://schemas.microsoft.com/office/powerpoint/2010/main" val="20718558"/>
+      </p:ext>
+    </p:extLst>
+  </p:cSld>
+  <p:clrMapOvr>
+    <a:masterClrMapping/>
+  </p:clrMapOvr>
+</p:sld>
+</file>
+
+<file path=ppt/slides/slide7.xml><?xml version="1.0" encoding="utf-8"?>
+<p:sld xmlns:a="http://schemas.openxmlformats.org/drawingml/2006/main" xmlns:r="http://schemas.openxmlformats.org/officeDocument/2006/relationships" xmlns:p="http://schemas.openxmlformats.org/presentationml/2006/main">
+  <p:cSld>
+    <p:spTree>
+      <p:nvGrpSpPr>
+        <p:cNvPr id="1" name=""/>
+        <p:cNvGrpSpPr/>
+        <p:nvPr/>
+      </p:nvGrpSpPr>
+      <p:grpSpPr>
+        <a:xfrm>
+          <a:off x="0" y="0"/>
+          <a:ext cx="0" cy="0"/>
+          <a:chOff x="0" y="0"/>
+          <a:chExt cx="0" cy="0"/>
+        </a:xfrm>
+      </p:grpSpPr>
+      <p:sp>
+        <p:nvSpPr>
+          <p:cNvPr id="2" name="Titel 1"/>
+          <p:cNvSpPr>
+            <a:spLocks noGrp="1"/>
+          </p:cNvSpPr>
+          <p:nvPr>
+            <p:ph type="title"/>
+          </p:nvPr>
+        </p:nvSpPr>
+        <p:spPr/>
+        <p:txBody>
+          <a:bodyPr/>
+          <a:lstStyle/>
+          <a:p>
+            <a:r>
+              <a:rPr lang="de-DE" dirty="0" smtClean="0"/>
+              <a:t>Ausblick</a:t>
+            </a:r>
+            <a:endParaRPr lang="de-DE" dirty="0"/>
+          </a:p>
+        </p:txBody>
+      </p:sp>
+      <p:sp>
+        <p:nvSpPr>
+          <p:cNvPr id="3" name="Inhaltsplatzhalter 2"/>
+          <p:cNvSpPr>
+            <a:spLocks noGrp="1"/>
+          </p:cNvSpPr>
+          <p:nvPr>
+            <p:ph idx="1"/>
+          </p:nvPr>
+        </p:nvSpPr>
+        <p:spPr/>
+        <p:txBody>
+          <a:bodyPr/>
+          <a:lstStyle/>
+          <a:p>
+            <a:r>
+              <a:rPr lang="de-DE" dirty="0" smtClean="0"/>
+              <a:t>Fertigstellung der Moduldetailseite</a:t>
+            </a:r>
+          </a:p>
+          <a:p>
+            <a:r>
+              <a:rPr lang="de-DE" dirty="0" smtClean="0"/>
+              <a:t>Modul-Upload Seite</a:t>
+            </a:r>
+          </a:p>
+          <a:p>
+            <a:r>
+              <a:rPr lang="de-DE" dirty="0" smtClean="0"/>
+              <a:t>Dokumentation</a:t>
+            </a:r>
+          </a:p>
+          <a:p>
+            <a:r>
+              <a:rPr lang="de-DE" dirty="0" smtClean="0"/>
+              <a:t>Projektbericht</a:t>
+            </a:r>
+          </a:p>
+        </p:txBody>
+      </p:sp>
+      <p:sp>
+        <p:nvSpPr>
+          <p:cNvPr id="4" name="Fußzeilenplatzhalter 3"/>
+          <p:cNvSpPr>
+            <a:spLocks noGrp="1"/>
+          </p:cNvSpPr>
+          <p:nvPr>
+            <p:ph type="ftr" sz="quarter" idx="11"/>
+          </p:nvPr>
+        </p:nvSpPr>
+        <p:spPr/>
+        <p:txBody>
+          <a:bodyPr/>
+          <a:lstStyle/>
+          <a:p>
+            <a:r>
+              <a:rPr lang="de-DE" smtClean="0"/>
+              <a:t>WS19/20 - PV-Modulportal - Rüffer, Vorwerk, Withöft, Zolkin</a:t>
+            </a:r>
+            <a:endParaRPr lang="de-DE"/>
+          </a:p>
+        </p:txBody>
+      </p:sp>
+      <p:sp>
+        <p:nvSpPr>
+          <p:cNvPr id="5" name="Foliennummernplatzhalter 4"/>
+          <p:cNvSpPr>
+            <a:spLocks noGrp="1"/>
+          </p:cNvSpPr>
+          <p:nvPr>
+            <p:ph type="sldNum" sz="quarter" idx="12"/>
+          </p:nvPr>
+        </p:nvSpPr>
+        <p:spPr/>
+        <p:txBody>
+          <a:bodyPr/>
+          <a:lstStyle/>
+          <a:p>
+            <a:fld id="{969E759D-A893-4B96-8B48-96EE547EBC41}" type="slidenum">
+              <a:rPr lang="de-DE" smtClean="0"/>
+              <a:t>7</a:t>
+            </a:fld>
+            <a:endParaRPr lang="de-DE"/>
+          </a:p>
+        </p:txBody>
+      </p:sp>
+    </p:spTree>
+    <p:extLst>
+      <p:ext uri="{BB962C8B-B14F-4D97-AF65-F5344CB8AC3E}">
+        <p14:creationId xmlns:p14="http://schemas.microsoft.com/office/powerpoint/2010/main" val="3786423145"/>
+      </p:ext>
+    </p:extLst>
+  </p:cSld>
+  <p:clrMapOvr>
+    <a:masterClrMapping/>
+  </p:clrMapOvr>
+</p:sld>
+</file>
+
+<file path=ppt/slides/slide8.xml><?xml version="1.0" encoding="utf-8"?>
+<p:sld xmlns:a="http://schemas.openxmlformats.org/drawingml/2006/main" xmlns:r="http://schemas.openxmlformats.org/officeDocument/2006/relationships" xmlns:p="http://schemas.openxmlformats.org/presentationml/2006/main">
+  <p:cSld>
+    <p:spTree>
+      <p:nvGrpSpPr>
+        <p:cNvPr id="1" name=""/>
+        <p:cNvGrpSpPr/>
+        <p:nvPr/>
+      </p:nvGrpSpPr>
+      <p:grpSpPr>
+        <a:xfrm>
+          <a:off x="0" y="0"/>
+          <a:ext cx="0" cy="0"/>
+          <a:chOff x="0" y="0"/>
+          <a:chExt cx="0" cy="0"/>
+        </a:xfrm>
+      </p:grpSpPr>
+      <p:sp>
+        <p:nvSpPr>
+          <p:cNvPr id="2" name="Titel 1"/>
+          <p:cNvSpPr>
+            <a:spLocks noGrp="1"/>
+          </p:cNvSpPr>
+          <p:nvPr>
+            <p:ph type="title"/>
+          </p:nvPr>
+        </p:nvSpPr>
+        <p:spPr/>
+        <p:txBody>
+          <a:bodyPr/>
+          <a:lstStyle/>
+          <a:p>
+            <a:r>
+              <a:rPr lang="de-DE" dirty="0" smtClean="0"/>
+              <a:t>Fazit</a:t>
+            </a:r>
+            <a:endParaRPr lang="de-DE" dirty="0"/>
+          </a:p>
+        </p:txBody>
+      </p:sp>
+      <p:sp>
+        <p:nvSpPr>
+          <p:cNvPr id="3" name="Inhaltsplatzhalter 2"/>
+          <p:cNvSpPr>
+            <a:spLocks noGrp="1"/>
+          </p:cNvSpPr>
+          <p:nvPr>
+            <p:ph idx="1"/>
+          </p:nvPr>
+        </p:nvSpPr>
+        <p:spPr/>
+        <p:txBody>
+          <a:bodyPr/>
+          <a:lstStyle/>
+          <a:p>
+            <a:r>
+              <a:rPr lang="de-DE" dirty="0" smtClean="0"/>
+              <a:t>Erstellung des Grob- und Feinkonzepts zu Beginn war sehr hilfreich</a:t>
+            </a:r>
+          </a:p>
+          <a:p>
+            <a:r>
+              <a:rPr lang="de-DE" dirty="0" smtClean="0"/>
+              <a:t>Kommunikation im Team und Gruppendynamik war gut</a:t>
+            </a:r>
+          </a:p>
+          <a:p>
+            <a:r>
+              <a:rPr lang="de-DE" dirty="0" smtClean="0"/>
+              <a:t>Planung war zum Teil schwierig</a:t>
+            </a:r>
+          </a:p>
+          <a:p>
+            <a:r>
+              <a:rPr lang="de-DE" smtClean="0"/>
+              <a:t>Missverständnisse bei den Anforderungen</a:t>
+            </a:r>
+            <a:endParaRPr lang="de-DE" dirty="0" smtClean="0"/>
+          </a:p>
+          <a:p>
+            <a:endParaRPr lang="de-DE" dirty="0"/>
+          </a:p>
+        </p:txBody>
+      </p:sp>
+      <p:sp>
+        <p:nvSpPr>
+          <p:cNvPr id="4" name="Fußzeilenplatzhalter 3"/>
+          <p:cNvSpPr>
+            <a:spLocks noGrp="1"/>
+          </p:cNvSpPr>
+          <p:nvPr>
+            <p:ph type="ftr" sz="quarter" idx="11"/>
+          </p:nvPr>
+        </p:nvSpPr>
+        <p:spPr/>
+        <p:txBody>
+          <a:bodyPr/>
+          <a:lstStyle/>
+          <a:p>
+            <a:r>
+              <a:rPr lang="de-DE" smtClean="0"/>
+              <a:t>WS19/20 - PV-Modulportal - Rüffer, Vorwerk, Withöft, Zolkin</a:t>
+            </a:r>
+            <a:endParaRPr lang="de-DE"/>
+          </a:p>
+        </p:txBody>
+      </p:sp>
+      <p:sp>
+        <p:nvSpPr>
+          <p:cNvPr id="5" name="Foliennummernplatzhalter 4"/>
+          <p:cNvSpPr>
+            <a:spLocks noGrp="1"/>
+          </p:cNvSpPr>
+          <p:nvPr>
+            <p:ph type="sldNum" sz="quarter" idx="12"/>
+          </p:nvPr>
+        </p:nvSpPr>
+        <p:spPr/>
+        <p:txBody>
+          <a:bodyPr/>
+          <a:lstStyle/>
+          <a:p>
+            <a:fld id="{969E759D-A893-4B96-8B48-96EE547EBC41}" type="slidenum">
+              <a:rPr lang="de-DE" smtClean="0"/>
+              <a:t>8</a:t>
+            </a:fld>
+            <a:endParaRPr lang="de-DE"/>
+          </a:p>
+        </p:txBody>
+      </p:sp>
+    </p:spTree>
+    <p:extLst>
+      <p:ext uri="{BB962C8B-B14F-4D97-AF65-F5344CB8AC3E}">
+        <p14:creationId xmlns:p14="http://schemas.microsoft.com/office/powerpoint/2010/main" val="2130456695"/>
       </p:ext>
     </p:extLst>
   </p:cSld>

</xml_diff>

<commit_message>
Added code examples for search
</commit_message>
<xml_diff>
--- a/docs/Seminarvortrag.pptx
+++ b/docs/Seminarvortrag.pptx
@@ -11,8 +11,10 @@
     <p:sldId id="261" r:id="rId5"/>
     <p:sldId id="260" r:id="rId6"/>
     <p:sldId id="262" r:id="rId7"/>
-    <p:sldId id="263" r:id="rId8"/>
-    <p:sldId id="264" r:id="rId9"/>
+    <p:sldId id="265" r:id="rId8"/>
+    <p:sldId id="267" r:id="rId9"/>
+    <p:sldId id="263" r:id="rId10"/>
+    <p:sldId id="264" r:id="rId11"/>
   </p:sldIdLst>
   <p:sldSz cx="12192000" cy="6858000"/>
   <p:notesSz cx="6858000" cy="9144000"/>
@@ -141,7 +143,7 @@
           <p:cNvPr id="2" name="Title 1">
             <a:extLst>
               <a:ext uri="{FF2B5EF4-FFF2-40B4-BE49-F238E27FC236}">
-                <a16:creationId xmlns:a16="http://schemas.microsoft.com/office/drawing/2014/main" xmlns="" id="{046DBCE4-E0EF-4FEE-80D5-A702C3556002}"/>
+                <a16:creationId xmlns:a16="http://schemas.microsoft.com/office/drawing/2014/main" id="{046DBCE4-E0EF-4FEE-80D5-A702C3556002}"/>
               </a:ext>
             </a:extLst>
           </p:cNvPr>
@@ -179,7 +181,7 @@
           <p:cNvPr id="3" name="Subtitle 2">
             <a:extLst>
               <a:ext uri="{FF2B5EF4-FFF2-40B4-BE49-F238E27FC236}">
-                <a16:creationId xmlns:a16="http://schemas.microsoft.com/office/drawing/2014/main" xmlns="" id="{7E50572C-23B8-4844-BEA8-67547B46B854}"/>
+                <a16:creationId xmlns:a16="http://schemas.microsoft.com/office/drawing/2014/main" id="{7E50572C-23B8-4844-BEA8-67547B46B854}"/>
               </a:ext>
             </a:extLst>
           </p:cNvPr>
@@ -250,7 +252,7 @@
           <p:cNvPr id="4" name="Date Placeholder 3">
             <a:extLst>
               <a:ext uri="{FF2B5EF4-FFF2-40B4-BE49-F238E27FC236}">
-                <a16:creationId xmlns:a16="http://schemas.microsoft.com/office/drawing/2014/main" xmlns="" id="{100022F9-A075-4D48-821D-C3BBF5EF6DB8}"/>
+                <a16:creationId xmlns:a16="http://schemas.microsoft.com/office/drawing/2014/main" id="{100022F9-A075-4D48-821D-C3BBF5EF6DB8}"/>
               </a:ext>
             </a:extLst>
           </p:cNvPr>
@@ -279,7 +281,7 @@
           <p:cNvPr id="5" name="Footer Placeholder 4">
             <a:extLst>
               <a:ext uri="{FF2B5EF4-FFF2-40B4-BE49-F238E27FC236}">
-                <a16:creationId xmlns:a16="http://schemas.microsoft.com/office/drawing/2014/main" xmlns="" id="{EC31605A-96D3-4AE5-8AB0-795CD0B5F4FF}"/>
+                <a16:creationId xmlns:a16="http://schemas.microsoft.com/office/drawing/2014/main" id="{EC31605A-96D3-4AE5-8AB0-795CD0B5F4FF}"/>
               </a:ext>
             </a:extLst>
           </p:cNvPr>
@@ -307,7 +309,7 @@
           <p:cNvPr id="6" name="Slide Number Placeholder 5">
             <a:extLst>
               <a:ext uri="{FF2B5EF4-FFF2-40B4-BE49-F238E27FC236}">
-                <a16:creationId xmlns:a16="http://schemas.microsoft.com/office/drawing/2014/main" xmlns="" id="{57DF77BF-007F-4C70-98E2-83A1A7E91C87}"/>
+                <a16:creationId xmlns:a16="http://schemas.microsoft.com/office/drawing/2014/main" id="{57DF77BF-007F-4C70-98E2-83A1A7E91C87}"/>
               </a:ext>
             </a:extLst>
           </p:cNvPr>
@@ -325,7 +327,7 @@
           <a:p>
             <a:fld id="{969E759D-A893-4B96-8B48-96EE547EBC41}" type="slidenum">
               <a:rPr lang="de-DE" smtClean="0"/>
-              <a:t>‹Nr.›</a:t>
+              <a:t>‹#›</a:t>
             </a:fld>
             <a:endParaRPr lang="de-DE"/>
           </a:p>
@@ -366,7 +368,7 @@
           <p:cNvPr id="2" name="Title 1">
             <a:extLst>
               <a:ext uri="{FF2B5EF4-FFF2-40B4-BE49-F238E27FC236}">
-                <a16:creationId xmlns:a16="http://schemas.microsoft.com/office/drawing/2014/main" xmlns="" id="{50547723-A745-4136-9E9B-C54A2591C03E}"/>
+                <a16:creationId xmlns:a16="http://schemas.microsoft.com/office/drawing/2014/main" id="{50547723-A745-4136-9E9B-C54A2591C03E}"/>
               </a:ext>
             </a:extLst>
           </p:cNvPr>
@@ -395,7 +397,7 @@
           <p:cNvPr id="3" name="Vertical Text Placeholder 2">
             <a:extLst>
               <a:ext uri="{FF2B5EF4-FFF2-40B4-BE49-F238E27FC236}">
-                <a16:creationId xmlns:a16="http://schemas.microsoft.com/office/drawing/2014/main" xmlns="" id="{19A1C7A2-1B43-4C6D-A293-C7FFD55FA198}"/>
+                <a16:creationId xmlns:a16="http://schemas.microsoft.com/office/drawing/2014/main" id="{19A1C7A2-1B43-4C6D-A293-C7FFD55FA198}"/>
               </a:ext>
             </a:extLst>
           </p:cNvPr>
@@ -453,7 +455,7 @@
           <p:cNvPr id="4" name="Date Placeholder 3">
             <a:extLst>
               <a:ext uri="{FF2B5EF4-FFF2-40B4-BE49-F238E27FC236}">
-                <a16:creationId xmlns:a16="http://schemas.microsoft.com/office/drawing/2014/main" xmlns="" id="{E4D750D0-43FF-490C-A9D5-FAD09D16CB56}"/>
+                <a16:creationId xmlns:a16="http://schemas.microsoft.com/office/drawing/2014/main" id="{E4D750D0-43FF-490C-A9D5-FAD09D16CB56}"/>
               </a:ext>
             </a:extLst>
           </p:cNvPr>
@@ -482,7 +484,7 @@
           <p:cNvPr id="5" name="Footer Placeholder 4">
             <a:extLst>
               <a:ext uri="{FF2B5EF4-FFF2-40B4-BE49-F238E27FC236}">
-                <a16:creationId xmlns:a16="http://schemas.microsoft.com/office/drawing/2014/main" xmlns="" id="{52720C74-982E-4771-B07D-A0BD79EC910E}"/>
+                <a16:creationId xmlns:a16="http://schemas.microsoft.com/office/drawing/2014/main" id="{52720C74-982E-4771-B07D-A0BD79EC910E}"/>
               </a:ext>
             </a:extLst>
           </p:cNvPr>
@@ -510,7 +512,7 @@
           <p:cNvPr id="6" name="Slide Number Placeholder 5">
             <a:extLst>
               <a:ext uri="{FF2B5EF4-FFF2-40B4-BE49-F238E27FC236}">
-                <a16:creationId xmlns:a16="http://schemas.microsoft.com/office/drawing/2014/main" xmlns="" id="{521B4D69-0D90-4E66-BBD6-D567927F056E}"/>
+                <a16:creationId xmlns:a16="http://schemas.microsoft.com/office/drawing/2014/main" id="{521B4D69-0D90-4E66-BBD6-D567927F056E}"/>
               </a:ext>
             </a:extLst>
           </p:cNvPr>
@@ -528,7 +530,7 @@
           <a:p>
             <a:fld id="{969E759D-A893-4B96-8B48-96EE547EBC41}" type="slidenum">
               <a:rPr lang="de-DE" smtClean="0"/>
-              <a:t>‹Nr.›</a:t>
+              <a:t>‹#›</a:t>
             </a:fld>
             <a:endParaRPr lang="de-DE"/>
           </a:p>
@@ -569,7 +571,7 @@
           <p:cNvPr id="2" name="Vertical Title 1">
             <a:extLst>
               <a:ext uri="{FF2B5EF4-FFF2-40B4-BE49-F238E27FC236}">
-                <a16:creationId xmlns:a16="http://schemas.microsoft.com/office/drawing/2014/main" xmlns="" id="{2CAD75F2-C38E-4541-87A7-F319E899E67A}"/>
+                <a16:creationId xmlns:a16="http://schemas.microsoft.com/office/drawing/2014/main" id="{2CAD75F2-C38E-4541-87A7-F319E899E67A}"/>
               </a:ext>
             </a:extLst>
           </p:cNvPr>
@@ -603,7 +605,7 @@
           <p:cNvPr id="3" name="Vertical Text Placeholder 2">
             <a:extLst>
               <a:ext uri="{FF2B5EF4-FFF2-40B4-BE49-F238E27FC236}">
-                <a16:creationId xmlns:a16="http://schemas.microsoft.com/office/drawing/2014/main" xmlns="" id="{4C062E13-06CB-485A-AA44-1327366B8430}"/>
+                <a16:creationId xmlns:a16="http://schemas.microsoft.com/office/drawing/2014/main" id="{4C062E13-06CB-485A-AA44-1327366B8430}"/>
               </a:ext>
             </a:extLst>
           </p:cNvPr>
@@ -666,7 +668,7 @@
           <p:cNvPr id="4" name="Date Placeholder 3">
             <a:extLst>
               <a:ext uri="{FF2B5EF4-FFF2-40B4-BE49-F238E27FC236}">
-                <a16:creationId xmlns:a16="http://schemas.microsoft.com/office/drawing/2014/main" xmlns="" id="{625F218E-01D2-451A-9031-AD736B1E20A6}"/>
+                <a16:creationId xmlns:a16="http://schemas.microsoft.com/office/drawing/2014/main" id="{625F218E-01D2-451A-9031-AD736B1E20A6}"/>
               </a:ext>
             </a:extLst>
           </p:cNvPr>
@@ -695,7 +697,7 @@
           <p:cNvPr id="5" name="Footer Placeholder 4">
             <a:extLst>
               <a:ext uri="{FF2B5EF4-FFF2-40B4-BE49-F238E27FC236}">
-                <a16:creationId xmlns:a16="http://schemas.microsoft.com/office/drawing/2014/main" xmlns="" id="{C7083295-EF4A-46C3-90BB-B9E2D04D0576}"/>
+                <a16:creationId xmlns:a16="http://schemas.microsoft.com/office/drawing/2014/main" id="{C7083295-EF4A-46C3-90BB-B9E2D04D0576}"/>
               </a:ext>
             </a:extLst>
           </p:cNvPr>
@@ -723,7 +725,7 @@
           <p:cNvPr id="6" name="Slide Number Placeholder 5">
             <a:extLst>
               <a:ext uri="{FF2B5EF4-FFF2-40B4-BE49-F238E27FC236}">
-                <a16:creationId xmlns:a16="http://schemas.microsoft.com/office/drawing/2014/main" xmlns="" id="{0F8EDD3E-35ED-415B-86A4-3E78B8B56297}"/>
+                <a16:creationId xmlns:a16="http://schemas.microsoft.com/office/drawing/2014/main" id="{0F8EDD3E-35ED-415B-86A4-3E78B8B56297}"/>
               </a:ext>
             </a:extLst>
           </p:cNvPr>
@@ -741,7 +743,7 @@
           <a:p>
             <a:fld id="{969E759D-A893-4B96-8B48-96EE547EBC41}" type="slidenum">
               <a:rPr lang="de-DE" smtClean="0"/>
-              <a:t>‹Nr.›</a:t>
+              <a:t>‹#›</a:t>
             </a:fld>
             <a:endParaRPr lang="de-DE"/>
           </a:p>
@@ -782,7 +784,7 @@
           <p:cNvPr id="2" name="Title 1">
             <a:extLst>
               <a:ext uri="{FF2B5EF4-FFF2-40B4-BE49-F238E27FC236}">
-                <a16:creationId xmlns:a16="http://schemas.microsoft.com/office/drawing/2014/main" xmlns="" id="{3EC23AC9-B405-43A9-9B49-DD554606884B}"/>
+                <a16:creationId xmlns:a16="http://schemas.microsoft.com/office/drawing/2014/main" id="{3EC23AC9-B405-43A9-9B49-DD554606884B}"/>
               </a:ext>
             </a:extLst>
           </p:cNvPr>
@@ -811,7 +813,7 @@
           <p:cNvPr id="3" name="Content Placeholder 2">
             <a:extLst>
               <a:ext uri="{FF2B5EF4-FFF2-40B4-BE49-F238E27FC236}">
-                <a16:creationId xmlns:a16="http://schemas.microsoft.com/office/drawing/2014/main" xmlns="" id="{5A1ED858-EF3B-4519-8B6B-57FF232A60D6}"/>
+                <a16:creationId xmlns:a16="http://schemas.microsoft.com/office/drawing/2014/main" id="{5A1ED858-EF3B-4519-8B6B-57FF232A60D6}"/>
               </a:ext>
             </a:extLst>
           </p:cNvPr>
@@ -869,7 +871,7 @@
           <p:cNvPr id="4" name="Date Placeholder 3">
             <a:extLst>
               <a:ext uri="{FF2B5EF4-FFF2-40B4-BE49-F238E27FC236}">
-                <a16:creationId xmlns:a16="http://schemas.microsoft.com/office/drawing/2014/main" xmlns="" id="{C8150030-2F31-4B9A-B432-2B22C4DE6212}"/>
+                <a16:creationId xmlns:a16="http://schemas.microsoft.com/office/drawing/2014/main" id="{C8150030-2F31-4B9A-B432-2B22C4DE6212}"/>
               </a:ext>
             </a:extLst>
           </p:cNvPr>
@@ -898,7 +900,7 @@
           <p:cNvPr id="5" name="Footer Placeholder 4">
             <a:extLst>
               <a:ext uri="{FF2B5EF4-FFF2-40B4-BE49-F238E27FC236}">
-                <a16:creationId xmlns:a16="http://schemas.microsoft.com/office/drawing/2014/main" xmlns="" id="{9D0121CD-2AA3-4C77-A2DC-710EE8AD1DE5}"/>
+                <a16:creationId xmlns:a16="http://schemas.microsoft.com/office/drawing/2014/main" id="{9D0121CD-2AA3-4C77-A2DC-710EE8AD1DE5}"/>
               </a:ext>
             </a:extLst>
           </p:cNvPr>
@@ -926,7 +928,7 @@
           <p:cNvPr id="6" name="Slide Number Placeholder 5">
             <a:extLst>
               <a:ext uri="{FF2B5EF4-FFF2-40B4-BE49-F238E27FC236}">
-                <a16:creationId xmlns:a16="http://schemas.microsoft.com/office/drawing/2014/main" xmlns="" id="{D230A6F5-C59C-4467-990E-B7673CFF0B72}"/>
+                <a16:creationId xmlns:a16="http://schemas.microsoft.com/office/drawing/2014/main" id="{D230A6F5-C59C-4467-990E-B7673CFF0B72}"/>
               </a:ext>
             </a:extLst>
           </p:cNvPr>
@@ -944,7 +946,7 @@
           <a:p>
             <a:fld id="{969E759D-A893-4B96-8B48-96EE547EBC41}" type="slidenum">
               <a:rPr lang="de-DE" smtClean="0"/>
-              <a:t>‹Nr.›</a:t>
+              <a:t>‹#›</a:t>
             </a:fld>
             <a:endParaRPr lang="de-DE"/>
           </a:p>
@@ -985,7 +987,7 @@
           <p:cNvPr id="2" name="Title 1">
             <a:extLst>
               <a:ext uri="{FF2B5EF4-FFF2-40B4-BE49-F238E27FC236}">
-                <a16:creationId xmlns:a16="http://schemas.microsoft.com/office/drawing/2014/main" xmlns="" id="{BF936881-31C9-42FA-A745-EA48C2B1D924}"/>
+                <a16:creationId xmlns:a16="http://schemas.microsoft.com/office/drawing/2014/main" id="{BF936881-31C9-42FA-A745-EA48C2B1D924}"/>
               </a:ext>
             </a:extLst>
           </p:cNvPr>
@@ -1023,7 +1025,7 @@
           <p:cNvPr id="3" name="Text Placeholder 2">
             <a:extLst>
               <a:ext uri="{FF2B5EF4-FFF2-40B4-BE49-F238E27FC236}">
-                <a16:creationId xmlns:a16="http://schemas.microsoft.com/office/drawing/2014/main" xmlns="" id="{F4F81A45-5932-4C85-A105-4077AD8D9885}"/>
+                <a16:creationId xmlns:a16="http://schemas.microsoft.com/office/drawing/2014/main" id="{F4F81A45-5932-4C85-A105-4077AD8D9885}"/>
               </a:ext>
             </a:extLst>
           </p:cNvPr>
@@ -1148,7 +1150,7 @@
           <p:cNvPr id="4" name="Date Placeholder 3">
             <a:extLst>
               <a:ext uri="{FF2B5EF4-FFF2-40B4-BE49-F238E27FC236}">
-                <a16:creationId xmlns:a16="http://schemas.microsoft.com/office/drawing/2014/main" xmlns="" id="{FF8CFA83-5D09-45E6-BFEE-A02E8D514255}"/>
+                <a16:creationId xmlns:a16="http://schemas.microsoft.com/office/drawing/2014/main" id="{FF8CFA83-5D09-45E6-BFEE-A02E8D514255}"/>
               </a:ext>
             </a:extLst>
           </p:cNvPr>
@@ -1177,7 +1179,7 @@
           <p:cNvPr id="5" name="Footer Placeholder 4">
             <a:extLst>
               <a:ext uri="{FF2B5EF4-FFF2-40B4-BE49-F238E27FC236}">
-                <a16:creationId xmlns:a16="http://schemas.microsoft.com/office/drawing/2014/main" xmlns="" id="{A79C5C45-F0F7-4E1E-A0BA-F748D717175A}"/>
+                <a16:creationId xmlns:a16="http://schemas.microsoft.com/office/drawing/2014/main" id="{A79C5C45-F0F7-4E1E-A0BA-F748D717175A}"/>
               </a:ext>
             </a:extLst>
           </p:cNvPr>
@@ -1205,7 +1207,7 @@
           <p:cNvPr id="6" name="Slide Number Placeholder 5">
             <a:extLst>
               <a:ext uri="{FF2B5EF4-FFF2-40B4-BE49-F238E27FC236}">
-                <a16:creationId xmlns:a16="http://schemas.microsoft.com/office/drawing/2014/main" xmlns="" id="{0B6BC97A-AFA3-4F0C-AF54-B5654540B753}"/>
+                <a16:creationId xmlns:a16="http://schemas.microsoft.com/office/drawing/2014/main" id="{0B6BC97A-AFA3-4F0C-AF54-B5654540B753}"/>
               </a:ext>
             </a:extLst>
           </p:cNvPr>
@@ -1223,7 +1225,7 @@
           <a:p>
             <a:fld id="{969E759D-A893-4B96-8B48-96EE547EBC41}" type="slidenum">
               <a:rPr lang="de-DE" smtClean="0"/>
-              <a:t>‹Nr.›</a:t>
+              <a:t>‹#›</a:t>
             </a:fld>
             <a:endParaRPr lang="de-DE"/>
           </a:p>
@@ -1264,7 +1266,7 @@
           <p:cNvPr id="2" name="Title 1">
             <a:extLst>
               <a:ext uri="{FF2B5EF4-FFF2-40B4-BE49-F238E27FC236}">
-                <a16:creationId xmlns:a16="http://schemas.microsoft.com/office/drawing/2014/main" xmlns="" id="{767E744E-0BBE-4077-8230-C905D1B7B2F6}"/>
+                <a16:creationId xmlns:a16="http://schemas.microsoft.com/office/drawing/2014/main" id="{767E744E-0BBE-4077-8230-C905D1B7B2F6}"/>
               </a:ext>
             </a:extLst>
           </p:cNvPr>
@@ -1293,7 +1295,7 @@
           <p:cNvPr id="3" name="Content Placeholder 2">
             <a:extLst>
               <a:ext uri="{FF2B5EF4-FFF2-40B4-BE49-F238E27FC236}">
-                <a16:creationId xmlns:a16="http://schemas.microsoft.com/office/drawing/2014/main" xmlns="" id="{0C95CA8F-8400-44E9-982B-20F711B51A51}"/>
+                <a16:creationId xmlns:a16="http://schemas.microsoft.com/office/drawing/2014/main" id="{0C95CA8F-8400-44E9-982B-20F711B51A51}"/>
               </a:ext>
             </a:extLst>
           </p:cNvPr>
@@ -1356,7 +1358,7 @@
           <p:cNvPr id="4" name="Content Placeholder 3">
             <a:extLst>
               <a:ext uri="{FF2B5EF4-FFF2-40B4-BE49-F238E27FC236}">
-                <a16:creationId xmlns:a16="http://schemas.microsoft.com/office/drawing/2014/main" xmlns="" id="{8FFC5013-EAEC-446A-836B-EE12B52AF1EE}"/>
+                <a16:creationId xmlns:a16="http://schemas.microsoft.com/office/drawing/2014/main" id="{8FFC5013-EAEC-446A-836B-EE12B52AF1EE}"/>
               </a:ext>
             </a:extLst>
           </p:cNvPr>
@@ -1419,7 +1421,7 @@
           <p:cNvPr id="5" name="Date Placeholder 4">
             <a:extLst>
               <a:ext uri="{FF2B5EF4-FFF2-40B4-BE49-F238E27FC236}">
-                <a16:creationId xmlns:a16="http://schemas.microsoft.com/office/drawing/2014/main" xmlns="" id="{E310F9EB-66BC-4C02-949E-4481CE3C774C}"/>
+                <a16:creationId xmlns:a16="http://schemas.microsoft.com/office/drawing/2014/main" id="{E310F9EB-66BC-4C02-949E-4481CE3C774C}"/>
               </a:ext>
             </a:extLst>
           </p:cNvPr>
@@ -1448,7 +1450,7 @@
           <p:cNvPr id="6" name="Footer Placeholder 5">
             <a:extLst>
               <a:ext uri="{FF2B5EF4-FFF2-40B4-BE49-F238E27FC236}">
-                <a16:creationId xmlns:a16="http://schemas.microsoft.com/office/drawing/2014/main" xmlns="" id="{74C21129-AF84-4DC7-B6AB-10366106430C}"/>
+                <a16:creationId xmlns:a16="http://schemas.microsoft.com/office/drawing/2014/main" id="{74C21129-AF84-4DC7-B6AB-10366106430C}"/>
               </a:ext>
             </a:extLst>
           </p:cNvPr>
@@ -1476,7 +1478,7 @@
           <p:cNvPr id="7" name="Slide Number Placeholder 6">
             <a:extLst>
               <a:ext uri="{FF2B5EF4-FFF2-40B4-BE49-F238E27FC236}">
-                <a16:creationId xmlns:a16="http://schemas.microsoft.com/office/drawing/2014/main" xmlns="" id="{6C1A3CA7-9108-4644-9A69-9E5AEB0B2AD0}"/>
+                <a16:creationId xmlns:a16="http://schemas.microsoft.com/office/drawing/2014/main" id="{6C1A3CA7-9108-4644-9A69-9E5AEB0B2AD0}"/>
               </a:ext>
             </a:extLst>
           </p:cNvPr>
@@ -1494,7 +1496,7 @@
           <a:p>
             <a:fld id="{969E759D-A893-4B96-8B48-96EE547EBC41}" type="slidenum">
               <a:rPr lang="de-DE" smtClean="0"/>
-              <a:t>‹Nr.›</a:t>
+              <a:t>‹#›</a:t>
             </a:fld>
             <a:endParaRPr lang="de-DE"/>
           </a:p>
@@ -1535,7 +1537,7 @@
           <p:cNvPr id="2" name="Title 1">
             <a:extLst>
               <a:ext uri="{FF2B5EF4-FFF2-40B4-BE49-F238E27FC236}">
-                <a16:creationId xmlns:a16="http://schemas.microsoft.com/office/drawing/2014/main" xmlns="" id="{33AA1592-15D3-4F0B-B2E7-C95CBA7D7F4C}"/>
+                <a16:creationId xmlns:a16="http://schemas.microsoft.com/office/drawing/2014/main" id="{33AA1592-15D3-4F0B-B2E7-C95CBA7D7F4C}"/>
               </a:ext>
             </a:extLst>
           </p:cNvPr>
@@ -1569,7 +1571,7 @@
           <p:cNvPr id="3" name="Text Placeholder 2">
             <a:extLst>
               <a:ext uri="{FF2B5EF4-FFF2-40B4-BE49-F238E27FC236}">
-                <a16:creationId xmlns:a16="http://schemas.microsoft.com/office/drawing/2014/main" xmlns="" id="{3BC98F03-C09F-41CB-A02C-235FEF123879}"/>
+                <a16:creationId xmlns:a16="http://schemas.microsoft.com/office/drawing/2014/main" id="{3BC98F03-C09F-41CB-A02C-235FEF123879}"/>
               </a:ext>
             </a:extLst>
           </p:cNvPr>
@@ -1640,7 +1642,7 @@
           <p:cNvPr id="4" name="Content Placeholder 3">
             <a:extLst>
               <a:ext uri="{FF2B5EF4-FFF2-40B4-BE49-F238E27FC236}">
-                <a16:creationId xmlns:a16="http://schemas.microsoft.com/office/drawing/2014/main" xmlns="" id="{2B41E649-41F5-4E43-B982-FA612CCD2DF0}"/>
+                <a16:creationId xmlns:a16="http://schemas.microsoft.com/office/drawing/2014/main" id="{2B41E649-41F5-4E43-B982-FA612CCD2DF0}"/>
               </a:ext>
             </a:extLst>
           </p:cNvPr>
@@ -1703,7 +1705,7 @@
           <p:cNvPr id="5" name="Text Placeholder 4">
             <a:extLst>
               <a:ext uri="{FF2B5EF4-FFF2-40B4-BE49-F238E27FC236}">
-                <a16:creationId xmlns:a16="http://schemas.microsoft.com/office/drawing/2014/main" xmlns="" id="{37D7ABD1-D2B0-4CF0-8B82-C5D1C4FD84AF}"/>
+                <a16:creationId xmlns:a16="http://schemas.microsoft.com/office/drawing/2014/main" id="{37D7ABD1-D2B0-4CF0-8B82-C5D1C4FD84AF}"/>
               </a:ext>
             </a:extLst>
           </p:cNvPr>
@@ -1774,7 +1776,7 @@
           <p:cNvPr id="6" name="Content Placeholder 5">
             <a:extLst>
               <a:ext uri="{FF2B5EF4-FFF2-40B4-BE49-F238E27FC236}">
-                <a16:creationId xmlns:a16="http://schemas.microsoft.com/office/drawing/2014/main" xmlns="" id="{9E3897D1-02F3-412B-83EF-28A5CF402015}"/>
+                <a16:creationId xmlns:a16="http://schemas.microsoft.com/office/drawing/2014/main" id="{9E3897D1-02F3-412B-83EF-28A5CF402015}"/>
               </a:ext>
             </a:extLst>
           </p:cNvPr>
@@ -1837,7 +1839,7 @@
           <p:cNvPr id="7" name="Date Placeholder 6">
             <a:extLst>
               <a:ext uri="{FF2B5EF4-FFF2-40B4-BE49-F238E27FC236}">
-                <a16:creationId xmlns:a16="http://schemas.microsoft.com/office/drawing/2014/main" xmlns="" id="{9EA6E2B4-4A3E-4E96-98E5-D833ADA54890}"/>
+                <a16:creationId xmlns:a16="http://schemas.microsoft.com/office/drawing/2014/main" id="{9EA6E2B4-4A3E-4E96-98E5-D833ADA54890}"/>
               </a:ext>
             </a:extLst>
           </p:cNvPr>
@@ -1866,7 +1868,7 @@
           <p:cNvPr id="8" name="Footer Placeholder 7">
             <a:extLst>
               <a:ext uri="{FF2B5EF4-FFF2-40B4-BE49-F238E27FC236}">
-                <a16:creationId xmlns:a16="http://schemas.microsoft.com/office/drawing/2014/main" xmlns="" id="{5AC79E77-5927-4B6F-9B63-ADABE239B453}"/>
+                <a16:creationId xmlns:a16="http://schemas.microsoft.com/office/drawing/2014/main" id="{5AC79E77-5927-4B6F-9B63-ADABE239B453}"/>
               </a:ext>
             </a:extLst>
           </p:cNvPr>
@@ -1894,7 +1896,7 @@
           <p:cNvPr id="9" name="Slide Number Placeholder 8">
             <a:extLst>
               <a:ext uri="{FF2B5EF4-FFF2-40B4-BE49-F238E27FC236}">
-                <a16:creationId xmlns:a16="http://schemas.microsoft.com/office/drawing/2014/main" xmlns="" id="{37B9B9C8-ED50-4852-B9F1-48A216BB03D1}"/>
+                <a16:creationId xmlns:a16="http://schemas.microsoft.com/office/drawing/2014/main" id="{37B9B9C8-ED50-4852-B9F1-48A216BB03D1}"/>
               </a:ext>
             </a:extLst>
           </p:cNvPr>
@@ -1912,7 +1914,7 @@
           <a:p>
             <a:fld id="{969E759D-A893-4B96-8B48-96EE547EBC41}" type="slidenum">
               <a:rPr lang="de-DE" smtClean="0"/>
-              <a:t>‹Nr.›</a:t>
+              <a:t>‹#›</a:t>
             </a:fld>
             <a:endParaRPr lang="de-DE"/>
           </a:p>
@@ -1953,7 +1955,7 @@
           <p:cNvPr id="2" name="Title 1">
             <a:extLst>
               <a:ext uri="{FF2B5EF4-FFF2-40B4-BE49-F238E27FC236}">
-                <a16:creationId xmlns:a16="http://schemas.microsoft.com/office/drawing/2014/main" xmlns="" id="{AFFF9CCC-3D72-4E6D-9B55-5BDB2AB422C8}"/>
+                <a16:creationId xmlns:a16="http://schemas.microsoft.com/office/drawing/2014/main" id="{AFFF9CCC-3D72-4E6D-9B55-5BDB2AB422C8}"/>
               </a:ext>
             </a:extLst>
           </p:cNvPr>
@@ -1982,7 +1984,7 @@
           <p:cNvPr id="3" name="Date Placeholder 2">
             <a:extLst>
               <a:ext uri="{FF2B5EF4-FFF2-40B4-BE49-F238E27FC236}">
-                <a16:creationId xmlns:a16="http://schemas.microsoft.com/office/drawing/2014/main" xmlns="" id="{0B6C3247-58E3-4CD5-BAA0-DA75A819FDB7}"/>
+                <a16:creationId xmlns:a16="http://schemas.microsoft.com/office/drawing/2014/main" id="{0B6C3247-58E3-4CD5-BAA0-DA75A819FDB7}"/>
               </a:ext>
             </a:extLst>
           </p:cNvPr>
@@ -2011,7 +2013,7 @@
           <p:cNvPr id="4" name="Footer Placeholder 3">
             <a:extLst>
               <a:ext uri="{FF2B5EF4-FFF2-40B4-BE49-F238E27FC236}">
-                <a16:creationId xmlns:a16="http://schemas.microsoft.com/office/drawing/2014/main" xmlns="" id="{F337865A-A6D7-4B6F-AACB-CF758CA5DFEF}"/>
+                <a16:creationId xmlns:a16="http://schemas.microsoft.com/office/drawing/2014/main" id="{F337865A-A6D7-4B6F-AACB-CF758CA5DFEF}"/>
               </a:ext>
             </a:extLst>
           </p:cNvPr>
@@ -2039,7 +2041,7 @@
           <p:cNvPr id="5" name="Slide Number Placeholder 4">
             <a:extLst>
               <a:ext uri="{FF2B5EF4-FFF2-40B4-BE49-F238E27FC236}">
-                <a16:creationId xmlns:a16="http://schemas.microsoft.com/office/drawing/2014/main" xmlns="" id="{3686C1C5-74DF-47F5-99D6-4A48265FCC9A}"/>
+                <a16:creationId xmlns:a16="http://schemas.microsoft.com/office/drawing/2014/main" id="{3686C1C5-74DF-47F5-99D6-4A48265FCC9A}"/>
               </a:ext>
             </a:extLst>
           </p:cNvPr>
@@ -2057,7 +2059,7 @@
           <a:p>
             <a:fld id="{969E759D-A893-4B96-8B48-96EE547EBC41}" type="slidenum">
               <a:rPr lang="de-DE" smtClean="0"/>
-              <a:t>‹Nr.›</a:t>
+              <a:t>‹#›</a:t>
             </a:fld>
             <a:endParaRPr lang="de-DE"/>
           </a:p>
@@ -2098,7 +2100,7 @@
           <p:cNvPr id="2" name="Date Placeholder 1">
             <a:extLst>
               <a:ext uri="{FF2B5EF4-FFF2-40B4-BE49-F238E27FC236}">
-                <a16:creationId xmlns:a16="http://schemas.microsoft.com/office/drawing/2014/main" xmlns="" id="{DD7FD90C-4FC4-4111-9356-41D9564DB7DC}"/>
+                <a16:creationId xmlns:a16="http://schemas.microsoft.com/office/drawing/2014/main" id="{DD7FD90C-4FC4-4111-9356-41D9564DB7DC}"/>
               </a:ext>
             </a:extLst>
           </p:cNvPr>
@@ -2127,7 +2129,7 @@
           <p:cNvPr id="3" name="Footer Placeholder 2">
             <a:extLst>
               <a:ext uri="{FF2B5EF4-FFF2-40B4-BE49-F238E27FC236}">
-                <a16:creationId xmlns:a16="http://schemas.microsoft.com/office/drawing/2014/main" xmlns="" id="{3C9FF4C4-44A5-48A4-BDD8-FEA03E205412}"/>
+                <a16:creationId xmlns:a16="http://schemas.microsoft.com/office/drawing/2014/main" id="{3C9FF4C4-44A5-48A4-BDD8-FEA03E205412}"/>
               </a:ext>
             </a:extLst>
           </p:cNvPr>
@@ -2155,7 +2157,7 @@
           <p:cNvPr id="4" name="Slide Number Placeholder 3">
             <a:extLst>
               <a:ext uri="{FF2B5EF4-FFF2-40B4-BE49-F238E27FC236}">
-                <a16:creationId xmlns:a16="http://schemas.microsoft.com/office/drawing/2014/main" xmlns="" id="{5BD1C1F2-608B-4F06-B3CF-EA402ECA138C}"/>
+                <a16:creationId xmlns:a16="http://schemas.microsoft.com/office/drawing/2014/main" id="{5BD1C1F2-608B-4F06-B3CF-EA402ECA138C}"/>
               </a:ext>
             </a:extLst>
           </p:cNvPr>
@@ -2173,7 +2175,7 @@
           <a:p>
             <a:fld id="{969E759D-A893-4B96-8B48-96EE547EBC41}" type="slidenum">
               <a:rPr lang="de-DE" smtClean="0"/>
-              <a:t>‹Nr.›</a:t>
+              <a:t>‹#›</a:t>
             </a:fld>
             <a:endParaRPr lang="de-DE"/>
           </a:p>
@@ -2214,7 +2216,7 @@
           <p:cNvPr id="2" name="Title 1">
             <a:extLst>
               <a:ext uri="{FF2B5EF4-FFF2-40B4-BE49-F238E27FC236}">
-                <a16:creationId xmlns:a16="http://schemas.microsoft.com/office/drawing/2014/main" xmlns="" id="{C30E51A0-29CA-4ADD-9397-21C60FE7224C}"/>
+                <a16:creationId xmlns:a16="http://schemas.microsoft.com/office/drawing/2014/main" id="{C30E51A0-29CA-4ADD-9397-21C60FE7224C}"/>
               </a:ext>
             </a:extLst>
           </p:cNvPr>
@@ -2252,7 +2254,7 @@
           <p:cNvPr id="3" name="Content Placeholder 2">
             <a:extLst>
               <a:ext uri="{FF2B5EF4-FFF2-40B4-BE49-F238E27FC236}">
-                <a16:creationId xmlns:a16="http://schemas.microsoft.com/office/drawing/2014/main" xmlns="" id="{AE4C1E59-EC49-477D-A7FA-8D17A544FD35}"/>
+                <a16:creationId xmlns:a16="http://schemas.microsoft.com/office/drawing/2014/main" id="{AE4C1E59-EC49-477D-A7FA-8D17A544FD35}"/>
               </a:ext>
             </a:extLst>
           </p:cNvPr>
@@ -2343,7 +2345,7 @@
           <p:cNvPr id="4" name="Text Placeholder 3">
             <a:extLst>
               <a:ext uri="{FF2B5EF4-FFF2-40B4-BE49-F238E27FC236}">
-                <a16:creationId xmlns:a16="http://schemas.microsoft.com/office/drawing/2014/main" xmlns="" id="{FB140F56-8F9C-46CC-A2A8-FC43BF1B9B5A}"/>
+                <a16:creationId xmlns:a16="http://schemas.microsoft.com/office/drawing/2014/main" id="{FB140F56-8F9C-46CC-A2A8-FC43BF1B9B5A}"/>
               </a:ext>
             </a:extLst>
           </p:cNvPr>
@@ -2414,7 +2416,7 @@
           <p:cNvPr id="5" name="Date Placeholder 4">
             <a:extLst>
               <a:ext uri="{FF2B5EF4-FFF2-40B4-BE49-F238E27FC236}">
-                <a16:creationId xmlns:a16="http://schemas.microsoft.com/office/drawing/2014/main" xmlns="" id="{31CABD1E-515F-40BE-8198-380231147539}"/>
+                <a16:creationId xmlns:a16="http://schemas.microsoft.com/office/drawing/2014/main" id="{31CABD1E-515F-40BE-8198-380231147539}"/>
               </a:ext>
             </a:extLst>
           </p:cNvPr>
@@ -2443,7 +2445,7 @@
           <p:cNvPr id="6" name="Footer Placeholder 5">
             <a:extLst>
               <a:ext uri="{FF2B5EF4-FFF2-40B4-BE49-F238E27FC236}">
-                <a16:creationId xmlns:a16="http://schemas.microsoft.com/office/drawing/2014/main" xmlns="" id="{2F6019DF-BD0B-472E-A976-8D5DB86E4E34}"/>
+                <a16:creationId xmlns:a16="http://schemas.microsoft.com/office/drawing/2014/main" id="{2F6019DF-BD0B-472E-A976-8D5DB86E4E34}"/>
               </a:ext>
             </a:extLst>
           </p:cNvPr>
@@ -2471,7 +2473,7 @@
           <p:cNvPr id="7" name="Slide Number Placeholder 6">
             <a:extLst>
               <a:ext uri="{FF2B5EF4-FFF2-40B4-BE49-F238E27FC236}">
-                <a16:creationId xmlns:a16="http://schemas.microsoft.com/office/drawing/2014/main" xmlns="" id="{E9F698EC-CC4D-4D69-967F-312E2662B149}"/>
+                <a16:creationId xmlns:a16="http://schemas.microsoft.com/office/drawing/2014/main" id="{E9F698EC-CC4D-4D69-967F-312E2662B149}"/>
               </a:ext>
             </a:extLst>
           </p:cNvPr>
@@ -2489,7 +2491,7 @@
           <a:p>
             <a:fld id="{969E759D-A893-4B96-8B48-96EE547EBC41}" type="slidenum">
               <a:rPr lang="de-DE" smtClean="0"/>
-              <a:t>‹Nr.›</a:t>
+              <a:t>‹#›</a:t>
             </a:fld>
             <a:endParaRPr lang="de-DE"/>
           </a:p>
@@ -2530,7 +2532,7 @@
           <p:cNvPr id="2" name="Title 1">
             <a:extLst>
               <a:ext uri="{FF2B5EF4-FFF2-40B4-BE49-F238E27FC236}">
-                <a16:creationId xmlns:a16="http://schemas.microsoft.com/office/drawing/2014/main" xmlns="" id="{3B4FFAA6-7E4F-476A-9070-0F7F2F3CF654}"/>
+                <a16:creationId xmlns:a16="http://schemas.microsoft.com/office/drawing/2014/main" id="{3B4FFAA6-7E4F-476A-9070-0F7F2F3CF654}"/>
               </a:ext>
             </a:extLst>
           </p:cNvPr>
@@ -2568,7 +2570,7 @@
           <p:cNvPr id="3" name="Picture Placeholder 2">
             <a:extLst>
               <a:ext uri="{FF2B5EF4-FFF2-40B4-BE49-F238E27FC236}">
-                <a16:creationId xmlns:a16="http://schemas.microsoft.com/office/drawing/2014/main" xmlns="" id="{818F1107-C63D-4182-B212-341F4BBF5995}"/>
+                <a16:creationId xmlns:a16="http://schemas.microsoft.com/office/drawing/2014/main" id="{818F1107-C63D-4182-B212-341F4BBF5995}"/>
               </a:ext>
             </a:extLst>
           </p:cNvPr>
@@ -2635,7 +2637,7 @@
           <p:cNvPr id="4" name="Text Placeholder 3">
             <a:extLst>
               <a:ext uri="{FF2B5EF4-FFF2-40B4-BE49-F238E27FC236}">
-                <a16:creationId xmlns:a16="http://schemas.microsoft.com/office/drawing/2014/main" xmlns="" id="{0726478D-FAFE-42F8-9655-7B1CEA64186D}"/>
+                <a16:creationId xmlns:a16="http://schemas.microsoft.com/office/drawing/2014/main" id="{0726478D-FAFE-42F8-9655-7B1CEA64186D}"/>
               </a:ext>
             </a:extLst>
           </p:cNvPr>
@@ -2706,7 +2708,7 @@
           <p:cNvPr id="5" name="Date Placeholder 4">
             <a:extLst>
               <a:ext uri="{FF2B5EF4-FFF2-40B4-BE49-F238E27FC236}">
-                <a16:creationId xmlns:a16="http://schemas.microsoft.com/office/drawing/2014/main" xmlns="" id="{4ED6872F-0A70-4D1D-A649-079E23BFC17B}"/>
+                <a16:creationId xmlns:a16="http://schemas.microsoft.com/office/drawing/2014/main" id="{4ED6872F-0A70-4D1D-A649-079E23BFC17B}"/>
               </a:ext>
             </a:extLst>
           </p:cNvPr>
@@ -2735,7 +2737,7 @@
           <p:cNvPr id="6" name="Footer Placeholder 5">
             <a:extLst>
               <a:ext uri="{FF2B5EF4-FFF2-40B4-BE49-F238E27FC236}">
-                <a16:creationId xmlns:a16="http://schemas.microsoft.com/office/drawing/2014/main" xmlns="" id="{5312BCC0-13EB-4DA8-B39F-A5298CA93138}"/>
+                <a16:creationId xmlns:a16="http://schemas.microsoft.com/office/drawing/2014/main" id="{5312BCC0-13EB-4DA8-B39F-A5298CA93138}"/>
               </a:ext>
             </a:extLst>
           </p:cNvPr>
@@ -2763,7 +2765,7 @@
           <p:cNvPr id="7" name="Slide Number Placeholder 6">
             <a:extLst>
               <a:ext uri="{FF2B5EF4-FFF2-40B4-BE49-F238E27FC236}">
-                <a16:creationId xmlns:a16="http://schemas.microsoft.com/office/drawing/2014/main" xmlns="" id="{1F62339D-75FC-459B-A2F1-6975527E5692}"/>
+                <a16:creationId xmlns:a16="http://schemas.microsoft.com/office/drawing/2014/main" id="{1F62339D-75FC-459B-A2F1-6975527E5692}"/>
               </a:ext>
             </a:extLst>
           </p:cNvPr>
@@ -2781,7 +2783,7 @@
           <a:p>
             <a:fld id="{969E759D-A893-4B96-8B48-96EE547EBC41}" type="slidenum">
               <a:rPr lang="de-DE" smtClean="0"/>
-              <a:t>‹Nr.›</a:t>
+              <a:t>‹#›</a:t>
             </a:fld>
             <a:endParaRPr lang="de-DE"/>
           </a:p>
@@ -2827,7 +2829,7 @@
           <p:cNvPr id="2" name="Title Placeholder 1">
             <a:extLst>
               <a:ext uri="{FF2B5EF4-FFF2-40B4-BE49-F238E27FC236}">
-                <a16:creationId xmlns:a16="http://schemas.microsoft.com/office/drawing/2014/main" xmlns="" id="{EECCEAF9-517F-4246-89B4-773BBE3B5283}"/>
+                <a16:creationId xmlns:a16="http://schemas.microsoft.com/office/drawing/2014/main" id="{EECCEAF9-517F-4246-89B4-773BBE3B5283}"/>
               </a:ext>
             </a:extLst>
           </p:cNvPr>
@@ -2866,7 +2868,7 @@
           <p:cNvPr id="3" name="Text Placeholder 2">
             <a:extLst>
               <a:ext uri="{FF2B5EF4-FFF2-40B4-BE49-F238E27FC236}">
-                <a16:creationId xmlns:a16="http://schemas.microsoft.com/office/drawing/2014/main" xmlns="" id="{9A2C07FB-A743-4CFF-8DBA-B22A10466F8D}"/>
+                <a16:creationId xmlns:a16="http://schemas.microsoft.com/office/drawing/2014/main" id="{9A2C07FB-A743-4CFF-8DBA-B22A10466F8D}"/>
               </a:ext>
             </a:extLst>
           </p:cNvPr>
@@ -2934,7 +2936,7 @@
           <p:cNvPr id="4" name="Date Placeholder 3">
             <a:extLst>
               <a:ext uri="{FF2B5EF4-FFF2-40B4-BE49-F238E27FC236}">
-                <a16:creationId xmlns:a16="http://schemas.microsoft.com/office/drawing/2014/main" xmlns="" id="{3DE3EFD5-A9F8-4124-B4DE-1AEE565BA376}"/>
+                <a16:creationId xmlns:a16="http://schemas.microsoft.com/office/drawing/2014/main" id="{3DE3EFD5-A9F8-4124-B4DE-1AEE565BA376}"/>
               </a:ext>
             </a:extLst>
           </p:cNvPr>
@@ -2981,7 +2983,7 @@
           <p:cNvPr id="5" name="Footer Placeholder 4">
             <a:extLst>
               <a:ext uri="{FF2B5EF4-FFF2-40B4-BE49-F238E27FC236}">
-                <a16:creationId xmlns:a16="http://schemas.microsoft.com/office/drawing/2014/main" xmlns="" id="{CB368404-65B1-4F0D-A1D3-FE6F60E99818}"/>
+                <a16:creationId xmlns:a16="http://schemas.microsoft.com/office/drawing/2014/main" id="{CB368404-65B1-4F0D-A1D3-FE6F60E99818}"/>
               </a:ext>
             </a:extLst>
           </p:cNvPr>
@@ -3027,7 +3029,7 @@
           <p:cNvPr id="6" name="Slide Number Placeholder 5">
             <a:extLst>
               <a:ext uri="{FF2B5EF4-FFF2-40B4-BE49-F238E27FC236}">
-                <a16:creationId xmlns:a16="http://schemas.microsoft.com/office/drawing/2014/main" xmlns="" id="{50F0220F-6B11-49AF-AB94-16FA52911A89}"/>
+                <a16:creationId xmlns:a16="http://schemas.microsoft.com/office/drawing/2014/main" id="{50F0220F-6B11-49AF-AB94-16FA52911A89}"/>
               </a:ext>
             </a:extLst>
           </p:cNvPr>
@@ -3063,7 +3065,7 @@
           <a:p>
             <a:fld id="{969E759D-A893-4B96-8B48-96EE547EBC41}" type="slidenum">
               <a:rPr lang="de-DE" smtClean="0"/>
-              <a:t>‹Nr.›</a:t>
+              <a:t>‹#›</a:t>
             </a:fld>
             <a:endParaRPr lang="de-DE"/>
           </a:p>
@@ -3404,7 +3406,7 @@
           <p:cNvPr id="1026" name="Picture 2" descr="Die Campusgebäude wurden mit einer Drohne von oben fotografiert.">
             <a:extLst>
               <a:ext uri="{FF2B5EF4-FFF2-40B4-BE49-F238E27FC236}">
-                <a16:creationId xmlns:a16="http://schemas.microsoft.com/office/drawing/2014/main" xmlns="" id="{BB1D137F-7550-416E-9165-30BB2E2EE823}"/>
+                <a16:creationId xmlns:a16="http://schemas.microsoft.com/office/drawing/2014/main" id="{BB1D137F-7550-416E-9165-30BB2E2EE823}"/>
               </a:ext>
             </a:extLst>
           </p:cNvPr>
@@ -3449,10 +3451,10 @@
           <p:cNvPr id="71" name="Freeform 5">
             <a:extLst>
               <a:ext uri="{FF2B5EF4-FFF2-40B4-BE49-F238E27FC236}">
-                <a16:creationId xmlns:a16="http://schemas.microsoft.com/office/drawing/2014/main" xmlns="" id="{87CC2527-562A-4F69-B487-4371E5B243E7}"/>
+                <a16:creationId xmlns:a16="http://schemas.microsoft.com/office/drawing/2014/main" id="{87CC2527-562A-4F69-B487-4371E5B243E7}"/>
               </a:ext>
               <a:ext uri="{C183D7F6-B498-43B3-948B-1728B52AA6E4}">
-                <adec:decorative xmlns:adec="http://schemas.microsoft.com/office/drawing/2017/decorative" xmlns="" val="1"/>
+                <adec:decorative xmlns:adec="http://schemas.microsoft.com/office/drawing/2017/decorative" val="1"/>
               </a:ext>
             </a:extLst>
           </p:cNvPr>
@@ -3462,7 +3464,7 @@
           <p:nvPr>
             <p:extLst>
               <p:ext uri="{386F3935-93C4-4BCD-93E2-E3B085C9AB24}">
-                <p16:designElem xmlns:p16="http://schemas.microsoft.com/office/powerpoint/2015/main" xmlns="" val="1"/>
+                <p16:designElem xmlns:p16="http://schemas.microsoft.com/office/powerpoint/2015/main" val="1"/>
               </p:ext>
             </p:extLst>
           </p:nvPr>
@@ -3612,7 +3614,7 @@
           <p:cNvPr id="2" name="Title 1">
             <a:extLst>
               <a:ext uri="{FF2B5EF4-FFF2-40B4-BE49-F238E27FC236}">
-                <a16:creationId xmlns:a16="http://schemas.microsoft.com/office/drawing/2014/main" xmlns="" id="{66A5DC1B-C9D0-4F34-9333-047D860C11A0}"/>
+                <a16:creationId xmlns:a16="http://schemas.microsoft.com/office/drawing/2014/main" id="{66A5DC1B-C9D0-4F34-9333-047D860C11A0}"/>
               </a:ext>
             </a:extLst>
           </p:cNvPr>
@@ -3652,7 +3654,7 @@
           <p:cNvPr id="3" name="Subtitle 2">
             <a:extLst>
               <a:ext uri="{FF2B5EF4-FFF2-40B4-BE49-F238E27FC236}">
-                <a16:creationId xmlns:a16="http://schemas.microsoft.com/office/drawing/2014/main" xmlns="" id="{42EC82C3-D779-4672-B134-327C720F0D8A}"/>
+                <a16:creationId xmlns:a16="http://schemas.microsoft.com/office/drawing/2014/main" id="{42EC82C3-D779-4672-B134-327C720F0D8A}"/>
               </a:ext>
             </a:extLst>
           </p:cNvPr>
@@ -3671,7 +3673,7 @@
         </p:spPr>
         <p:txBody>
           <a:bodyPr>
-            <a:normAutofit fontScale="92500" lnSpcReduction="10000"/>
+            <a:normAutofit fontScale="92500" lnSpcReduction="20000"/>
           </a:bodyPr>
           <a:lstStyle/>
           <a:p>
@@ -3702,10 +3704,10 @@
           <p:cNvPr id="73" name="Straight Connector 72">
             <a:extLst>
               <a:ext uri="{FF2B5EF4-FFF2-40B4-BE49-F238E27FC236}">
-                <a16:creationId xmlns:a16="http://schemas.microsoft.com/office/drawing/2014/main" xmlns="" id="{BCDAEC91-5BCE-4B55-9CC0-43EF94CB734B}"/>
+                <a16:creationId xmlns:a16="http://schemas.microsoft.com/office/drawing/2014/main" id="{BCDAEC91-5BCE-4B55-9CC0-43EF94CB734B}"/>
               </a:ext>
               <a:ext uri="{C183D7F6-B498-43B3-948B-1728B52AA6E4}">
-                <adec:decorative xmlns:adec="http://schemas.microsoft.com/office/drawing/2017/decorative" xmlns="" val="1"/>
+                <adec:decorative xmlns:adec="http://schemas.microsoft.com/office/drawing/2017/decorative" val="1"/>
               </a:ext>
             </a:extLst>
           </p:cNvPr>
@@ -3715,7 +3717,7 @@
           <p:nvPr>
             <p:extLst>
               <p:ext uri="{386F3935-93C4-4BCD-93E2-E3B085C9AB24}">
-                <p16:designElem xmlns:p16="http://schemas.microsoft.com/office/powerpoint/2015/main" xmlns="" val="1"/>
+                <p16:designElem xmlns:p16="http://schemas.microsoft.com/office/powerpoint/2015/main" val="1"/>
               </p:ext>
             </p:extLst>
           </p:nvPr>
@@ -3766,6 +3768,147 @@
 </p:sld>
 </file>
 
+<file path=ppt/slides/slide10.xml><?xml version="1.0" encoding="utf-8"?>
+<p:sld xmlns:a="http://schemas.openxmlformats.org/drawingml/2006/main" xmlns:r="http://schemas.openxmlformats.org/officeDocument/2006/relationships" xmlns:p="http://schemas.openxmlformats.org/presentationml/2006/main">
+  <p:cSld>
+    <p:spTree>
+      <p:nvGrpSpPr>
+        <p:cNvPr id="1" name=""/>
+        <p:cNvGrpSpPr/>
+        <p:nvPr/>
+      </p:nvGrpSpPr>
+      <p:grpSpPr>
+        <a:xfrm>
+          <a:off x="0" y="0"/>
+          <a:ext cx="0" cy="0"/>
+          <a:chOff x="0" y="0"/>
+          <a:chExt cx="0" cy="0"/>
+        </a:xfrm>
+      </p:grpSpPr>
+      <p:sp>
+        <p:nvSpPr>
+          <p:cNvPr id="2" name="Titel 1"/>
+          <p:cNvSpPr>
+            <a:spLocks noGrp="1"/>
+          </p:cNvSpPr>
+          <p:nvPr>
+            <p:ph type="title"/>
+          </p:nvPr>
+        </p:nvSpPr>
+        <p:spPr/>
+        <p:txBody>
+          <a:bodyPr/>
+          <a:lstStyle/>
+          <a:p>
+            <a:r>
+              <a:rPr lang="de-DE" dirty="0"/>
+              <a:t>Fazit</a:t>
+            </a:r>
+          </a:p>
+        </p:txBody>
+      </p:sp>
+      <p:sp>
+        <p:nvSpPr>
+          <p:cNvPr id="3" name="Inhaltsplatzhalter 2"/>
+          <p:cNvSpPr>
+            <a:spLocks noGrp="1"/>
+          </p:cNvSpPr>
+          <p:nvPr>
+            <p:ph idx="1"/>
+          </p:nvPr>
+        </p:nvSpPr>
+        <p:spPr/>
+        <p:txBody>
+          <a:bodyPr/>
+          <a:lstStyle/>
+          <a:p>
+            <a:r>
+              <a:rPr lang="de-DE" dirty="0"/>
+              <a:t>Erstellung des Grob- und Feinkonzepts zu Beginn war sehr hilfreich</a:t>
+            </a:r>
+          </a:p>
+          <a:p>
+            <a:r>
+              <a:rPr lang="de-DE" dirty="0"/>
+              <a:t>Kommunikation im Team und Gruppendynamik war gut</a:t>
+            </a:r>
+          </a:p>
+          <a:p>
+            <a:r>
+              <a:rPr lang="de-DE" dirty="0"/>
+              <a:t>Planung war zum Teil schwierig</a:t>
+            </a:r>
+          </a:p>
+          <a:p>
+            <a:r>
+              <a:rPr lang="de-DE"/>
+              <a:t>Missverständnisse bei den Anforderungen</a:t>
+            </a:r>
+            <a:endParaRPr lang="de-DE" dirty="0"/>
+          </a:p>
+          <a:p>
+            <a:endParaRPr lang="de-DE" dirty="0"/>
+          </a:p>
+        </p:txBody>
+      </p:sp>
+      <p:sp>
+        <p:nvSpPr>
+          <p:cNvPr id="4" name="Fußzeilenplatzhalter 3"/>
+          <p:cNvSpPr>
+            <a:spLocks noGrp="1"/>
+          </p:cNvSpPr>
+          <p:nvPr>
+            <p:ph type="ftr" sz="quarter" idx="11"/>
+          </p:nvPr>
+        </p:nvSpPr>
+        <p:spPr/>
+        <p:txBody>
+          <a:bodyPr/>
+          <a:lstStyle/>
+          <a:p>
+            <a:r>
+              <a:rPr lang="de-DE"/>
+              <a:t>WS19/20 - PV-Modulportal - Rüffer, Vorwerk, Withöft, Zolkin</a:t>
+            </a:r>
+          </a:p>
+        </p:txBody>
+      </p:sp>
+      <p:sp>
+        <p:nvSpPr>
+          <p:cNvPr id="5" name="Foliennummernplatzhalter 4"/>
+          <p:cNvSpPr>
+            <a:spLocks noGrp="1"/>
+          </p:cNvSpPr>
+          <p:nvPr>
+            <p:ph type="sldNum" sz="quarter" idx="12"/>
+          </p:nvPr>
+        </p:nvSpPr>
+        <p:spPr/>
+        <p:txBody>
+          <a:bodyPr/>
+          <a:lstStyle/>
+          <a:p>
+            <a:fld id="{969E759D-A893-4B96-8B48-96EE547EBC41}" type="slidenum">
+              <a:rPr lang="de-DE" smtClean="0"/>
+              <a:t>10</a:t>
+            </a:fld>
+            <a:endParaRPr lang="de-DE"/>
+          </a:p>
+        </p:txBody>
+      </p:sp>
+    </p:spTree>
+    <p:extLst>
+      <p:ext uri="{BB962C8B-B14F-4D97-AF65-F5344CB8AC3E}">
+        <p14:creationId xmlns:p14="http://schemas.microsoft.com/office/powerpoint/2010/main" val="2130456695"/>
+      </p:ext>
+    </p:extLst>
+  </p:cSld>
+  <p:clrMapOvr>
+    <a:masterClrMapping/>
+  </p:clrMapOvr>
+</p:sld>
+</file>
+
 <file path=ppt/slides/slide2.xml><?xml version="1.0" encoding="utf-8"?>
 <p:sld xmlns:a="http://schemas.openxmlformats.org/drawingml/2006/main" xmlns:r="http://schemas.openxmlformats.org/officeDocument/2006/relationships" xmlns:p="http://schemas.openxmlformats.org/presentationml/2006/main">
   <p:cSld>
@@ -3796,10 +3939,10 @@
           <p:cNvPr id="10" name="Rectangle 9">
             <a:extLst>
               <a:ext uri="{FF2B5EF4-FFF2-40B4-BE49-F238E27FC236}">
-                <a16:creationId xmlns:a16="http://schemas.microsoft.com/office/drawing/2014/main" xmlns="" id="{8D70B121-56F4-4848-B38B-182089D909FA}"/>
+                <a16:creationId xmlns:a16="http://schemas.microsoft.com/office/drawing/2014/main" id="{8D70B121-56F4-4848-B38B-182089D909FA}"/>
               </a:ext>
               <a:ext uri="{C183D7F6-B498-43B3-948B-1728B52AA6E4}">
-                <adec:decorative xmlns:adec="http://schemas.microsoft.com/office/drawing/2017/decorative" xmlns="" val="1"/>
+                <adec:decorative xmlns:adec="http://schemas.microsoft.com/office/drawing/2017/decorative" val="1"/>
               </a:ext>
             </a:extLst>
           </p:cNvPr>
@@ -3809,7 +3952,7 @@
           <p:nvPr>
             <p:extLst>
               <p:ext uri="{386F3935-93C4-4BCD-93E2-E3B085C9AB24}">
-                <p16:designElem xmlns:p16="http://schemas.microsoft.com/office/powerpoint/2015/main" xmlns="" val="1"/>
+                <p16:designElem xmlns:p16="http://schemas.microsoft.com/office/powerpoint/2015/main" val="1"/>
               </p:ext>
             </p:extLst>
           </p:nvPr>
@@ -3890,7 +4033,7 @@
           <p:cNvPr id="2" name="Title 1">
             <a:extLst>
               <a:ext uri="{FF2B5EF4-FFF2-40B4-BE49-F238E27FC236}">
-                <a16:creationId xmlns:a16="http://schemas.microsoft.com/office/drawing/2014/main" xmlns="" id="{ACE6EB8D-0A4F-46AA-AF64-E268DD01B696}"/>
+                <a16:creationId xmlns:a16="http://schemas.microsoft.com/office/drawing/2014/main" id="{ACE6EB8D-0A4F-46AA-AF64-E268DD01B696}"/>
               </a:ext>
             </a:extLst>
           </p:cNvPr>
@@ -3935,10 +4078,10 @@
           <p:cNvPr id="20" name="Straight Connector 11">
             <a:extLst>
               <a:ext uri="{FF2B5EF4-FFF2-40B4-BE49-F238E27FC236}">
-                <a16:creationId xmlns:a16="http://schemas.microsoft.com/office/drawing/2014/main" xmlns="" id="{2D72A2C9-F3CA-4216-8BAD-FA4C970C3C4E}"/>
+                <a16:creationId xmlns:a16="http://schemas.microsoft.com/office/drawing/2014/main" id="{2D72A2C9-F3CA-4216-8BAD-FA4C970C3C4E}"/>
               </a:ext>
               <a:ext uri="{C183D7F6-B498-43B3-948B-1728B52AA6E4}">
-                <adec:decorative xmlns:adec="http://schemas.microsoft.com/office/drawing/2017/decorative" xmlns="" val="1"/>
+                <adec:decorative xmlns:adec="http://schemas.microsoft.com/office/drawing/2017/decorative" val="1"/>
               </a:ext>
             </a:extLst>
           </p:cNvPr>
@@ -3948,7 +4091,7 @@
           <p:nvPr>
             <p:extLst>
               <p:ext uri="{386F3935-93C4-4BCD-93E2-E3B085C9AB24}">
-                <p16:designElem xmlns:p16="http://schemas.microsoft.com/office/powerpoint/2015/main" xmlns="" val="1"/>
+                <p16:designElem xmlns:p16="http://schemas.microsoft.com/office/powerpoint/2015/main" val="1"/>
               </p:ext>
             </p:extLst>
           </p:nvPr>
@@ -3990,7 +4133,7 @@
           <p:cNvPr id="21" name="Content Placeholder 2">
             <a:extLst>
               <a:ext uri="{FF2B5EF4-FFF2-40B4-BE49-F238E27FC236}">
-                <a16:creationId xmlns:a16="http://schemas.microsoft.com/office/drawing/2014/main" xmlns="" id="{58AE7285-2250-4AE8-93ED-187E4BCFFE55}"/>
+                <a16:creationId xmlns:a16="http://schemas.microsoft.com/office/drawing/2014/main" id="{58AE7285-2250-4AE8-93ED-187E4BCFFE55}"/>
               </a:ext>
             </a:extLst>
           </p:cNvPr>
@@ -4188,7 +4331,7 @@
           <p:cNvPr id="4" name="Footer Placeholder 3">
             <a:extLst>
               <a:ext uri="{FF2B5EF4-FFF2-40B4-BE49-F238E27FC236}">
-                <a16:creationId xmlns:a16="http://schemas.microsoft.com/office/drawing/2014/main" xmlns="" id="{49971016-FBB9-4FE9-A94D-721F4E0A6EF7}"/>
+                <a16:creationId xmlns:a16="http://schemas.microsoft.com/office/drawing/2014/main" id="{49971016-FBB9-4FE9-A94D-721F4E0A6EF7}"/>
               </a:ext>
             </a:extLst>
           </p:cNvPr>
@@ -4255,7 +4398,7 @@
           <p:cNvPr id="5" name="Slide Number Placeholder 4">
             <a:extLst>
               <a:ext uri="{FF2B5EF4-FFF2-40B4-BE49-F238E27FC236}">
-                <a16:creationId xmlns:a16="http://schemas.microsoft.com/office/drawing/2014/main" xmlns="" id="{D5EC5FDC-86E9-486E-98A5-8B49B12E54F7}"/>
+                <a16:creationId xmlns:a16="http://schemas.microsoft.com/office/drawing/2014/main" id="{D5EC5FDC-86E9-486E-98A5-8B49B12E54F7}"/>
               </a:ext>
             </a:extLst>
           </p:cNvPr>
@@ -4385,7 +4528,7 @@
           <p:cNvPr id="2" name="Title 1">
             <a:extLst>
               <a:ext uri="{FF2B5EF4-FFF2-40B4-BE49-F238E27FC236}">
-                <a16:creationId xmlns:a16="http://schemas.microsoft.com/office/drawing/2014/main" xmlns="" id="{15066376-BDA9-42B0-B399-BBF455FEAB84}"/>
+                <a16:creationId xmlns:a16="http://schemas.microsoft.com/office/drawing/2014/main" id="{15066376-BDA9-42B0-B399-BBF455FEAB84}"/>
               </a:ext>
             </a:extLst>
           </p:cNvPr>
@@ -4419,7 +4562,7 @@
           <p:cNvPr id="3" name="Content Placeholder 2">
             <a:extLst>
               <a:ext uri="{FF2B5EF4-FFF2-40B4-BE49-F238E27FC236}">
-                <a16:creationId xmlns:a16="http://schemas.microsoft.com/office/drawing/2014/main" xmlns="" id="{0FBAFCDA-66B7-4892-8C91-69D5101FD3EE}"/>
+                <a16:creationId xmlns:a16="http://schemas.microsoft.com/office/drawing/2014/main" id="{0FBAFCDA-66B7-4892-8C91-69D5101FD3EE}"/>
               </a:ext>
             </a:extLst>
           </p:cNvPr>
@@ -4573,7 +4716,7 @@
           <p:cNvPr id="4" name="Footer Placeholder 3">
             <a:extLst>
               <a:ext uri="{FF2B5EF4-FFF2-40B4-BE49-F238E27FC236}">
-                <a16:creationId xmlns:a16="http://schemas.microsoft.com/office/drawing/2014/main" xmlns="" id="{5F1B4AEF-1956-4FA4-AF17-52F5FA22EA93}"/>
+                <a16:creationId xmlns:a16="http://schemas.microsoft.com/office/drawing/2014/main" id="{5F1B4AEF-1956-4FA4-AF17-52F5FA22EA93}"/>
               </a:ext>
             </a:extLst>
           </p:cNvPr>
@@ -4607,7 +4750,7 @@
           <p:cNvPr id="5" name="Slide Number Placeholder 4">
             <a:extLst>
               <a:ext uri="{FF2B5EF4-FFF2-40B4-BE49-F238E27FC236}">
-                <a16:creationId xmlns:a16="http://schemas.microsoft.com/office/drawing/2014/main" xmlns="" id="{D87CE355-2B04-4F17-8E3C-AE813E70FDE4}"/>
+                <a16:creationId xmlns:a16="http://schemas.microsoft.com/office/drawing/2014/main" id="{D87CE355-2B04-4F17-8E3C-AE813E70FDE4}"/>
               </a:ext>
             </a:extLst>
           </p:cNvPr>
@@ -4679,7 +4822,7 @@
           <p:cNvPr id="2" name="Title 1">
             <a:extLst>
               <a:ext uri="{FF2B5EF4-FFF2-40B4-BE49-F238E27FC236}">
-                <a16:creationId xmlns:a16="http://schemas.microsoft.com/office/drawing/2014/main" xmlns="" id="{0754DA76-FBA9-4255-9F8F-DBD2A5E204F0}"/>
+                <a16:creationId xmlns:a16="http://schemas.microsoft.com/office/drawing/2014/main" id="{0754DA76-FBA9-4255-9F8F-DBD2A5E204F0}"/>
               </a:ext>
             </a:extLst>
           </p:cNvPr>
@@ -4715,7 +4858,7 @@
           <p:cNvPr id="7" name="Picture 6" descr="A screenshot of a cell phone&#10;&#10;Description automatically generated">
             <a:extLst>
               <a:ext uri="{FF2B5EF4-FFF2-40B4-BE49-F238E27FC236}">
-                <a16:creationId xmlns:a16="http://schemas.microsoft.com/office/drawing/2014/main" xmlns="" id="{ABEF1177-6BDC-4C82-AAB5-58804151FB71}"/>
+                <a16:creationId xmlns:a16="http://schemas.microsoft.com/office/drawing/2014/main" id="{ABEF1177-6BDC-4C82-AAB5-58804151FB71}"/>
               </a:ext>
             </a:extLst>
           </p:cNvPr>
@@ -4751,10 +4894,10 @@
           <p:cNvPr id="12" name="Freeform: Shape 11">
             <a:extLst>
               <a:ext uri="{FF2B5EF4-FFF2-40B4-BE49-F238E27FC236}">
-                <a16:creationId xmlns:a16="http://schemas.microsoft.com/office/drawing/2014/main" xmlns="" id="{C607803A-4E99-444E-94F7-8785CDDF5849}"/>
+                <a16:creationId xmlns:a16="http://schemas.microsoft.com/office/drawing/2014/main" id="{C607803A-4E99-444E-94F7-8785CDDF5849}"/>
               </a:ext>
               <a:ext uri="{C183D7F6-B498-43B3-948B-1728B52AA6E4}">
-                <adec:decorative xmlns:adec="http://schemas.microsoft.com/office/drawing/2017/decorative" xmlns="" val="1"/>
+                <adec:decorative xmlns:adec="http://schemas.microsoft.com/office/drawing/2017/decorative" val="1"/>
               </a:ext>
             </a:extLst>
           </p:cNvPr>
@@ -4764,7 +4907,7 @@
           <p:nvPr>
             <p:extLst>
               <p:ext uri="{386F3935-93C4-4BCD-93E2-E3B085C9AB24}">
-                <p16:designElem xmlns:p16="http://schemas.microsoft.com/office/powerpoint/2015/main" xmlns="" val="1"/>
+                <p16:designElem xmlns:p16="http://schemas.microsoft.com/office/powerpoint/2015/main" val="1"/>
               </p:ext>
             </p:extLst>
           </p:nvPr>
@@ -4855,10 +4998,10 @@
           <p:cNvPr id="14" name="Freeform: Shape 13">
             <a:extLst>
               <a:ext uri="{FF2B5EF4-FFF2-40B4-BE49-F238E27FC236}">
-                <a16:creationId xmlns:a16="http://schemas.microsoft.com/office/drawing/2014/main" xmlns="" id="{2989BE6A-C309-418E-8ADD-1616A980570D}"/>
+                <a16:creationId xmlns:a16="http://schemas.microsoft.com/office/drawing/2014/main" id="{2989BE6A-C309-418E-8ADD-1616A980570D}"/>
               </a:ext>
               <a:ext uri="{C183D7F6-B498-43B3-948B-1728B52AA6E4}">
-                <adec:decorative xmlns:adec="http://schemas.microsoft.com/office/drawing/2017/decorative" xmlns="" val="1"/>
+                <adec:decorative xmlns:adec="http://schemas.microsoft.com/office/drawing/2017/decorative" val="1"/>
               </a:ext>
             </a:extLst>
           </p:cNvPr>
@@ -4868,7 +5011,7 @@
           <p:nvPr>
             <p:extLst>
               <p:ext uri="{386F3935-93C4-4BCD-93E2-E3B085C9AB24}">
-                <p16:designElem xmlns:p16="http://schemas.microsoft.com/office/powerpoint/2015/main" xmlns="" val="1"/>
+                <p16:designElem xmlns:p16="http://schemas.microsoft.com/office/powerpoint/2015/main" val="1"/>
               </p:ext>
             </p:extLst>
           </p:nvPr>
@@ -4996,7 +5139,7 @@
           <p:cNvPr id="3" name="Content Placeholder 2">
             <a:extLst>
               <a:ext uri="{FF2B5EF4-FFF2-40B4-BE49-F238E27FC236}">
-                <a16:creationId xmlns:a16="http://schemas.microsoft.com/office/drawing/2014/main" xmlns="" id="{A42C7976-7264-4148-AD03-59E4B4F7C697}"/>
+                <a16:creationId xmlns:a16="http://schemas.microsoft.com/office/drawing/2014/main" id="{A42C7976-7264-4148-AD03-59E4B4F7C697}"/>
               </a:ext>
             </a:extLst>
           </p:cNvPr>
@@ -5091,7 +5234,7 @@
           <p:cNvPr id="4" name="Footer Placeholder 3">
             <a:extLst>
               <a:ext uri="{FF2B5EF4-FFF2-40B4-BE49-F238E27FC236}">
-                <a16:creationId xmlns:a16="http://schemas.microsoft.com/office/drawing/2014/main" xmlns="" id="{E4E0C278-526A-4003-B85A-72429B341BB6}"/>
+                <a16:creationId xmlns:a16="http://schemas.microsoft.com/office/drawing/2014/main" id="{E4E0C278-526A-4003-B85A-72429B341BB6}"/>
               </a:ext>
             </a:extLst>
           </p:cNvPr>
@@ -5137,7 +5280,7 @@
           <p:cNvPr id="5" name="Slide Number Placeholder 4">
             <a:extLst>
               <a:ext uri="{FF2B5EF4-FFF2-40B4-BE49-F238E27FC236}">
-                <a16:creationId xmlns:a16="http://schemas.microsoft.com/office/drawing/2014/main" xmlns="" id="{A92E81ED-7F21-418B-B91B-7B27BAA6E5C0}"/>
+                <a16:creationId xmlns:a16="http://schemas.microsoft.com/office/drawing/2014/main" id="{A92E81ED-7F21-418B-B91B-7B27BAA6E5C0}"/>
               </a:ext>
             </a:extLst>
           </p:cNvPr>
@@ -5233,7 +5376,7 @@
           <p:cNvPr id="2" name="Title 1">
             <a:extLst>
               <a:ext uri="{FF2B5EF4-FFF2-40B4-BE49-F238E27FC236}">
-                <a16:creationId xmlns:a16="http://schemas.microsoft.com/office/drawing/2014/main" xmlns="" id="{D0F7DBBA-40E4-45A3-ACD0-6F25C32BF6C6}"/>
+                <a16:creationId xmlns:a16="http://schemas.microsoft.com/office/drawing/2014/main" id="{D0F7DBBA-40E4-45A3-ACD0-6F25C32BF6C6}"/>
               </a:ext>
             </a:extLst>
           </p:cNvPr>
@@ -5269,7 +5412,7 @@
           <p:cNvPr id="11" name="Picture 10" descr="A screenshot of a cell phone&#10;&#10;Description automatically generated">
             <a:extLst>
               <a:ext uri="{FF2B5EF4-FFF2-40B4-BE49-F238E27FC236}">
-                <a16:creationId xmlns:a16="http://schemas.microsoft.com/office/drawing/2014/main" xmlns="" id="{EC8D9439-AB1B-4EEA-8BA5-227492613A4C}"/>
+                <a16:creationId xmlns:a16="http://schemas.microsoft.com/office/drawing/2014/main" id="{EC8D9439-AB1B-4EEA-8BA5-227492613A4C}"/>
               </a:ext>
             </a:extLst>
           </p:cNvPr>
@@ -5305,10 +5448,10 @@
           <p:cNvPr id="19" name="Freeform: Shape 15">
             <a:extLst>
               <a:ext uri="{FF2B5EF4-FFF2-40B4-BE49-F238E27FC236}">
-                <a16:creationId xmlns:a16="http://schemas.microsoft.com/office/drawing/2014/main" xmlns="" id="{C607803A-4E99-444E-94F7-8785CDDF5849}"/>
+                <a16:creationId xmlns:a16="http://schemas.microsoft.com/office/drawing/2014/main" id="{C607803A-4E99-444E-94F7-8785CDDF5849}"/>
               </a:ext>
               <a:ext uri="{C183D7F6-B498-43B3-948B-1728B52AA6E4}">
-                <adec:decorative xmlns:adec="http://schemas.microsoft.com/office/drawing/2017/decorative" xmlns="" val="1"/>
+                <adec:decorative xmlns:adec="http://schemas.microsoft.com/office/drawing/2017/decorative" val="1"/>
               </a:ext>
             </a:extLst>
           </p:cNvPr>
@@ -5318,7 +5461,7 @@
           <p:nvPr>
             <p:extLst>
               <p:ext uri="{386F3935-93C4-4BCD-93E2-E3B085C9AB24}">
-                <p16:designElem xmlns:p16="http://schemas.microsoft.com/office/powerpoint/2015/main" xmlns="" val="1"/>
+                <p16:designElem xmlns:p16="http://schemas.microsoft.com/office/powerpoint/2015/main" val="1"/>
               </p:ext>
             </p:extLst>
           </p:nvPr>
@@ -5409,10 +5552,10 @@
           <p:cNvPr id="18" name="Freeform: Shape 17">
             <a:extLst>
               <a:ext uri="{FF2B5EF4-FFF2-40B4-BE49-F238E27FC236}">
-                <a16:creationId xmlns:a16="http://schemas.microsoft.com/office/drawing/2014/main" xmlns="" id="{2989BE6A-C309-418E-8ADD-1616A980570D}"/>
+                <a16:creationId xmlns:a16="http://schemas.microsoft.com/office/drawing/2014/main" id="{2989BE6A-C309-418E-8ADD-1616A980570D}"/>
               </a:ext>
               <a:ext uri="{C183D7F6-B498-43B3-948B-1728B52AA6E4}">
-                <adec:decorative xmlns:adec="http://schemas.microsoft.com/office/drawing/2017/decorative" xmlns="" val="1"/>
+                <adec:decorative xmlns:adec="http://schemas.microsoft.com/office/drawing/2017/decorative" val="1"/>
               </a:ext>
             </a:extLst>
           </p:cNvPr>
@@ -5422,7 +5565,7 @@
           <p:nvPr>
             <p:extLst>
               <p:ext uri="{386F3935-93C4-4BCD-93E2-E3B085C9AB24}">
-                <p16:designElem xmlns:p16="http://schemas.microsoft.com/office/powerpoint/2015/main" xmlns="" val="1"/>
+                <p16:designElem xmlns:p16="http://schemas.microsoft.com/office/powerpoint/2015/main" val="1"/>
               </p:ext>
             </p:extLst>
           </p:nvPr>
@@ -5550,7 +5693,7 @@
           <p:cNvPr id="9" name="Content Placeholder 8">
             <a:extLst>
               <a:ext uri="{FF2B5EF4-FFF2-40B4-BE49-F238E27FC236}">
-                <a16:creationId xmlns:a16="http://schemas.microsoft.com/office/drawing/2014/main" xmlns="" id="{020673C7-CB6D-4F67-ABF0-DE2C50E51566}"/>
+                <a16:creationId xmlns:a16="http://schemas.microsoft.com/office/drawing/2014/main" id="{020673C7-CB6D-4F67-ABF0-DE2C50E51566}"/>
               </a:ext>
             </a:extLst>
           </p:cNvPr>
@@ -5591,7 +5734,7 @@
           <p:cNvPr id="4" name="Footer Placeholder 3">
             <a:extLst>
               <a:ext uri="{FF2B5EF4-FFF2-40B4-BE49-F238E27FC236}">
-                <a16:creationId xmlns:a16="http://schemas.microsoft.com/office/drawing/2014/main" xmlns="" id="{5E901347-E5AB-4A86-8D5E-33FABF95AA3A}"/>
+                <a16:creationId xmlns:a16="http://schemas.microsoft.com/office/drawing/2014/main" id="{5E901347-E5AB-4A86-8D5E-33FABF95AA3A}"/>
               </a:ext>
             </a:extLst>
           </p:cNvPr>
@@ -5637,7 +5780,7 @@
           <p:cNvPr id="5" name="Slide Number Placeholder 4">
             <a:extLst>
               <a:ext uri="{FF2B5EF4-FFF2-40B4-BE49-F238E27FC236}">
-                <a16:creationId xmlns:a16="http://schemas.microsoft.com/office/drawing/2014/main" xmlns="" id="{409F682C-D2C9-4003-BF7F-EDBFC5A4DF22}"/>
+                <a16:creationId xmlns:a16="http://schemas.microsoft.com/office/drawing/2014/main" id="{409F682C-D2C9-4003-BF7F-EDBFC5A4DF22}"/>
               </a:ext>
             </a:extLst>
           </p:cNvPr>
@@ -5733,7 +5876,7 @@
           <p:cNvPr id="2" name="Title 1">
             <a:extLst>
               <a:ext uri="{FF2B5EF4-FFF2-40B4-BE49-F238E27FC236}">
-                <a16:creationId xmlns:a16="http://schemas.microsoft.com/office/drawing/2014/main" xmlns="" id="{7FB8FAAD-55D4-4F7B-A3E3-56C2607E59AC}"/>
+                <a16:creationId xmlns:a16="http://schemas.microsoft.com/office/drawing/2014/main" id="{7FB8FAAD-55D4-4F7B-A3E3-56C2607E59AC}"/>
               </a:ext>
             </a:extLst>
           </p:cNvPr>
@@ -5769,7 +5912,7 @@
           <p:cNvPr id="7" name="Content Placeholder 6" descr="A screenshot of a cell phone&#10;&#10;Description automatically generated">
             <a:extLst>
               <a:ext uri="{FF2B5EF4-FFF2-40B4-BE49-F238E27FC236}">
-                <a16:creationId xmlns:a16="http://schemas.microsoft.com/office/drawing/2014/main" xmlns="" id="{D42E2C0D-B957-49ED-A36D-F2E34026D6B7}"/>
+                <a16:creationId xmlns:a16="http://schemas.microsoft.com/office/drawing/2014/main" id="{D42E2C0D-B957-49ED-A36D-F2E34026D6B7}"/>
               </a:ext>
             </a:extLst>
           </p:cNvPr>
@@ -5805,10 +5948,10 @@
           <p:cNvPr id="14" name="Freeform: Shape 13">
             <a:extLst>
               <a:ext uri="{FF2B5EF4-FFF2-40B4-BE49-F238E27FC236}">
-                <a16:creationId xmlns:a16="http://schemas.microsoft.com/office/drawing/2014/main" xmlns="" id="{C607803A-4E99-444E-94F7-8785CDDF5849}"/>
+                <a16:creationId xmlns:a16="http://schemas.microsoft.com/office/drawing/2014/main" id="{C607803A-4E99-444E-94F7-8785CDDF5849}"/>
               </a:ext>
               <a:ext uri="{C183D7F6-B498-43B3-948B-1728B52AA6E4}">
-                <adec:decorative xmlns:adec="http://schemas.microsoft.com/office/drawing/2017/decorative" xmlns="" val="1"/>
+                <adec:decorative xmlns:adec="http://schemas.microsoft.com/office/drawing/2017/decorative" val="1"/>
               </a:ext>
             </a:extLst>
           </p:cNvPr>
@@ -5818,7 +5961,7 @@
           <p:nvPr>
             <p:extLst>
               <p:ext uri="{386F3935-93C4-4BCD-93E2-E3B085C9AB24}">
-                <p16:designElem xmlns:p16="http://schemas.microsoft.com/office/powerpoint/2015/main" xmlns="" val="1"/>
+                <p16:designElem xmlns:p16="http://schemas.microsoft.com/office/powerpoint/2015/main" val="1"/>
               </p:ext>
             </p:extLst>
           </p:nvPr>
@@ -5909,10 +6052,10 @@
           <p:cNvPr id="16" name="Freeform: Shape 15">
             <a:extLst>
               <a:ext uri="{FF2B5EF4-FFF2-40B4-BE49-F238E27FC236}">
-                <a16:creationId xmlns:a16="http://schemas.microsoft.com/office/drawing/2014/main" xmlns="" id="{2989BE6A-C309-418E-8ADD-1616A980570D}"/>
+                <a16:creationId xmlns:a16="http://schemas.microsoft.com/office/drawing/2014/main" id="{2989BE6A-C309-418E-8ADD-1616A980570D}"/>
               </a:ext>
               <a:ext uri="{C183D7F6-B498-43B3-948B-1728B52AA6E4}">
-                <adec:decorative xmlns:adec="http://schemas.microsoft.com/office/drawing/2017/decorative" xmlns="" val="1"/>
+                <adec:decorative xmlns:adec="http://schemas.microsoft.com/office/drawing/2017/decorative" val="1"/>
               </a:ext>
             </a:extLst>
           </p:cNvPr>
@@ -5922,7 +6065,7 @@
           <p:nvPr>
             <p:extLst>
               <p:ext uri="{386F3935-93C4-4BCD-93E2-E3B085C9AB24}">
-                <p16:designElem xmlns:p16="http://schemas.microsoft.com/office/powerpoint/2015/main" xmlns="" val="1"/>
+                <p16:designElem xmlns:p16="http://schemas.microsoft.com/office/powerpoint/2015/main" val="1"/>
               </p:ext>
             </p:extLst>
           </p:nvPr>
@@ -6050,7 +6193,7 @@
           <p:cNvPr id="11" name="Content Placeholder 10">
             <a:extLst>
               <a:ext uri="{FF2B5EF4-FFF2-40B4-BE49-F238E27FC236}">
-                <a16:creationId xmlns:a16="http://schemas.microsoft.com/office/drawing/2014/main" xmlns="" id="{8DC07883-6FEB-4246-BFE9-889DDCF1DD98}"/>
+                <a16:creationId xmlns:a16="http://schemas.microsoft.com/office/drawing/2014/main" id="{8DC07883-6FEB-4246-BFE9-889DDCF1DD98}"/>
               </a:ext>
             </a:extLst>
           </p:cNvPr>
@@ -6121,7 +6264,7 @@
           <p:cNvPr id="4" name="Footer Placeholder 3">
             <a:extLst>
               <a:ext uri="{FF2B5EF4-FFF2-40B4-BE49-F238E27FC236}">
-                <a16:creationId xmlns:a16="http://schemas.microsoft.com/office/drawing/2014/main" xmlns="" id="{4F1639C5-FA60-4BF7-98BA-05F3753189A9}"/>
+                <a16:creationId xmlns:a16="http://schemas.microsoft.com/office/drawing/2014/main" id="{4F1639C5-FA60-4BF7-98BA-05F3753189A9}"/>
               </a:ext>
             </a:extLst>
           </p:cNvPr>
@@ -6167,7 +6310,7 @@
           <p:cNvPr id="5" name="Slide Number Placeholder 4">
             <a:extLst>
               <a:ext uri="{FF2B5EF4-FFF2-40B4-BE49-F238E27FC236}">
-                <a16:creationId xmlns:a16="http://schemas.microsoft.com/office/drawing/2014/main" xmlns="" id="{A6093915-6888-4B2E-A7DB-162E0D0C61DB}"/>
+                <a16:creationId xmlns:a16="http://schemas.microsoft.com/office/drawing/2014/main" id="{A6093915-6888-4B2E-A7DB-162E0D0C61DB}"/>
               </a:ext>
             </a:extLst>
           </p:cNvPr>
@@ -6252,7 +6395,13 @@
       </p:grpSpPr>
       <p:sp>
         <p:nvSpPr>
-          <p:cNvPr id="2" name="Titel 1"/>
+          <p:cNvPr id="2" name="Title 1">
+            <a:extLst>
+              <a:ext uri="{FF2B5EF4-FFF2-40B4-BE49-F238E27FC236}">
+                <a16:creationId xmlns:a16="http://schemas.microsoft.com/office/drawing/2014/main" id="{4C84315F-315F-4066-9D3A-472733691F27}"/>
+              </a:ext>
+            </a:extLst>
+          </p:cNvPr>
           <p:cNvSpPr>
             <a:spLocks noGrp="1"/>
           </p:cNvSpPr>
@@ -6262,83 +6411,271 @@
         </p:nvSpPr>
         <p:spPr/>
         <p:txBody>
+          <a:bodyPr>
+            <a:normAutofit fontScale="90000"/>
+          </a:bodyPr>
+          <a:lstStyle/>
+          <a:p>
+            <a:r>
+              <a:rPr lang="en-NZ" dirty="0" err="1"/>
+              <a:t>Codeimplementierungen</a:t>
+            </a:r>
+            <a:r>
+              <a:rPr lang="en-NZ" dirty="0"/>
+              <a:t>    – 	Handling der 									</a:t>
+            </a:r>
+            <a:r>
+              <a:rPr lang="en-NZ" dirty="0" err="1"/>
+              <a:t>Suchergebnisse</a:t>
+            </a:r>
+            <a:endParaRPr lang="de-DE" dirty="0"/>
+          </a:p>
+        </p:txBody>
+      </p:sp>
+      <p:sp>
+        <p:nvSpPr>
+          <p:cNvPr id="3" name="Content Placeholder 2">
+            <a:extLst>
+              <a:ext uri="{FF2B5EF4-FFF2-40B4-BE49-F238E27FC236}">
+                <a16:creationId xmlns:a16="http://schemas.microsoft.com/office/drawing/2014/main" id="{3CCB48FF-D0DB-4239-BF7B-3AC940333DEC}"/>
+              </a:ext>
+            </a:extLst>
+          </p:cNvPr>
+          <p:cNvSpPr>
+            <a:spLocks noGrp="1"/>
+          </p:cNvSpPr>
+          <p:nvPr>
+            <p:ph sz="half" idx="1"/>
+          </p:nvPr>
+        </p:nvSpPr>
+        <p:spPr/>
+        <p:txBody>
+          <a:bodyPr>
+            <a:normAutofit/>
+          </a:bodyPr>
+          <a:lstStyle/>
+          <a:p>
+            <a:r>
+              <a:rPr lang="en-NZ" dirty="0" err="1"/>
+              <a:t>Suchergebnis</a:t>
+            </a:r>
+            <a:r>
+              <a:rPr lang="en-NZ" dirty="0"/>
+              <a:t> </a:t>
+            </a:r>
+            <a:r>
+              <a:rPr lang="en-NZ" dirty="0" err="1"/>
+              <a:t>kann</a:t>
+            </a:r>
+            <a:r>
+              <a:rPr lang="en-NZ" dirty="0"/>
+              <a:t> sein:</a:t>
+            </a:r>
+          </a:p>
+          <a:p>
+            <a:pPr lvl="1"/>
+            <a:r>
+              <a:rPr lang="en-NZ" dirty="0" err="1"/>
+              <a:t>Hersteller</a:t>
+            </a:r>
+            <a:endParaRPr lang="en-NZ" dirty="0"/>
+          </a:p>
+          <a:p>
+            <a:pPr lvl="2"/>
+            <a:r>
+              <a:rPr lang="en-NZ" dirty="0" err="1"/>
+              <a:t>Suche</a:t>
+            </a:r>
+            <a:r>
+              <a:rPr lang="en-NZ" dirty="0"/>
+              <a:t> nach </a:t>
+            </a:r>
+            <a:r>
+              <a:rPr lang="en-NZ" dirty="0" err="1"/>
+              <a:t>Modultypen</a:t>
+            </a:r>
+            <a:endParaRPr lang="en-NZ" dirty="0"/>
+          </a:p>
+          <a:p>
+            <a:pPr lvl="1"/>
+            <a:r>
+              <a:rPr lang="en-NZ" dirty="0" err="1"/>
+              <a:t>Modultyp</a:t>
+            </a:r>
+            <a:endParaRPr lang="en-NZ" dirty="0"/>
+          </a:p>
+          <a:p>
+            <a:pPr lvl="2"/>
+            <a:r>
+              <a:rPr lang="en-NZ" dirty="0" err="1"/>
+              <a:t>Verweis</a:t>
+            </a:r>
+            <a:r>
+              <a:rPr lang="en-NZ" dirty="0"/>
+              <a:t> auf </a:t>
+            </a:r>
+            <a:r>
+              <a:rPr lang="en-NZ" dirty="0" err="1"/>
+              <a:t>Detailseite</a:t>
+            </a:r>
+            <a:endParaRPr lang="en-NZ" dirty="0"/>
+          </a:p>
+          <a:p>
+            <a:r>
+              <a:rPr lang="en-NZ" dirty="0" err="1"/>
+              <a:t>Werden</a:t>
+            </a:r>
+            <a:r>
+              <a:rPr lang="en-NZ" dirty="0"/>
+              <a:t> in </a:t>
+            </a:r>
+            <a:r>
+              <a:rPr lang="en-NZ" dirty="0" err="1"/>
+              <a:t>gleicher</a:t>
+            </a:r>
+            <a:r>
+              <a:rPr lang="en-NZ" dirty="0"/>
+              <a:t> </a:t>
+            </a:r>
+            <a:r>
+              <a:rPr lang="en-NZ" dirty="0" err="1"/>
+              <a:t>Methode</a:t>
+            </a:r>
+            <a:r>
+              <a:rPr lang="en-NZ" dirty="0"/>
+              <a:t> </a:t>
+            </a:r>
+            <a:r>
+              <a:rPr lang="en-NZ" dirty="0" err="1"/>
+              <a:t>zugefügt</a:t>
+            </a:r>
+            <a:endParaRPr lang="en-NZ" dirty="0"/>
+          </a:p>
+          <a:p>
+            <a:r>
+              <a:rPr lang="en-NZ" dirty="0" err="1"/>
+              <a:t>Idee</a:t>
+            </a:r>
+            <a:r>
+              <a:rPr lang="en-NZ" dirty="0"/>
+              <a:t>: </a:t>
+            </a:r>
+            <a:r>
+              <a:rPr lang="en-NZ" dirty="0" err="1"/>
+              <a:t>Enum</a:t>
+            </a:r>
+            <a:r>
+              <a:rPr lang="en-NZ" dirty="0"/>
+              <a:t> </a:t>
+            </a:r>
+            <a:r>
+              <a:rPr lang="en-NZ" dirty="0" err="1"/>
+              <a:t>zum</a:t>
+            </a:r>
+            <a:r>
+              <a:rPr lang="en-NZ" dirty="0"/>
+              <a:t> </a:t>
+            </a:r>
+            <a:r>
+              <a:rPr lang="en-NZ" dirty="0" err="1"/>
+              <a:t>Unterscheiden</a:t>
+            </a:r>
+            <a:endParaRPr lang="en-NZ" dirty="0"/>
+          </a:p>
+          <a:p>
+            <a:r>
+              <a:rPr lang="en-NZ" dirty="0" err="1"/>
+              <a:t>Vorteil</a:t>
+            </a:r>
+            <a:r>
+              <a:rPr lang="en-NZ" dirty="0"/>
+              <a:t>: </a:t>
+            </a:r>
+            <a:r>
+              <a:rPr lang="en-NZ" dirty="0" err="1"/>
+              <a:t>Keine</a:t>
+            </a:r>
+            <a:r>
+              <a:rPr lang="en-NZ" dirty="0"/>
+              <a:t> </a:t>
+            </a:r>
+            <a:r>
+              <a:rPr lang="en-NZ" dirty="0" err="1"/>
+              <a:t>zweite</a:t>
+            </a:r>
+            <a:r>
+              <a:rPr lang="en-NZ" dirty="0"/>
+              <a:t> </a:t>
+            </a:r>
+            <a:r>
+              <a:rPr lang="en-NZ" dirty="0" err="1"/>
+              <a:t>Methode</a:t>
+            </a:r>
+            <a:r>
+              <a:rPr lang="en-NZ" dirty="0"/>
+              <a:t> </a:t>
+            </a:r>
+            <a:r>
+              <a:rPr lang="en-NZ" dirty="0" err="1"/>
+              <a:t>für</a:t>
+            </a:r>
+            <a:r>
+              <a:rPr lang="en-NZ" dirty="0"/>
+              <a:t> </a:t>
+            </a:r>
+            <a:r>
+              <a:rPr lang="en-NZ" dirty="0" err="1"/>
+              <a:t>gleichen</a:t>
+            </a:r>
+            <a:r>
+              <a:rPr lang="en-NZ" dirty="0"/>
+              <a:t> </a:t>
+            </a:r>
+            <a:r>
+              <a:rPr lang="en-NZ" dirty="0" err="1"/>
+              <a:t>Anwendungsfall</a:t>
+            </a:r>
+            <a:endParaRPr lang="de-DE" dirty="0"/>
+          </a:p>
+        </p:txBody>
+      </p:sp>
+      <p:sp>
+        <p:nvSpPr>
+          <p:cNvPr id="4" name="Footer Placeholder 3">
+            <a:extLst>
+              <a:ext uri="{FF2B5EF4-FFF2-40B4-BE49-F238E27FC236}">
+                <a16:creationId xmlns:a16="http://schemas.microsoft.com/office/drawing/2014/main" id="{0EF7D1E5-7A19-4BA2-8CAA-9135FB90076C}"/>
+              </a:ext>
+            </a:extLst>
+          </p:cNvPr>
+          <p:cNvSpPr>
+            <a:spLocks noGrp="1"/>
+          </p:cNvSpPr>
+          <p:nvPr>
+            <p:ph type="ftr" sz="quarter" idx="11"/>
+          </p:nvPr>
+        </p:nvSpPr>
+        <p:spPr/>
+        <p:txBody>
           <a:bodyPr/>
           <a:lstStyle/>
           <a:p>
             <a:r>
-              <a:rPr lang="de-DE" dirty="0" smtClean="0"/>
-              <a:t>Ausblick</a:t>
-            </a:r>
-            <a:endParaRPr lang="de-DE" dirty="0"/>
-          </a:p>
-        </p:txBody>
-      </p:sp>
-      <p:sp>
-        <p:nvSpPr>
-          <p:cNvPr id="3" name="Inhaltsplatzhalter 2"/>
-          <p:cNvSpPr>
-            <a:spLocks noGrp="1"/>
-          </p:cNvSpPr>
-          <p:nvPr>
-            <p:ph idx="1"/>
-          </p:nvPr>
-        </p:nvSpPr>
-        <p:spPr/>
-        <p:txBody>
-          <a:bodyPr/>
-          <a:lstStyle/>
-          <a:p>
-            <a:r>
-              <a:rPr lang="de-DE" dirty="0" smtClean="0"/>
-              <a:t>Fertigstellung der Moduldetailseite</a:t>
-            </a:r>
-          </a:p>
-          <a:p>
-            <a:r>
-              <a:rPr lang="de-DE" dirty="0" smtClean="0"/>
-              <a:t>Modul-Upload Seite</a:t>
-            </a:r>
-          </a:p>
-          <a:p>
-            <a:r>
-              <a:rPr lang="de-DE" dirty="0" smtClean="0"/>
-              <a:t>Dokumentation</a:t>
-            </a:r>
-          </a:p>
-          <a:p>
-            <a:r>
-              <a:rPr lang="de-DE" dirty="0" smtClean="0"/>
-              <a:t>Projektbericht</a:t>
-            </a:r>
-          </a:p>
-        </p:txBody>
-      </p:sp>
-      <p:sp>
-        <p:nvSpPr>
-          <p:cNvPr id="4" name="Fußzeilenplatzhalter 3"/>
-          <p:cNvSpPr>
-            <a:spLocks noGrp="1"/>
-          </p:cNvSpPr>
-          <p:nvPr>
-            <p:ph type="ftr" sz="quarter" idx="11"/>
-          </p:nvPr>
-        </p:nvSpPr>
-        <p:spPr/>
-        <p:txBody>
-          <a:bodyPr/>
-          <a:lstStyle/>
-          <a:p>
-            <a:r>
-              <a:rPr lang="de-DE" smtClean="0"/>
+              <a:rPr lang="de-DE"/>
               <a:t>WS19/20 - PV-Modulportal - Rüffer, Vorwerk, Withöft, Zolkin</a:t>
             </a:r>
-            <a:endParaRPr lang="de-DE"/>
-          </a:p>
-        </p:txBody>
-      </p:sp>
-      <p:sp>
-        <p:nvSpPr>
-          <p:cNvPr id="5" name="Foliennummernplatzhalter 4"/>
+          </a:p>
+        </p:txBody>
+      </p:sp>
+      <p:sp>
+        <p:nvSpPr>
+          <p:cNvPr id="5" name="Slide Number Placeholder 4">
+            <a:extLst>
+              <a:ext uri="{FF2B5EF4-FFF2-40B4-BE49-F238E27FC236}">
+                <a16:creationId xmlns:a16="http://schemas.microsoft.com/office/drawing/2014/main" id="{FAC16E02-623C-4BDA-BAFA-B73797A517FD}"/>
+              </a:ext>
+            </a:extLst>
+          </p:cNvPr>
           <p:cNvSpPr>
             <a:spLocks noGrp="1"/>
           </p:cNvSpPr>
@@ -6359,10 +6696,82 @@
           </a:p>
         </p:txBody>
       </p:sp>
+      <p:pic>
+        <p:nvPicPr>
+          <p:cNvPr id="8" name="Picture 7">
+            <a:extLst>
+              <a:ext uri="{FF2B5EF4-FFF2-40B4-BE49-F238E27FC236}">
+                <a16:creationId xmlns:a16="http://schemas.microsoft.com/office/drawing/2014/main" id="{727B0294-0674-43BC-BDB7-4BEB8B9EBA86}"/>
+              </a:ext>
+            </a:extLst>
+          </p:cNvPr>
+          <p:cNvPicPr>
+            <a:picLocks noChangeAspect="1"/>
+          </p:cNvPicPr>
+          <p:nvPr/>
+        </p:nvPicPr>
+        <p:blipFill>
+          <a:blip r:embed="rId2">
+            <a:extLst>
+              <a:ext uri="{28A0092B-C50C-407E-A947-70E740481C1C}">
+                <a14:useLocalDpi xmlns:a14="http://schemas.microsoft.com/office/drawing/2010/main" val="0"/>
+              </a:ext>
+            </a:extLst>
+          </a:blip>
+          <a:stretch>
+            <a:fillRect/>
+          </a:stretch>
+        </p:blipFill>
+        <p:spPr>
+          <a:xfrm>
+            <a:off x="5753100" y="2112645"/>
+            <a:ext cx="5715000" cy="213360"/>
+          </a:xfrm>
+          <a:prstGeom prst="rect">
+            <a:avLst/>
+          </a:prstGeom>
+        </p:spPr>
+      </p:pic>
+      <p:pic>
+        <p:nvPicPr>
+          <p:cNvPr id="10" name="Picture 9" descr="A screenshot of a cell phone&#10;&#10;Description automatically generated">
+            <a:extLst>
+              <a:ext uri="{FF2B5EF4-FFF2-40B4-BE49-F238E27FC236}">
+                <a16:creationId xmlns:a16="http://schemas.microsoft.com/office/drawing/2014/main" id="{49618CDA-DEB7-47DC-9E64-77CBE909E0AE}"/>
+              </a:ext>
+            </a:extLst>
+          </p:cNvPr>
+          <p:cNvPicPr>
+            <a:picLocks noChangeAspect="1"/>
+          </p:cNvPicPr>
+          <p:nvPr/>
+        </p:nvPicPr>
+        <p:blipFill>
+          <a:blip r:embed="rId3">
+            <a:extLst>
+              <a:ext uri="{28A0092B-C50C-407E-A947-70E740481C1C}">
+                <a14:useLocalDpi xmlns:a14="http://schemas.microsoft.com/office/drawing/2010/main" val="0"/>
+              </a:ext>
+            </a:extLst>
+          </a:blip>
+          <a:stretch>
+            <a:fillRect/>
+          </a:stretch>
+        </p:blipFill>
+        <p:spPr>
+          <a:xfrm>
+            <a:off x="6019800" y="2396490"/>
+            <a:ext cx="4808220" cy="2065020"/>
+          </a:xfrm>
+          <a:prstGeom prst="rect">
+            <a:avLst/>
+          </a:prstGeom>
+        </p:spPr>
+      </p:pic>
     </p:spTree>
     <p:extLst>
       <p:ext uri="{BB962C8B-B14F-4D97-AF65-F5344CB8AC3E}">
-        <p14:creationId xmlns:p14="http://schemas.microsoft.com/office/powerpoint/2010/main" val="3786423145"/>
+        <p14:creationId xmlns:p14="http://schemas.microsoft.com/office/powerpoint/2010/main" val="1219806837"/>
       </p:ext>
     </p:extLst>
   </p:cSld>
@@ -6391,7 +6800,13 @@
       </p:grpSpPr>
       <p:sp>
         <p:nvSpPr>
-          <p:cNvPr id="2" name="Titel 1"/>
+          <p:cNvPr id="2" name="Title 1">
+            <a:extLst>
+              <a:ext uri="{FF2B5EF4-FFF2-40B4-BE49-F238E27FC236}">
+                <a16:creationId xmlns:a16="http://schemas.microsoft.com/office/drawing/2014/main" id="{4C84315F-315F-4066-9D3A-472733691F27}"/>
+              </a:ext>
+            </a:extLst>
+          </p:cNvPr>
           <p:cNvSpPr>
             <a:spLocks noGrp="1"/>
           </p:cNvSpPr>
@@ -6399,89 +6814,246 @@
             <p:ph type="title"/>
           </p:nvPr>
         </p:nvSpPr>
-        <p:spPr/>
+        <p:spPr>
+          <a:xfrm>
+            <a:off x="838200" y="365125"/>
+            <a:ext cx="10515600" cy="1325563"/>
+          </a:xfrm>
+        </p:spPr>
+        <p:txBody>
+          <a:bodyPr>
+            <a:normAutofit fontScale="90000"/>
+          </a:bodyPr>
+          <a:lstStyle/>
+          <a:p>
+            <a:r>
+              <a:rPr lang="en-NZ"/>
+              <a:t>Codeimplementierungen    – 	Ändern von</a:t>
+            </a:r>
+            <a:br>
+              <a:rPr lang="en-NZ"/>
+            </a:br>
+            <a:r>
+              <a:rPr lang="en-NZ"/>
+              <a:t>							Queryparametern</a:t>
+            </a:r>
+            <a:endParaRPr lang="de-DE" dirty="0"/>
+          </a:p>
+        </p:txBody>
+      </p:sp>
+      <p:sp>
+        <p:nvSpPr>
+          <p:cNvPr id="3" name="Content Placeholder 2">
+            <a:extLst>
+              <a:ext uri="{FF2B5EF4-FFF2-40B4-BE49-F238E27FC236}">
+                <a16:creationId xmlns:a16="http://schemas.microsoft.com/office/drawing/2014/main" id="{3CCB48FF-D0DB-4239-BF7B-3AC940333DEC}"/>
+              </a:ext>
+            </a:extLst>
+          </p:cNvPr>
+          <p:cNvSpPr>
+            <a:spLocks noGrp="1"/>
+          </p:cNvSpPr>
+          <p:nvPr>
+            <p:ph sz="half" idx="1"/>
+          </p:nvPr>
+        </p:nvSpPr>
+        <p:spPr>
+          <a:xfrm>
+            <a:off x="838199" y="1825625"/>
+            <a:ext cx="9267825" cy="4351338"/>
+          </a:xfrm>
+        </p:spPr>
+        <p:txBody>
+          <a:bodyPr>
+            <a:normAutofit/>
+          </a:bodyPr>
+          <a:lstStyle/>
+          <a:p>
+            <a:r>
+              <a:rPr lang="en-NZ" dirty="0" err="1"/>
+              <a:t>Anfragen</a:t>
+            </a:r>
+            <a:r>
+              <a:rPr lang="en-NZ" dirty="0"/>
+              <a:t> an Backend </a:t>
+            </a:r>
+            <a:r>
+              <a:rPr lang="en-NZ" dirty="0" err="1"/>
+              <a:t>über</a:t>
+            </a:r>
+            <a:r>
+              <a:rPr lang="en-NZ" dirty="0"/>
+              <a:t> GET</a:t>
+            </a:r>
+          </a:p>
+          <a:p>
+            <a:r>
+              <a:rPr lang="en-NZ" dirty="0" err="1"/>
+              <a:t>Für</a:t>
+            </a:r>
+            <a:r>
+              <a:rPr lang="en-NZ" dirty="0"/>
+              <a:t> Range-Query </a:t>
+            </a:r>
+            <a:r>
+              <a:rPr lang="en-NZ" dirty="0" err="1"/>
+              <a:t>zur</a:t>
+            </a:r>
+            <a:r>
+              <a:rPr lang="en-NZ" dirty="0"/>
+              <a:t> </a:t>
+            </a:r>
+            <a:r>
+              <a:rPr lang="en-NZ" dirty="0" err="1"/>
+              <a:t>Suche</a:t>
+            </a:r>
+            <a:r>
+              <a:rPr lang="en-NZ" dirty="0"/>
+              <a:t> </a:t>
+            </a:r>
+            <a:r>
+              <a:rPr lang="en-NZ" dirty="0" err="1"/>
+              <a:t>Wildcardoperator</a:t>
+            </a:r>
+            <a:r>
+              <a:rPr lang="en-NZ" dirty="0"/>
+              <a:t> (</a:t>
+            </a:r>
+            <a:r>
+              <a:rPr lang="en-NZ" b="1" i="1" dirty="0"/>
+              <a:t>%</a:t>
+            </a:r>
+            <a:r>
+              <a:rPr lang="en-NZ" dirty="0"/>
+              <a:t>) </a:t>
+            </a:r>
+            <a:r>
+              <a:rPr lang="en-NZ" dirty="0" err="1"/>
+              <a:t>benötigt</a:t>
+            </a:r>
+            <a:endParaRPr lang="en-NZ" dirty="0"/>
+          </a:p>
+          <a:p>
+            <a:r>
+              <a:rPr lang="en-NZ" dirty="0"/>
+              <a:t>Problem: </a:t>
+            </a:r>
+            <a:r>
+              <a:rPr lang="en-NZ" dirty="0" err="1"/>
+              <a:t>Suchanfrage</a:t>
+            </a:r>
+            <a:r>
+              <a:rPr lang="en-NZ" dirty="0"/>
+              <a:t> </a:t>
+            </a:r>
+            <a:r>
+              <a:rPr lang="en-NZ" dirty="0" err="1"/>
+              <a:t>wird</a:t>
+            </a:r>
+            <a:r>
+              <a:rPr lang="en-NZ" dirty="0"/>
+              <a:t> encoded: </a:t>
+            </a:r>
+            <a:r>
+              <a:rPr lang="en-NZ" b="1" i="1" dirty="0"/>
+              <a:t>%AB </a:t>
+            </a:r>
+            <a:r>
+              <a:rPr lang="en-NZ" dirty="0" err="1"/>
+              <a:t>wird</a:t>
+            </a:r>
+            <a:r>
+              <a:rPr lang="en-NZ" dirty="0"/>
+              <a:t> </a:t>
+            </a:r>
+            <a:r>
+              <a:rPr lang="en-NZ" dirty="0" err="1"/>
+              <a:t>zu</a:t>
+            </a:r>
+            <a:r>
+              <a:rPr lang="en-NZ" dirty="0"/>
+              <a:t>  </a:t>
+            </a:r>
+            <a:r>
+              <a:rPr lang="en-NZ" b="1" i="1" dirty="0"/>
+              <a:t>«</a:t>
+            </a:r>
+          </a:p>
+          <a:p>
+            <a:r>
+              <a:rPr lang="en-NZ" dirty="0" err="1"/>
+              <a:t>Wildcardoperator</a:t>
+            </a:r>
+            <a:r>
+              <a:rPr lang="en-NZ" dirty="0"/>
+              <a:t> </a:t>
+            </a:r>
+            <a:r>
+              <a:rPr lang="en-NZ" dirty="0" err="1"/>
+              <a:t>musste</a:t>
+            </a:r>
+            <a:r>
+              <a:rPr lang="en-NZ" dirty="0"/>
+              <a:t> neu </a:t>
+            </a:r>
+            <a:r>
+              <a:rPr lang="en-NZ" dirty="0" err="1"/>
+              <a:t>definiert</a:t>
+            </a:r>
+            <a:r>
+              <a:rPr lang="en-NZ" dirty="0"/>
+              <a:t> </a:t>
+            </a:r>
+            <a:r>
+              <a:rPr lang="en-NZ" dirty="0" err="1"/>
+              <a:t>werden</a:t>
+            </a:r>
+            <a:endParaRPr lang="en-NZ" dirty="0"/>
+          </a:p>
+        </p:txBody>
+      </p:sp>
+      <p:sp>
+        <p:nvSpPr>
+          <p:cNvPr id="4" name="Footer Placeholder 3">
+            <a:extLst>
+              <a:ext uri="{FF2B5EF4-FFF2-40B4-BE49-F238E27FC236}">
+                <a16:creationId xmlns:a16="http://schemas.microsoft.com/office/drawing/2014/main" id="{0EF7D1E5-7A19-4BA2-8CAA-9135FB90076C}"/>
+              </a:ext>
+            </a:extLst>
+          </p:cNvPr>
+          <p:cNvSpPr>
+            <a:spLocks noGrp="1"/>
+          </p:cNvSpPr>
+          <p:nvPr>
+            <p:ph type="ftr" sz="quarter" idx="11"/>
+          </p:nvPr>
+        </p:nvSpPr>
+        <p:spPr>
+          <a:xfrm>
+            <a:off x="4038600" y="6356350"/>
+            <a:ext cx="4114800" cy="365125"/>
+          </a:xfrm>
+        </p:spPr>
         <p:txBody>
           <a:bodyPr/>
           <a:lstStyle/>
           <a:p>
             <a:r>
-              <a:rPr lang="de-DE" dirty="0" smtClean="0"/>
-              <a:t>Fazit</a:t>
-            </a:r>
-            <a:endParaRPr lang="de-DE" dirty="0"/>
-          </a:p>
-        </p:txBody>
-      </p:sp>
-      <p:sp>
-        <p:nvSpPr>
-          <p:cNvPr id="3" name="Inhaltsplatzhalter 2"/>
-          <p:cNvSpPr>
-            <a:spLocks noGrp="1"/>
-          </p:cNvSpPr>
-          <p:nvPr>
-            <p:ph idx="1"/>
-          </p:nvPr>
-        </p:nvSpPr>
-        <p:spPr/>
-        <p:txBody>
-          <a:bodyPr/>
-          <a:lstStyle/>
-          <a:p>
-            <a:r>
-              <a:rPr lang="de-DE" dirty="0" smtClean="0"/>
-              <a:t>Erstellung des Grob- und Feinkonzepts zu Beginn war sehr hilfreich</a:t>
-            </a:r>
-          </a:p>
-          <a:p>
-            <a:r>
-              <a:rPr lang="de-DE" dirty="0" smtClean="0"/>
-              <a:t>Kommunikation im Team und Gruppendynamik war gut</a:t>
-            </a:r>
-          </a:p>
-          <a:p>
-            <a:r>
-              <a:rPr lang="de-DE" dirty="0" smtClean="0"/>
-              <a:t>Planung war zum Teil schwierig</a:t>
-            </a:r>
-          </a:p>
-          <a:p>
-            <a:r>
-              <a:rPr lang="de-DE" smtClean="0"/>
-              <a:t>Missverständnisse bei den Anforderungen</a:t>
-            </a:r>
-            <a:endParaRPr lang="de-DE" dirty="0" smtClean="0"/>
-          </a:p>
-          <a:p>
-            <a:endParaRPr lang="de-DE" dirty="0"/>
-          </a:p>
-        </p:txBody>
-      </p:sp>
-      <p:sp>
-        <p:nvSpPr>
-          <p:cNvPr id="4" name="Fußzeilenplatzhalter 3"/>
-          <p:cNvSpPr>
-            <a:spLocks noGrp="1"/>
-          </p:cNvSpPr>
-          <p:nvPr>
-            <p:ph type="ftr" sz="quarter" idx="11"/>
-          </p:nvPr>
-        </p:nvSpPr>
-        <p:spPr/>
-        <p:txBody>
-          <a:bodyPr/>
-          <a:lstStyle/>
-          <a:p>
-            <a:r>
-              <a:rPr lang="de-DE" smtClean="0"/>
+              <a:rPr lang="de-DE"/>
               <a:t>WS19/20 - PV-Modulportal - Rüffer, Vorwerk, Withöft, Zolkin</a:t>
             </a:r>
-            <a:endParaRPr lang="de-DE"/>
-          </a:p>
-        </p:txBody>
-      </p:sp>
-      <p:sp>
-        <p:nvSpPr>
-          <p:cNvPr id="5" name="Foliennummernplatzhalter 4"/>
+          </a:p>
+        </p:txBody>
+      </p:sp>
+      <p:sp>
+        <p:nvSpPr>
+          <p:cNvPr id="5" name="Slide Number Placeholder 4">
+            <a:extLst>
+              <a:ext uri="{FF2B5EF4-FFF2-40B4-BE49-F238E27FC236}">
+                <a16:creationId xmlns:a16="http://schemas.microsoft.com/office/drawing/2014/main" id="{FAC16E02-623C-4BDA-BAFA-B73797A517FD}"/>
+              </a:ext>
+            </a:extLst>
+          </p:cNvPr>
           <p:cNvSpPr>
             <a:spLocks noGrp="1"/>
           </p:cNvSpPr>
@@ -6489,7 +7061,12 @@
             <p:ph type="sldNum" sz="quarter" idx="12"/>
           </p:nvPr>
         </p:nvSpPr>
-        <p:spPr/>
+        <p:spPr>
+          <a:xfrm>
+            <a:off x="8610600" y="6356350"/>
+            <a:ext cx="2743200" cy="365125"/>
+          </a:xfrm>
+        </p:spPr>
         <p:txBody>
           <a:bodyPr/>
           <a:lstStyle/>
@@ -6502,10 +7079,183 @@
           </a:p>
         </p:txBody>
       </p:sp>
+      <p:pic>
+        <p:nvPicPr>
+          <p:cNvPr id="12" name="Picture 11">
+            <a:extLst>
+              <a:ext uri="{FF2B5EF4-FFF2-40B4-BE49-F238E27FC236}">
+                <a16:creationId xmlns:a16="http://schemas.microsoft.com/office/drawing/2014/main" id="{4952C6A9-A774-46DB-BDF1-F673FA48CDFD}"/>
+              </a:ext>
+            </a:extLst>
+          </p:cNvPr>
+          <p:cNvPicPr>
+            <a:picLocks noChangeAspect="1"/>
+          </p:cNvPicPr>
+          <p:nvPr/>
+        </p:nvPicPr>
+        <p:blipFill>
+          <a:blip r:embed="rId2">
+            <a:extLst>
+              <a:ext uri="{28A0092B-C50C-407E-A947-70E740481C1C}">
+                <a14:useLocalDpi xmlns:a14="http://schemas.microsoft.com/office/drawing/2010/main" val="0"/>
+              </a:ext>
+            </a:extLst>
+          </a:blip>
+          <a:stretch>
+            <a:fillRect/>
+          </a:stretch>
+        </p:blipFill>
+        <p:spPr>
+          <a:xfrm>
+            <a:off x="204950" y="4377205"/>
+            <a:ext cx="11782100" cy="1189273"/>
+          </a:xfrm>
+          <a:prstGeom prst="rect">
+            <a:avLst/>
+          </a:prstGeom>
+        </p:spPr>
+      </p:pic>
     </p:spTree>
     <p:extLst>
       <p:ext uri="{BB962C8B-B14F-4D97-AF65-F5344CB8AC3E}">
-        <p14:creationId xmlns:p14="http://schemas.microsoft.com/office/powerpoint/2010/main" val="2130456695"/>
+        <p14:creationId xmlns:p14="http://schemas.microsoft.com/office/powerpoint/2010/main" val="1507256200"/>
+      </p:ext>
+    </p:extLst>
+  </p:cSld>
+  <p:clrMapOvr>
+    <a:masterClrMapping/>
+  </p:clrMapOvr>
+</p:sld>
+</file>
+
+<file path=ppt/slides/slide9.xml><?xml version="1.0" encoding="utf-8"?>
+<p:sld xmlns:a="http://schemas.openxmlformats.org/drawingml/2006/main" xmlns:r="http://schemas.openxmlformats.org/officeDocument/2006/relationships" xmlns:p="http://schemas.openxmlformats.org/presentationml/2006/main">
+  <p:cSld>
+    <p:spTree>
+      <p:nvGrpSpPr>
+        <p:cNvPr id="1" name=""/>
+        <p:cNvGrpSpPr/>
+        <p:nvPr/>
+      </p:nvGrpSpPr>
+      <p:grpSpPr>
+        <a:xfrm>
+          <a:off x="0" y="0"/>
+          <a:ext cx="0" cy="0"/>
+          <a:chOff x="0" y="0"/>
+          <a:chExt cx="0" cy="0"/>
+        </a:xfrm>
+      </p:grpSpPr>
+      <p:sp>
+        <p:nvSpPr>
+          <p:cNvPr id="2" name="Titel 1"/>
+          <p:cNvSpPr>
+            <a:spLocks noGrp="1"/>
+          </p:cNvSpPr>
+          <p:nvPr>
+            <p:ph type="title"/>
+          </p:nvPr>
+        </p:nvSpPr>
+        <p:spPr/>
+        <p:txBody>
+          <a:bodyPr/>
+          <a:lstStyle/>
+          <a:p>
+            <a:r>
+              <a:rPr lang="de-DE" dirty="0"/>
+              <a:t>Ausblick</a:t>
+            </a:r>
+          </a:p>
+        </p:txBody>
+      </p:sp>
+      <p:sp>
+        <p:nvSpPr>
+          <p:cNvPr id="3" name="Inhaltsplatzhalter 2"/>
+          <p:cNvSpPr>
+            <a:spLocks noGrp="1"/>
+          </p:cNvSpPr>
+          <p:nvPr>
+            <p:ph idx="1"/>
+          </p:nvPr>
+        </p:nvSpPr>
+        <p:spPr/>
+        <p:txBody>
+          <a:bodyPr/>
+          <a:lstStyle/>
+          <a:p>
+            <a:r>
+              <a:rPr lang="de-DE" dirty="0"/>
+              <a:t>Fertigstellung der Moduldetailseite</a:t>
+            </a:r>
+          </a:p>
+          <a:p>
+            <a:r>
+              <a:rPr lang="de-DE" dirty="0"/>
+              <a:t>Modul-Upload Seite</a:t>
+            </a:r>
+          </a:p>
+          <a:p>
+            <a:r>
+              <a:rPr lang="de-DE" dirty="0"/>
+              <a:t>Dokumentation</a:t>
+            </a:r>
+          </a:p>
+          <a:p>
+            <a:r>
+              <a:rPr lang="de-DE" dirty="0"/>
+              <a:t>Projektbericht</a:t>
+            </a:r>
+          </a:p>
+        </p:txBody>
+      </p:sp>
+      <p:sp>
+        <p:nvSpPr>
+          <p:cNvPr id="4" name="Fußzeilenplatzhalter 3"/>
+          <p:cNvSpPr>
+            <a:spLocks noGrp="1"/>
+          </p:cNvSpPr>
+          <p:nvPr>
+            <p:ph type="ftr" sz="quarter" idx="11"/>
+          </p:nvPr>
+        </p:nvSpPr>
+        <p:spPr/>
+        <p:txBody>
+          <a:bodyPr/>
+          <a:lstStyle/>
+          <a:p>
+            <a:r>
+              <a:rPr lang="de-DE"/>
+              <a:t>WS19/20 - PV-Modulportal - Rüffer, Vorwerk, Withöft, Zolkin</a:t>
+            </a:r>
+          </a:p>
+        </p:txBody>
+      </p:sp>
+      <p:sp>
+        <p:nvSpPr>
+          <p:cNvPr id="5" name="Foliennummernplatzhalter 4"/>
+          <p:cNvSpPr>
+            <a:spLocks noGrp="1"/>
+          </p:cNvSpPr>
+          <p:nvPr>
+            <p:ph type="sldNum" sz="quarter" idx="12"/>
+          </p:nvPr>
+        </p:nvSpPr>
+        <p:spPr/>
+        <p:txBody>
+          <a:bodyPr/>
+          <a:lstStyle/>
+          <a:p>
+            <a:fld id="{969E759D-A893-4B96-8B48-96EE547EBC41}" type="slidenum">
+              <a:rPr lang="de-DE" smtClean="0"/>
+              <a:t>9</a:t>
+            </a:fld>
+            <a:endParaRPr lang="de-DE"/>
+          </a:p>
+        </p:txBody>
+      </p:sp>
+    </p:spTree>
+    <p:extLst>
+      <p:ext uri="{BB962C8B-B14F-4D97-AF65-F5344CB8AC3E}">
+        <p14:creationId xmlns:p14="http://schemas.microsoft.com/office/powerpoint/2010/main" val="3786423145"/>
       </p:ext>
     </p:extLst>
   </p:cSld>

</xml_diff>

<commit_message>
Updated toc in presentation
</commit_message>
<xml_diff>
--- a/docs/Seminarvortrag.pptx
+++ b/docs/Seminarvortrag.pptx
@@ -293,7 +293,7 @@
           <a:p>
             <a:fld id="{45D0F98D-38D5-4C1A-A003-148E75DBF760}" type="datetime1">
               <a:rPr lang="de-DE" smtClean="0"/>
-              <a:t>09.12.2019</a:t>
+              <a:t>10.12.2019</a:t>
             </a:fld>
             <a:endParaRPr lang="de-DE"/>
           </a:p>
@@ -350,7 +350,7 @@
           <a:p>
             <a:fld id="{969E759D-A893-4B96-8B48-96EE547EBC41}" type="slidenum">
               <a:rPr lang="de-DE" smtClean="0"/>
-              <a:t>‹Nr.›</a:t>
+              <a:t>‹#›</a:t>
             </a:fld>
             <a:endParaRPr lang="de-DE"/>
           </a:p>
@@ -496,7 +496,7 @@
           <a:p>
             <a:fld id="{35EE94FD-1B66-443A-A78C-7063FFFB3DB5}" type="datetime1">
               <a:rPr lang="de-DE" smtClean="0"/>
-              <a:t>09.12.2019</a:t>
+              <a:t>10.12.2019</a:t>
             </a:fld>
             <a:endParaRPr lang="de-DE"/>
           </a:p>
@@ -553,7 +553,7 @@
           <a:p>
             <a:fld id="{969E759D-A893-4B96-8B48-96EE547EBC41}" type="slidenum">
               <a:rPr lang="de-DE" smtClean="0"/>
-              <a:t>‹Nr.›</a:t>
+              <a:t>‹#›</a:t>
             </a:fld>
             <a:endParaRPr lang="de-DE"/>
           </a:p>
@@ -709,7 +709,7 @@
           <a:p>
             <a:fld id="{846435C6-9F94-4AA4-B35A-39DE494D17EA}" type="datetime1">
               <a:rPr lang="de-DE" smtClean="0"/>
-              <a:t>09.12.2019</a:t>
+              <a:t>10.12.2019</a:t>
             </a:fld>
             <a:endParaRPr lang="de-DE"/>
           </a:p>
@@ -766,7 +766,7 @@
           <a:p>
             <a:fld id="{969E759D-A893-4B96-8B48-96EE547EBC41}" type="slidenum">
               <a:rPr lang="de-DE" smtClean="0"/>
-              <a:t>‹Nr.›</a:t>
+              <a:t>‹#›</a:t>
             </a:fld>
             <a:endParaRPr lang="de-DE"/>
           </a:p>
@@ -912,7 +912,7 @@
           <a:p>
             <a:fld id="{7BA378BF-52EB-4C5B-B6BB-996DFE0988BD}" type="datetime1">
               <a:rPr lang="de-DE" smtClean="0"/>
-              <a:t>09.12.2019</a:t>
+              <a:t>10.12.2019</a:t>
             </a:fld>
             <a:endParaRPr lang="de-DE"/>
           </a:p>
@@ -969,7 +969,7 @@
           <a:p>
             <a:fld id="{969E759D-A893-4B96-8B48-96EE547EBC41}" type="slidenum">
               <a:rPr lang="de-DE" smtClean="0"/>
-              <a:t>‹Nr.›</a:t>
+              <a:t>‹#›</a:t>
             </a:fld>
             <a:endParaRPr lang="de-DE"/>
           </a:p>
@@ -1191,7 +1191,7 @@
           <a:p>
             <a:fld id="{546325AB-2200-4FF3-AF2A-B172FFDDBDF4}" type="datetime1">
               <a:rPr lang="de-DE" smtClean="0"/>
-              <a:t>09.12.2019</a:t>
+              <a:t>10.12.2019</a:t>
             </a:fld>
             <a:endParaRPr lang="de-DE"/>
           </a:p>
@@ -1248,7 +1248,7 @@
           <a:p>
             <a:fld id="{969E759D-A893-4B96-8B48-96EE547EBC41}" type="slidenum">
               <a:rPr lang="de-DE" smtClean="0"/>
-              <a:t>‹Nr.›</a:t>
+              <a:t>‹#›</a:t>
             </a:fld>
             <a:endParaRPr lang="de-DE"/>
           </a:p>
@@ -1462,7 +1462,7 @@
           <a:p>
             <a:fld id="{4BD4E413-4B36-416A-99F8-917101FD3552}" type="datetime1">
               <a:rPr lang="de-DE" smtClean="0"/>
-              <a:t>09.12.2019</a:t>
+              <a:t>10.12.2019</a:t>
             </a:fld>
             <a:endParaRPr lang="de-DE"/>
           </a:p>
@@ -1519,7 +1519,7 @@
           <a:p>
             <a:fld id="{969E759D-A893-4B96-8B48-96EE547EBC41}" type="slidenum">
               <a:rPr lang="de-DE" smtClean="0"/>
-              <a:t>‹Nr.›</a:t>
+              <a:t>‹#›</a:t>
             </a:fld>
             <a:endParaRPr lang="de-DE"/>
           </a:p>
@@ -1880,7 +1880,7 @@
           <a:p>
             <a:fld id="{350CD5BB-2135-4C1C-9EB9-6B104A7F1852}" type="datetime1">
               <a:rPr lang="de-DE" smtClean="0"/>
-              <a:t>09.12.2019</a:t>
+              <a:t>10.12.2019</a:t>
             </a:fld>
             <a:endParaRPr lang="de-DE"/>
           </a:p>
@@ -1937,7 +1937,7 @@
           <a:p>
             <a:fld id="{969E759D-A893-4B96-8B48-96EE547EBC41}" type="slidenum">
               <a:rPr lang="de-DE" smtClean="0"/>
-              <a:t>‹Nr.›</a:t>
+              <a:t>‹#›</a:t>
             </a:fld>
             <a:endParaRPr lang="de-DE"/>
           </a:p>
@@ -2025,7 +2025,7 @@
           <a:p>
             <a:fld id="{5F8EFD36-9E63-4951-BEF9-F6B8ACF9848D}" type="datetime1">
               <a:rPr lang="de-DE" smtClean="0"/>
-              <a:t>09.12.2019</a:t>
+              <a:t>10.12.2019</a:t>
             </a:fld>
             <a:endParaRPr lang="de-DE"/>
           </a:p>
@@ -2082,7 +2082,7 @@
           <a:p>
             <a:fld id="{969E759D-A893-4B96-8B48-96EE547EBC41}" type="slidenum">
               <a:rPr lang="de-DE" smtClean="0"/>
-              <a:t>‹Nr.›</a:t>
+              <a:t>‹#›</a:t>
             </a:fld>
             <a:endParaRPr lang="de-DE"/>
           </a:p>
@@ -2141,7 +2141,7 @@
           <a:p>
             <a:fld id="{5809FACB-23B1-4A10-9D0A-328C6885745A}" type="datetime1">
               <a:rPr lang="de-DE" smtClean="0"/>
-              <a:t>09.12.2019</a:t>
+              <a:t>10.12.2019</a:t>
             </a:fld>
             <a:endParaRPr lang="de-DE"/>
           </a:p>
@@ -2198,7 +2198,7 @@
           <a:p>
             <a:fld id="{969E759D-A893-4B96-8B48-96EE547EBC41}" type="slidenum">
               <a:rPr lang="de-DE" smtClean="0"/>
-              <a:t>‹Nr.›</a:t>
+              <a:t>‹#›</a:t>
             </a:fld>
             <a:endParaRPr lang="de-DE"/>
           </a:p>
@@ -2457,7 +2457,7 @@
           <a:p>
             <a:fld id="{D34E0433-A910-4A2C-B27B-93E80F26180A}" type="datetime1">
               <a:rPr lang="de-DE" smtClean="0"/>
-              <a:t>09.12.2019</a:t>
+              <a:t>10.12.2019</a:t>
             </a:fld>
             <a:endParaRPr lang="de-DE"/>
           </a:p>
@@ -2514,7 +2514,7 @@
           <a:p>
             <a:fld id="{969E759D-A893-4B96-8B48-96EE547EBC41}" type="slidenum">
               <a:rPr lang="de-DE" smtClean="0"/>
-              <a:t>‹Nr.›</a:t>
+              <a:t>‹#›</a:t>
             </a:fld>
             <a:endParaRPr lang="de-DE"/>
           </a:p>
@@ -2749,7 +2749,7 @@
           <a:p>
             <a:fld id="{27D0816D-89A7-4D5C-8256-1B20355E25D9}" type="datetime1">
               <a:rPr lang="de-DE" smtClean="0"/>
-              <a:t>09.12.2019</a:t>
+              <a:t>10.12.2019</a:t>
             </a:fld>
             <a:endParaRPr lang="de-DE"/>
           </a:p>
@@ -2806,7 +2806,7 @@
           <a:p>
             <a:fld id="{969E759D-A893-4B96-8B48-96EE547EBC41}" type="slidenum">
               <a:rPr lang="de-DE" smtClean="0"/>
-              <a:t>‹Nr.›</a:t>
+              <a:t>‹#›</a:t>
             </a:fld>
             <a:endParaRPr lang="de-DE"/>
           </a:p>
@@ -2995,7 +2995,7 @@
           <a:p>
             <a:fld id="{96A0F86B-E49E-4FBD-A866-1ABC19B2F8A7}" type="datetime1">
               <a:rPr lang="de-DE" smtClean="0"/>
-              <a:t>09.12.2019</a:t>
+              <a:t>10.12.2019</a:t>
             </a:fld>
             <a:endParaRPr lang="de-DE"/>
           </a:p>
@@ -3088,7 +3088,7 @@
           <a:p>
             <a:fld id="{969E759D-A893-4B96-8B48-96EE547EBC41}" type="slidenum">
               <a:rPr lang="de-DE" smtClean="0"/>
-              <a:t>‹Nr.›</a:t>
+              <a:t>‹#›</a:t>
             </a:fld>
             <a:endParaRPr lang="de-DE"/>
           </a:p>
@@ -6648,18 +6648,7 @@
               <a:rPr lang="en-NZ" sz="1700" dirty="0" err="1"/>
               <a:t>Aufgaben</a:t>
             </a:r>
-            <a:r>
-              <a:rPr lang="en-NZ" sz="1700" dirty="0"/>
-              <a:t> und </a:t>
-            </a:r>
-            <a:r>
-              <a:rPr lang="en-NZ" sz="1700" dirty="0" err="1"/>
-              <a:t>Rollen</a:t>
-            </a:r>
-            <a:r>
-              <a:rPr lang="en-NZ" sz="1700" dirty="0"/>
-              <a:t> (Michelle)</a:t>
-            </a:r>
+            <a:endParaRPr lang="en-NZ" sz="1700" dirty="0"/>
           </a:p>
           <a:p>
             <a:r>
@@ -6674,10 +6663,7 @@
               <a:rPr lang="en-NZ" sz="1700" dirty="0" err="1"/>
               <a:t>Grundlagen</a:t>
             </a:r>
-            <a:r>
-              <a:rPr lang="en-NZ" sz="1700" dirty="0"/>
-              <a:t> (Hannes)</a:t>
-            </a:r>
+            <a:endParaRPr lang="en-NZ" sz="1700" dirty="0"/>
           </a:p>
           <a:p>
             <a:r>
@@ -6692,10 +6678,7 @@
               <a:rPr lang="en-NZ" sz="1700" dirty="0" err="1"/>
               <a:t>Arbeiten</a:t>
             </a:r>
-            <a:r>
-              <a:rPr lang="en-NZ" sz="1700" dirty="0"/>
-              <a:t> (Christiane, Michelle)</a:t>
-            </a:r>
+            <a:endParaRPr lang="en-NZ" sz="1700" dirty="0"/>
           </a:p>
           <a:p>
             <a:r>
@@ -6706,10 +6689,7 @@
               <a:rPr lang="en-NZ" sz="1700" dirty="0" err="1"/>
               <a:t>Architektur</a:t>
             </a:r>
-            <a:r>
-              <a:rPr lang="en-NZ" sz="1700" dirty="0"/>
-              <a:t> (Hannes, Moritz)</a:t>
-            </a:r>
+            <a:endParaRPr lang="en-NZ" sz="1700" dirty="0"/>
           </a:p>
           <a:p>
             <a:r>
@@ -6718,49 +6698,14 @@
             </a:r>
             <a:r>
               <a:rPr lang="en-NZ" sz="1700" dirty="0" err="1"/>
-              <a:t>Implementierungen</a:t>
-            </a:r>
+              <a:t>Implementierungsdetails</a:t>
+            </a:r>
+            <a:endParaRPr lang="en-NZ" sz="1700" dirty="0"/>
+          </a:p>
+          <a:p>
             <a:r>
               <a:rPr lang="en-NZ" sz="1700" dirty="0"/>
-              <a:t> </a:t>
-            </a:r>
-            <a:r>
-              <a:rPr lang="en-NZ" sz="1700" dirty="0" err="1"/>
-              <a:t>mit</a:t>
-            </a:r>
-            <a:r>
-              <a:rPr lang="en-NZ" sz="1700" dirty="0"/>
-              <a:t> </a:t>
-            </a:r>
-            <a:r>
-              <a:rPr lang="en-NZ" sz="1700" dirty="0" err="1"/>
-              <a:t>aussagekräftigen</a:t>
-            </a:r>
-            <a:r>
-              <a:rPr lang="en-NZ" sz="1700" dirty="0"/>
-              <a:t> Details (</a:t>
-            </a:r>
-            <a:r>
-              <a:rPr lang="en-NZ" sz="1700" dirty="0" err="1"/>
-              <a:t>alle</a:t>
-            </a:r>
-            <a:r>
-              <a:rPr lang="en-NZ" sz="1700" dirty="0"/>
-              <a:t>)</a:t>
-            </a:r>
-          </a:p>
-          <a:p>
-            <a:r>
-              <a:rPr lang="en-NZ" sz="1700" dirty="0"/>
-              <a:t>Demonstration der Software (</a:t>
-            </a:r>
-            <a:r>
-              <a:rPr lang="en-NZ" sz="1700" dirty="0" err="1"/>
-              <a:t>keiner</a:t>
-            </a:r>
-            <a:r>
-              <a:rPr lang="en-NZ" sz="1700" dirty="0"/>
-              <a:t>)</a:t>
+              <a:t>Demonstration der Software</a:t>
             </a:r>
           </a:p>
           <a:p>
@@ -6776,10 +6721,7 @@
               <a:rPr lang="en-NZ" sz="1700" dirty="0" err="1"/>
               <a:t>Fazit</a:t>
             </a:r>
-            <a:r>
-              <a:rPr lang="en-NZ" sz="1700" dirty="0"/>
-              <a:t> (Christiane)</a:t>
-            </a:r>
+            <a:endParaRPr lang="en-NZ" sz="1700" dirty="0"/>
           </a:p>
         </p:txBody>
       </p:sp>

</xml_diff>